<commit_message>
Adding project and updated presentations
</commit_message>
<xml_diff>
--- a/Presentation.pptx
+++ b/Presentation.pptx
@@ -5,7 +5,7 @@
     <p:sldMasterId id="2147483756" r:id="rId1"/>
   </p:sldMasterIdLst>
   <p:notesMasterIdLst>
-    <p:notesMasterId r:id="rId15"/>
+    <p:notesMasterId r:id="rId28"/>
   </p:notesMasterIdLst>
   <p:sldIdLst>
     <p:sldId id="256" r:id="rId2"/>
@@ -13,14 +13,27 @@
     <p:sldId id="258" r:id="rId4"/>
     <p:sldId id="259" r:id="rId5"/>
     <p:sldId id="260" r:id="rId6"/>
-    <p:sldId id="261" r:id="rId7"/>
-    <p:sldId id="262" r:id="rId8"/>
-    <p:sldId id="263" r:id="rId9"/>
-    <p:sldId id="264" r:id="rId10"/>
-    <p:sldId id="265" r:id="rId11"/>
-    <p:sldId id="266" r:id="rId12"/>
-    <p:sldId id="267" r:id="rId13"/>
-    <p:sldId id="268" r:id="rId14"/>
+    <p:sldId id="271" r:id="rId7"/>
+    <p:sldId id="270" r:id="rId8"/>
+    <p:sldId id="272" r:id="rId9"/>
+    <p:sldId id="273" r:id="rId10"/>
+    <p:sldId id="269" r:id="rId11"/>
+    <p:sldId id="274" r:id="rId12"/>
+    <p:sldId id="275" r:id="rId13"/>
+    <p:sldId id="276" r:id="rId14"/>
+    <p:sldId id="277" r:id="rId15"/>
+    <p:sldId id="278" r:id="rId16"/>
+    <p:sldId id="279" r:id="rId17"/>
+    <p:sldId id="280" r:id="rId18"/>
+    <p:sldId id="281" r:id="rId19"/>
+    <p:sldId id="261" r:id="rId20"/>
+    <p:sldId id="262" r:id="rId21"/>
+    <p:sldId id="263" r:id="rId22"/>
+    <p:sldId id="264" r:id="rId23"/>
+    <p:sldId id="265" r:id="rId24"/>
+    <p:sldId id="266" r:id="rId25"/>
+    <p:sldId id="267" r:id="rId26"/>
+    <p:sldId id="268" r:id="rId27"/>
   </p:sldIdLst>
   <p:sldSz cx="12192000" cy="6858000"/>
   <p:notesSz cx="6858000" cy="9144000"/>
@@ -1078,7 +1091,7 @@
           <a:p>
             <a:fld id="{100BA7F1-FF14-4B33-8466-87C88C58AB59}" type="datetimeFigureOut">
               <a:rPr lang="en-IN" smtClean="0"/>
-              <a:t>17-03-2022</a:t>
+              <a:t>22-03-2022</a:t>
             </a:fld>
             <a:endParaRPr lang="en-IN"/>
           </a:p>
@@ -1346,6 +1359,182 @@
 </p:notesMaster>
 </file>
 
+<file path=ppt/notesSlides/notesSlide1.xml><?xml version="1.0" encoding="utf-8"?>
+<p:notes xmlns:a="http://schemas.openxmlformats.org/drawingml/2006/main" xmlns:r="http://schemas.openxmlformats.org/officeDocument/2006/relationships" xmlns:p="http://schemas.openxmlformats.org/presentationml/2006/main">
+  <p:cSld>
+    <p:spTree>
+      <p:nvGrpSpPr>
+        <p:cNvPr id="1" name=""/>
+        <p:cNvGrpSpPr/>
+        <p:nvPr/>
+      </p:nvGrpSpPr>
+      <p:grpSpPr>
+        <a:xfrm>
+          <a:off x="0" y="0"/>
+          <a:ext cx="0" cy="0"/>
+          <a:chOff x="0" y="0"/>
+          <a:chExt cx="0" cy="0"/>
+        </a:xfrm>
+      </p:grpSpPr>
+      <p:sp>
+        <p:nvSpPr>
+          <p:cNvPr id="2" name="Slide Image Placeholder 1"/>
+          <p:cNvSpPr>
+            <a:spLocks noGrp="1" noRot="1" noChangeAspect="1"/>
+          </p:cNvSpPr>
+          <p:nvPr>
+            <p:ph type="sldImg"/>
+          </p:nvPr>
+        </p:nvSpPr>
+        <p:spPr/>
+      </p:sp>
+      <p:sp>
+        <p:nvSpPr>
+          <p:cNvPr id="3" name="Notes Placeholder 2"/>
+          <p:cNvSpPr>
+            <a:spLocks noGrp="1"/>
+          </p:cNvSpPr>
+          <p:nvPr>
+            <p:ph type="body" idx="1"/>
+          </p:nvPr>
+        </p:nvSpPr>
+        <p:spPr/>
+        <p:txBody>
+          <a:bodyPr/>
+          <a:lstStyle/>
+          <a:p>
+            <a:r>
+              <a:rPr lang="en-US" dirty="0" err="1"/>
+              <a:t>Softmax</a:t>
+            </a:r>
+            <a:r>
+              <a:rPr lang="en-US" dirty="0"/>
+              <a:t> function: https://deepai.org/machine-learning-glossary-and-terms/softmax-layer</a:t>
+            </a:r>
+            <a:endParaRPr lang="en-CA" dirty="0"/>
+          </a:p>
+        </p:txBody>
+      </p:sp>
+      <p:sp>
+        <p:nvSpPr>
+          <p:cNvPr id="4" name="Slide Number Placeholder 3"/>
+          <p:cNvSpPr>
+            <a:spLocks noGrp="1"/>
+          </p:cNvSpPr>
+          <p:nvPr>
+            <p:ph type="sldNum" sz="quarter" idx="5"/>
+          </p:nvPr>
+        </p:nvSpPr>
+        <p:spPr/>
+        <p:txBody>
+          <a:bodyPr/>
+          <a:lstStyle/>
+          <a:p>
+            <a:fld id="{01B39F35-5881-47B3-BFA4-BF18815FCBCA}" type="slidenum">
+              <a:rPr lang="en-IN" smtClean="0"/>
+              <a:t>9</a:t>
+            </a:fld>
+            <a:endParaRPr lang="en-IN"/>
+          </a:p>
+        </p:txBody>
+      </p:sp>
+    </p:spTree>
+    <p:extLst>
+      <p:ext uri="{BB962C8B-B14F-4D97-AF65-F5344CB8AC3E}">
+        <p14:creationId xmlns:p14="http://schemas.microsoft.com/office/powerpoint/2010/main" val="2139830726"/>
+      </p:ext>
+    </p:extLst>
+  </p:cSld>
+  <p:clrMapOvr>
+    <a:masterClrMapping/>
+  </p:clrMapOvr>
+</p:notes>
+</file>
+
+<file path=ppt/notesSlides/notesSlide2.xml><?xml version="1.0" encoding="utf-8"?>
+<p:notes xmlns:a="http://schemas.openxmlformats.org/drawingml/2006/main" xmlns:r="http://schemas.openxmlformats.org/officeDocument/2006/relationships" xmlns:p="http://schemas.openxmlformats.org/presentationml/2006/main">
+  <p:cSld>
+    <p:spTree>
+      <p:nvGrpSpPr>
+        <p:cNvPr id="1" name=""/>
+        <p:cNvGrpSpPr/>
+        <p:nvPr/>
+      </p:nvGrpSpPr>
+      <p:grpSpPr>
+        <a:xfrm>
+          <a:off x="0" y="0"/>
+          <a:ext cx="0" cy="0"/>
+          <a:chOff x="0" y="0"/>
+          <a:chExt cx="0" cy="0"/>
+        </a:xfrm>
+      </p:grpSpPr>
+      <p:sp>
+        <p:nvSpPr>
+          <p:cNvPr id="2" name="Slide Image Placeholder 1"/>
+          <p:cNvSpPr>
+            <a:spLocks noGrp="1" noRot="1" noChangeAspect="1"/>
+          </p:cNvSpPr>
+          <p:nvPr>
+            <p:ph type="sldImg"/>
+          </p:nvPr>
+        </p:nvSpPr>
+        <p:spPr/>
+      </p:sp>
+      <p:sp>
+        <p:nvSpPr>
+          <p:cNvPr id="3" name="Notes Placeholder 2"/>
+          <p:cNvSpPr>
+            <a:spLocks noGrp="1"/>
+          </p:cNvSpPr>
+          <p:nvPr>
+            <p:ph type="body" idx="1"/>
+          </p:nvPr>
+        </p:nvSpPr>
+        <p:spPr/>
+        <p:txBody>
+          <a:bodyPr/>
+          <a:lstStyle/>
+          <a:p>
+            <a:endParaRPr lang="en-CA" dirty="0"/>
+          </a:p>
+        </p:txBody>
+      </p:sp>
+      <p:sp>
+        <p:nvSpPr>
+          <p:cNvPr id="4" name="Slide Number Placeholder 3"/>
+          <p:cNvSpPr>
+            <a:spLocks noGrp="1"/>
+          </p:cNvSpPr>
+          <p:nvPr>
+            <p:ph type="sldNum" sz="quarter" idx="5"/>
+          </p:nvPr>
+        </p:nvSpPr>
+        <p:spPr/>
+        <p:txBody>
+          <a:bodyPr/>
+          <a:lstStyle/>
+          <a:p>
+            <a:fld id="{01B39F35-5881-47B3-BFA4-BF18815FCBCA}" type="slidenum">
+              <a:rPr lang="en-IN" smtClean="0"/>
+              <a:t>10</a:t>
+            </a:fld>
+            <a:endParaRPr lang="en-IN"/>
+          </a:p>
+        </p:txBody>
+      </p:sp>
+    </p:spTree>
+    <p:extLst>
+      <p:ext uri="{BB962C8B-B14F-4D97-AF65-F5344CB8AC3E}">
+        <p14:creationId xmlns:p14="http://schemas.microsoft.com/office/powerpoint/2010/main" val="693868399"/>
+      </p:ext>
+    </p:extLst>
+  </p:cSld>
+  <p:clrMapOvr>
+    <a:masterClrMapping/>
+  </p:clrMapOvr>
+</p:notes>
+</file>
+
 <file path=ppt/slideLayouts/slideLayout1.xml><?xml version="1.0" encoding="utf-8"?>
 <p:sldLayout xmlns:a="http://schemas.openxmlformats.org/drawingml/2006/main" xmlns:r="http://schemas.openxmlformats.org/officeDocument/2006/relationships" xmlns:p="http://schemas.openxmlformats.org/presentationml/2006/main" type="title" preserve="1">
   <p:cSld name="Title Slide">
@@ -1477,7 +1666,7 @@
           <a:p>
             <a:fld id="{462C8DB0-A994-4095-BA2B-A9A82D26CA9E}" type="datetimeFigureOut">
               <a:rPr lang="en-IN" smtClean="0"/>
-              <a:t>17-03-2022</a:t>
+              <a:t>22-03-2022</a:t>
             </a:fld>
             <a:endParaRPr lang="en-IN"/>
           </a:p>
@@ -1647,7 +1836,7 @@
           <a:p>
             <a:fld id="{462C8DB0-A994-4095-BA2B-A9A82D26CA9E}" type="datetimeFigureOut">
               <a:rPr lang="en-IN" smtClean="0"/>
-              <a:t>17-03-2022</a:t>
+              <a:t>22-03-2022</a:t>
             </a:fld>
             <a:endParaRPr lang="en-IN"/>
           </a:p>
@@ -1827,7 +2016,7 @@
           <a:p>
             <a:fld id="{462C8DB0-A994-4095-BA2B-A9A82D26CA9E}" type="datetimeFigureOut">
               <a:rPr lang="en-IN" smtClean="0"/>
-              <a:t>17-03-2022</a:t>
+              <a:t>22-03-2022</a:t>
             </a:fld>
             <a:endParaRPr lang="en-IN"/>
           </a:p>
@@ -1997,7 +2186,7 @@
           <a:p>
             <a:fld id="{462C8DB0-A994-4095-BA2B-A9A82D26CA9E}" type="datetimeFigureOut">
               <a:rPr lang="en-IN" smtClean="0"/>
-              <a:t>17-03-2022</a:t>
+              <a:t>22-03-2022</a:t>
             </a:fld>
             <a:endParaRPr lang="en-IN"/>
           </a:p>
@@ -2243,7 +2432,7 @@
           <a:p>
             <a:fld id="{462C8DB0-A994-4095-BA2B-A9A82D26CA9E}" type="datetimeFigureOut">
               <a:rPr lang="en-IN" smtClean="0"/>
-              <a:t>17-03-2022</a:t>
+              <a:t>22-03-2022</a:t>
             </a:fld>
             <a:endParaRPr lang="en-IN"/>
           </a:p>
@@ -2475,7 +2664,7 @@
           <a:p>
             <a:fld id="{462C8DB0-A994-4095-BA2B-A9A82D26CA9E}" type="datetimeFigureOut">
               <a:rPr lang="en-IN" smtClean="0"/>
-              <a:t>17-03-2022</a:t>
+              <a:t>22-03-2022</a:t>
             </a:fld>
             <a:endParaRPr lang="en-IN"/>
           </a:p>
@@ -2842,7 +3031,7 @@
           <a:p>
             <a:fld id="{462C8DB0-A994-4095-BA2B-A9A82D26CA9E}" type="datetimeFigureOut">
               <a:rPr lang="en-IN" smtClean="0"/>
-              <a:t>17-03-2022</a:t>
+              <a:t>22-03-2022</a:t>
             </a:fld>
             <a:endParaRPr lang="en-IN"/>
           </a:p>
@@ -2960,7 +3149,7 @@
           <a:p>
             <a:fld id="{462C8DB0-A994-4095-BA2B-A9A82D26CA9E}" type="datetimeFigureOut">
               <a:rPr lang="en-IN" smtClean="0"/>
-              <a:t>17-03-2022</a:t>
+              <a:t>22-03-2022</a:t>
             </a:fld>
             <a:endParaRPr lang="en-IN"/>
           </a:p>
@@ -3055,7 +3244,7 @@
           <a:p>
             <a:fld id="{462C8DB0-A994-4095-BA2B-A9A82D26CA9E}" type="datetimeFigureOut">
               <a:rPr lang="en-IN" smtClean="0"/>
-              <a:t>17-03-2022</a:t>
+              <a:t>22-03-2022</a:t>
             </a:fld>
             <a:endParaRPr lang="en-IN"/>
           </a:p>
@@ -3332,7 +3521,7 @@
           <a:p>
             <a:fld id="{462C8DB0-A994-4095-BA2B-A9A82D26CA9E}" type="datetimeFigureOut">
               <a:rPr lang="en-IN" smtClean="0"/>
-              <a:t>17-03-2022</a:t>
+              <a:t>22-03-2022</a:t>
             </a:fld>
             <a:endParaRPr lang="en-IN"/>
           </a:p>
@@ -3589,7 +3778,7 @@
           <a:p>
             <a:fld id="{462C8DB0-A994-4095-BA2B-A9A82D26CA9E}" type="datetimeFigureOut">
               <a:rPr lang="en-IN" smtClean="0"/>
-              <a:t>17-03-2022</a:t>
+              <a:t>22-03-2022</a:t>
             </a:fld>
             <a:endParaRPr lang="en-IN"/>
           </a:p>
@@ -3802,7 +3991,7 @@
           <a:p>
             <a:fld id="{462C8DB0-A994-4095-BA2B-A9A82D26CA9E}" type="datetimeFigureOut">
               <a:rPr lang="en-IN" smtClean="0"/>
-              <a:t>17-03-2022</a:t>
+              <a:t>22-03-2022</a:t>
             </a:fld>
             <a:endParaRPr lang="en-IN"/>
           </a:p>
@@ -4711,7 +4900,7 @@
             <a:round/>
             <a:extLst>
               <a:ext uri="{C807C97D-BFC1-408E-A445-0C87EB9F89A2}">
-                <ask:lineSketchStyleProps xmlns:ask="http://schemas.microsoft.com/office/drawing/2018/sketchyshapes" sd="1219033472">
+                <ask:lineSketchStyleProps xmlns:ask="http://schemas.microsoft.com/office/drawing/2018/sketchyshapes" xmlns="" sd="1219033472">
                   <a:prstGeom prst="rect">
                     <a:avLst/>
                   </a:prstGeom>
@@ -4783,7 +4972,7 @@
           <p:cNvPr id="2" name="Title 1">
             <a:extLst>
               <a:ext uri="{FF2B5EF4-FFF2-40B4-BE49-F238E27FC236}">
-                <a16:creationId xmlns:a16="http://schemas.microsoft.com/office/drawing/2014/main" id="{B734B636-6FCA-4D65-BFF0-C521F7C770F0}"/>
+                <a16:creationId xmlns:a16="http://schemas.microsoft.com/office/drawing/2014/main" id="{C626CBB8-4CE7-4F8D-9D1F-E72EC9CD60FC}"/>
               </a:ext>
             </a:extLst>
           </p:cNvPr>
@@ -4800,41 +4989,294 @@
           <a:lstStyle/>
           <a:p>
             <a:r>
-              <a:rPr lang="en-IN" dirty="0"/>
-              <a:t>Backpropagation</a:t>
-            </a:r>
-          </a:p>
-        </p:txBody>
-      </p:sp>
-      <p:sp>
-        <p:nvSpPr>
-          <p:cNvPr id="3" name="Content Placeholder 2">
+              <a:rPr lang="en-US" dirty="0"/>
+              <a:t>Problem with RNN architecture</a:t>
+            </a:r>
+            <a:endParaRPr lang="en-CA" dirty="0"/>
+          </a:p>
+        </p:txBody>
+      </p:sp>
+      <p:pic>
+        <p:nvPicPr>
+          <p:cNvPr id="4" name="Content Placeholder 3">
             <a:extLst>
               <a:ext uri="{FF2B5EF4-FFF2-40B4-BE49-F238E27FC236}">
-                <a16:creationId xmlns:a16="http://schemas.microsoft.com/office/drawing/2014/main" id="{7DA921A4-A19B-4196-A3AD-A34DB25C32FB}"/>
+                <a16:creationId xmlns:a16="http://schemas.microsoft.com/office/drawing/2014/main" id="{C073BFFE-7D6C-4E61-A2DB-19DA78880DF6}"/>
               </a:ext>
             </a:extLst>
           </p:cNvPr>
-          <p:cNvSpPr>
-            <a:spLocks noGrp="1"/>
-          </p:cNvSpPr>
+          <p:cNvPicPr>
+            <a:picLocks noGrp="1" noChangeAspect="1"/>
+          </p:cNvPicPr>
           <p:nvPr>
             <p:ph idx="1"/>
           </p:nvPr>
-        </p:nvSpPr>
-        <p:spPr/>
-        <p:txBody>
-          <a:bodyPr/>
-          <a:lstStyle/>
-          <a:p>
-            <a:endParaRPr lang="en-IN"/>
+        </p:nvPicPr>
+        <p:blipFill>
+          <a:blip r:embed="rId3"/>
+          <a:stretch>
+            <a:fillRect/>
+          </a:stretch>
+        </p:blipFill>
+        <p:spPr>
+          <a:xfrm>
+            <a:off x="6882132" y="1930386"/>
+            <a:ext cx="4826774" cy="3103254"/>
+          </a:xfrm>
+          <a:prstGeom prst="rect">
+            <a:avLst/>
+          </a:prstGeom>
+        </p:spPr>
+      </p:pic>
+      <p:sp>
+        <p:nvSpPr>
+          <p:cNvPr id="5" name="Content Placeholder 2">
+            <a:extLst>
+              <a:ext uri="{FF2B5EF4-FFF2-40B4-BE49-F238E27FC236}">
+                <a16:creationId xmlns:a16="http://schemas.microsoft.com/office/drawing/2014/main" id="{5A16B01D-D7F7-4E0E-ABB2-7A1DBF4D6F00}"/>
+              </a:ext>
+            </a:extLst>
+          </p:cNvPr>
+          <p:cNvSpPr txBox="1">
+            <a:spLocks/>
+          </p:cNvSpPr>
+          <p:nvPr/>
+        </p:nvSpPr>
+        <p:spPr>
+          <a:xfrm>
+            <a:off x="678401" y="1594806"/>
+            <a:ext cx="6175160" cy="4667250"/>
+          </a:xfrm>
+          <a:prstGeom prst="rect">
+            <a:avLst/>
+          </a:prstGeom>
+        </p:spPr>
+        <p:txBody>
+          <a:bodyPr vert="horz" lIns="91440" tIns="45720" rIns="91440" bIns="45720" rtlCol="0">
+            <a:normAutofit fontScale="85000" lnSpcReduction="20000"/>
+          </a:bodyPr>
+          <a:lstStyle>
+            <a:lvl1pPr marL="228600" indent="-228600" algn="l" defTabSz="914400" rtl="0" eaLnBrk="1" latinLnBrk="0" hangingPunct="1">
+              <a:lnSpc>
+                <a:spcPct val="90000"/>
+              </a:lnSpc>
+              <a:spcBef>
+                <a:spcPts val="1000"/>
+              </a:spcBef>
+              <a:buFont typeface="Arial" panose="020B0604020202020204" pitchFamily="34" charset="0"/>
+              <a:buChar char="•"/>
+              <a:defRPr sz="2800" kern="1200">
+                <a:solidFill>
+                  <a:schemeClr val="tx1"/>
+                </a:solidFill>
+                <a:latin typeface="+mn-lt"/>
+                <a:ea typeface="+mn-ea"/>
+                <a:cs typeface="+mn-cs"/>
+              </a:defRPr>
+            </a:lvl1pPr>
+            <a:lvl2pPr marL="685800" indent="-228600" algn="l" defTabSz="914400" rtl="0" eaLnBrk="1" latinLnBrk="0" hangingPunct="1">
+              <a:lnSpc>
+                <a:spcPct val="90000"/>
+              </a:lnSpc>
+              <a:spcBef>
+                <a:spcPts val="500"/>
+              </a:spcBef>
+              <a:buFont typeface="Arial" panose="020B0604020202020204" pitchFamily="34" charset="0"/>
+              <a:buChar char="•"/>
+              <a:defRPr sz="2400" kern="1200">
+                <a:solidFill>
+                  <a:schemeClr val="tx1"/>
+                </a:solidFill>
+                <a:latin typeface="+mn-lt"/>
+                <a:ea typeface="+mn-ea"/>
+                <a:cs typeface="+mn-cs"/>
+              </a:defRPr>
+            </a:lvl2pPr>
+            <a:lvl3pPr marL="1143000" indent="-228600" algn="l" defTabSz="914400" rtl="0" eaLnBrk="1" latinLnBrk="0" hangingPunct="1">
+              <a:lnSpc>
+                <a:spcPct val="90000"/>
+              </a:lnSpc>
+              <a:spcBef>
+                <a:spcPts val="500"/>
+              </a:spcBef>
+              <a:buFont typeface="Arial" panose="020B0604020202020204" pitchFamily="34" charset="0"/>
+              <a:buChar char="•"/>
+              <a:defRPr sz="2000" kern="1200">
+                <a:solidFill>
+                  <a:schemeClr val="tx1"/>
+                </a:solidFill>
+                <a:latin typeface="+mn-lt"/>
+                <a:ea typeface="+mn-ea"/>
+                <a:cs typeface="+mn-cs"/>
+              </a:defRPr>
+            </a:lvl3pPr>
+            <a:lvl4pPr marL="1600200" indent="-228600" algn="l" defTabSz="914400" rtl="0" eaLnBrk="1" latinLnBrk="0" hangingPunct="1">
+              <a:lnSpc>
+                <a:spcPct val="90000"/>
+              </a:lnSpc>
+              <a:spcBef>
+                <a:spcPts val="500"/>
+              </a:spcBef>
+              <a:buFont typeface="Arial" panose="020B0604020202020204" pitchFamily="34" charset="0"/>
+              <a:buChar char="•"/>
+              <a:defRPr sz="1800" kern="1200">
+                <a:solidFill>
+                  <a:schemeClr val="tx1"/>
+                </a:solidFill>
+                <a:latin typeface="+mn-lt"/>
+                <a:ea typeface="+mn-ea"/>
+                <a:cs typeface="+mn-cs"/>
+              </a:defRPr>
+            </a:lvl4pPr>
+            <a:lvl5pPr marL="2057400" indent="-228600" algn="l" defTabSz="914400" rtl="0" eaLnBrk="1" latinLnBrk="0" hangingPunct="1">
+              <a:lnSpc>
+                <a:spcPct val="90000"/>
+              </a:lnSpc>
+              <a:spcBef>
+                <a:spcPts val="500"/>
+              </a:spcBef>
+              <a:buFont typeface="Arial" panose="020B0604020202020204" pitchFamily="34" charset="0"/>
+              <a:buChar char="•"/>
+              <a:defRPr sz="1800" kern="1200">
+                <a:solidFill>
+                  <a:schemeClr val="tx1"/>
+                </a:solidFill>
+                <a:latin typeface="+mn-lt"/>
+                <a:ea typeface="+mn-ea"/>
+                <a:cs typeface="+mn-cs"/>
+              </a:defRPr>
+            </a:lvl5pPr>
+            <a:lvl6pPr marL="2514600" indent="-228600" algn="l" defTabSz="914400" rtl="0" eaLnBrk="1" latinLnBrk="0" hangingPunct="1">
+              <a:lnSpc>
+                <a:spcPct val="90000"/>
+              </a:lnSpc>
+              <a:spcBef>
+                <a:spcPts val="500"/>
+              </a:spcBef>
+              <a:buFont typeface="Arial" panose="020B0604020202020204" pitchFamily="34" charset="0"/>
+              <a:buChar char="•"/>
+              <a:defRPr sz="1800" kern="1200">
+                <a:solidFill>
+                  <a:schemeClr val="tx1"/>
+                </a:solidFill>
+                <a:latin typeface="+mn-lt"/>
+                <a:ea typeface="+mn-ea"/>
+                <a:cs typeface="+mn-cs"/>
+              </a:defRPr>
+            </a:lvl6pPr>
+            <a:lvl7pPr marL="2971800" indent="-228600" algn="l" defTabSz="914400" rtl="0" eaLnBrk="1" latinLnBrk="0" hangingPunct="1">
+              <a:lnSpc>
+                <a:spcPct val="90000"/>
+              </a:lnSpc>
+              <a:spcBef>
+                <a:spcPts val="500"/>
+              </a:spcBef>
+              <a:buFont typeface="Arial" panose="020B0604020202020204" pitchFamily="34" charset="0"/>
+              <a:buChar char="•"/>
+              <a:defRPr sz="1800" kern="1200">
+                <a:solidFill>
+                  <a:schemeClr val="tx1"/>
+                </a:solidFill>
+                <a:latin typeface="+mn-lt"/>
+                <a:ea typeface="+mn-ea"/>
+                <a:cs typeface="+mn-cs"/>
+              </a:defRPr>
+            </a:lvl7pPr>
+            <a:lvl8pPr marL="3429000" indent="-228600" algn="l" defTabSz="914400" rtl="0" eaLnBrk="1" latinLnBrk="0" hangingPunct="1">
+              <a:lnSpc>
+                <a:spcPct val="90000"/>
+              </a:lnSpc>
+              <a:spcBef>
+                <a:spcPts val="500"/>
+              </a:spcBef>
+              <a:buFont typeface="Arial" panose="020B0604020202020204" pitchFamily="34" charset="0"/>
+              <a:buChar char="•"/>
+              <a:defRPr sz="1800" kern="1200">
+                <a:solidFill>
+                  <a:schemeClr val="tx1"/>
+                </a:solidFill>
+                <a:latin typeface="+mn-lt"/>
+                <a:ea typeface="+mn-ea"/>
+                <a:cs typeface="+mn-cs"/>
+              </a:defRPr>
+            </a:lvl8pPr>
+            <a:lvl9pPr marL="3886200" indent="-228600" algn="l" defTabSz="914400" rtl="0" eaLnBrk="1" latinLnBrk="0" hangingPunct="1">
+              <a:lnSpc>
+                <a:spcPct val="90000"/>
+              </a:lnSpc>
+              <a:spcBef>
+                <a:spcPts val="500"/>
+              </a:spcBef>
+              <a:buFont typeface="Arial" panose="020B0604020202020204" pitchFamily="34" charset="0"/>
+              <a:buChar char="•"/>
+              <a:defRPr sz="1800" kern="1200">
+                <a:solidFill>
+                  <a:schemeClr val="tx1"/>
+                </a:solidFill>
+                <a:latin typeface="+mn-lt"/>
+                <a:ea typeface="+mn-ea"/>
+                <a:cs typeface="+mn-cs"/>
+              </a:defRPr>
+            </a:lvl9pPr>
+          </a:lstStyle>
+          <a:p>
+            <a:r>
+              <a:rPr lang="en-US" dirty="0"/>
+              <a:t>We can include information from a sequence of data using a recurrent connection on the hidden layer. This connections goes through these weights, </a:t>
+            </a:r>
+            <a:r>
+              <a:rPr lang="en-US" dirty="0" err="1"/>
+              <a:t>Whh</a:t>
+            </a:r>
+            <a:r>
+              <a:rPr lang="en-US" dirty="0"/>
+              <a:t> </a:t>
+            </a:r>
+          </a:p>
+          <a:p>
+            <a:r>
+              <a:rPr lang="en-US" dirty="0"/>
+              <a:t>After enrolling the network, we say the hidden layer at step t is a function of the previous hidden state multiplied by those weights .</a:t>
+            </a:r>
+          </a:p>
+          <a:p>
+            <a:r>
+              <a:rPr lang="en-US" dirty="0"/>
+              <a:t>The output of that layer is again multiplied by </a:t>
+            </a:r>
+            <a:r>
+              <a:rPr lang="en-US" dirty="0" err="1"/>
+              <a:t>Whh</a:t>
+            </a:r>
+            <a:r>
+              <a:rPr lang="en-US" dirty="0"/>
+              <a:t>. For every step we have in the </a:t>
+            </a:r>
+            <a:r>
+              <a:rPr lang="en-US" dirty="0" err="1"/>
+              <a:t>the</a:t>
+            </a:r>
+            <a:r>
+              <a:rPr lang="en-US" dirty="0"/>
+              <a:t> network, we are multiplying by the weights again and again</a:t>
+            </a:r>
+            <a:r>
+              <a:rPr lang="en-CA" dirty="0"/>
+              <a:t>.</a:t>
+            </a:r>
+          </a:p>
+          <a:p>
+            <a:r>
+              <a:rPr lang="en-US" dirty="0"/>
+              <a:t>And when we do backpropagation, that’s even more multiplication. These leads to problem where gradients going through network either get really small and vanish or get really large and explode.</a:t>
+            </a:r>
           </a:p>
         </p:txBody>
       </p:sp>
     </p:spTree>
     <p:extLst>
       <p:ext uri="{BB962C8B-B14F-4D97-AF65-F5344CB8AC3E}">
-        <p14:creationId xmlns:p14="http://schemas.microsoft.com/office/powerpoint/2010/main" val="2481473372"/>
+        <p14:creationId xmlns:p14="http://schemas.microsoft.com/office/powerpoint/2010/main" val="1771397953"/>
       </p:ext>
     </p:extLst>
   </p:cSld>
@@ -4866,7 +5308,7 @@
           <p:cNvPr id="2" name="Title 1">
             <a:extLst>
               <a:ext uri="{FF2B5EF4-FFF2-40B4-BE49-F238E27FC236}">
-                <a16:creationId xmlns:a16="http://schemas.microsoft.com/office/drawing/2014/main" id="{A76E450D-4B27-4674-B263-DACA0A0B388C}"/>
+                <a16:creationId xmlns:a16="http://schemas.microsoft.com/office/drawing/2014/main" id="{28A7771D-0227-40BD-A66A-1082F534CBE3}"/>
               </a:ext>
             </a:extLst>
           </p:cNvPr>
@@ -4883,9 +5325,10 @@
           <a:lstStyle/>
           <a:p>
             <a:r>
-              <a:rPr lang="en-IN" dirty="0"/>
-              <a:t>Hyperparameters</a:t>
-            </a:r>
+              <a:rPr lang="en-US" dirty="0"/>
+              <a:t>Vanishing or Exploding Gradients</a:t>
+            </a:r>
+            <a:endParaRPr lang="en-CA" dirty="0"/>
           </a:p>
         </p:txBody>
       </p:sp>
@@ -4894,7 +5337,7 @@
           <p:cNvPr id="3" name="Content Placeholder 2">
             <a:extLst>
               <a:ext uri="{FF2B5EF4-FFF2-40B4-BE49-F238E27FC236}">
-                <a16:creationId xmlns:a16="http://schemas.microsoft.com/office/drawing/2014/main" id="{A3215CCB-ED8E-49A8-A8D9-661F7169939F}"/>
+                <a16:creationId xmlns:a16="http://schemas.microsoft.com/office/drawing/2014/main" id="{C0BB3CD6-4DD4-490F-9F3A-46BFA6783957}"/>
               </a:ext>
             </a:extLst>
           </p:cNvPr>
@@ -4905,19 +5348,84 @@
             <p:ph idx="1"/>
           </p:nvPr>
         </p:nvSpPr>
-        <p:spPr/>
-        <p:txBody>
-          <a:bodyPr/>
-          <a:lstStyle/>
-          <a:p>
-            <a:endParaRPr lang="en-IN"/>
-          </a:p>
-        </p:txBody>
-      </p:sp>
+        <p:spPr>
+          <a:xfrm>
+            <a:off x="838200" y="1825624"/>
+            <a:ext cx="6574654" cy="4468643"/>
+          </a:xfrm>
+        </p:spPr>
+        <p:txBody>
+          <a:bodyPr>
+            <a:normAutofit lnSpcReduction="10000"/>
+          </a:bodyPr>
+          <a:lstStyle/>
+          <a:p>
+            <a:r>
+              <a:rPr lang="en-US" dirty="0"/>
+              <a:t>If we multiplying by some number a bunch of times, we will get two results except a couple of special cases.</a:t>
+            </a:r>
+          </a:p>
+          <a:p>
+            <a:r>
+              <a:rPr lang="en-US" dirty="0"/>
+              <a:t>If that number is less than 1, we will end up at 0</a:t>
+            </a:r>
+          </a:p>
+          <a:p>
+            <a:r>
+              <a:rPr lang="en-US" dirty="0"/>
+              <a:t>If it greater than 1, we will head towards infinity.</a:t>
+            </a:r>
+          </a:p>
+          <a:p>
+            <a:r>
+              <a:rPr lang="en-US" dirty="0"/>
+              <a:t>This happens to gradient in normal RNN, where they either vanish or explode.</a:t>
+            </a:r>
+          </a:p>
+          <a:p>
+            <a:r>
+              <a:rPr lang="en-US" dirty="0"/>
+              <a:t>Resulting in making it difficult for RNNs to learn long range interactions. </a:t>
+            </a:r>
+            <a:endParaRPr lang="en-CA" dirty="0"/>
+          </a:p>
+        </p:txBody>
+      </p:sp>
+      <p:pic>
+        <p:nvPicPr>
+          <p:cNvPr id="4" name="Picture 3">
+            <a:extLst>
+              <a:ext uri="{FF2B5EF4-FFF2-40B4-BE49-F238E27FC236}">
+                <a16:creationId xmlns:a16="http://schemas.microsoft.com/office/drawing/2014/main" id="{271E6C7B-37B4-485E-895E-84750FCBA1F8}"/>
+              </a:ext>
+            </a:extLst>
+          </p:cNvPr>
+          <p:cNvPicPr>
+            <a:picLocks noChangeAspect="1"/>
+          </p:cNvPicPr>
+          <p:nvPr/>
+        </p:nvPicPr>
+        <p:blipFill>
+          <a:blip r:embed="rId2"/>
+          <a:stretch>
+            <a:fillRect/>
+          </a:stretch>
+        </p:blipFill>
+        <p:spPr>
+          <a:xfrm>
+            <a:off x="7750206" y="1825625"/>
+            <a:ext cx="4241598" cy="2838095"/>
+          </a:xfrm>
+          <a:prstGeom prst="rect">
+            <a:avLst/>
+          </a:prstGeom>
+        </p:spPr>
+      </p:pic>
     </p:spTree>
     <p:extLst>
       <p:ext uri="{BB962C8B-B14F-4D97-AF65-F5344CB8AC3E}">
-        <p14:creationId xmlns:p14="http://schemas.microsoft.com/office/powerpoint/2010/main" val="3307515375"/>
+        <p14:creationId xmlns:p14="http://schemas.microsoft.com/office/powerpoint/2010/main" val="3504506075"/>
       </p:ext>
     </p:extLst>
   </p:cSld>
@@ -4949,7 +5457,7 @@
           <p:cNvPr id="2" name="Title 1">
             <a:extLst>
               <a:ext uri="{FF2B5EF4-FFF2-40B4-BE49-F238E27FC236}">
-                <a16:creationId xmlns:a16="http://schemas.microsoft.com/office/drawing/2014/main" id="{584CD6A2-C342-4419-B6DC-975AA0B7B94E}"/>
+                <a16:creationId xmlns:a16="http://schemas.microsoft.com/office/drawing/2014/main" id="{75431B38-C76F-40EB-9CBF-8E9E3DEFD381}"/>
               </a:ext>
             </a:extLst>
           </p:cNvPr>
@@ -4966,9 +5474,10 @@
           <a:lstStyle/>
           <a:p>
             <a:r>
-              <a:rPr lang="en-IN" dirty="0"/>
-              <a:t>Script Generation </a:t>
-            </a:r>
+              <a:rPr lang="en-US" dirty="0"/>
+              <a:t>RNN Cell</a:t>
+            </a:r>
+            <a:endParaRPr lang="en-CA" dirty="0"/>
           </a:p>
         </p:txBody>
       </p:sp>
@@ -4977,7 +5486,7 @@
           <p:cNvPr id="3" name="Content Placeholder 2">
             <a:extLst>
               <a:ext uri="{FF2B5EF4-FFF2-40B4-BE49-F238E27FC236}">
-                <a16:creationId xmlns:a16="http://schemas.microsoft.com/office/drawing/2014/main" id="{ED1C0153-170A-46B9-BDC7-89EA21C485D5}"/>
+                <a16:creationId xmlns:a16="http://schemas.microsoft.com/office/drawing/2014/main" id="{798C8D91-ED8A-4840-B147-7A181CA16D71}"/>
               </a:ext>
             </a:extLst>
           </p:cNvPr>
@@ -4988,19 +5497,70 @@
             <p:ph idx="1"/>
           </p:nvPr>
         </p:nvSpPr>
-        <p:spPr/>
+        <p:spPr>
+          <a:xfrm>
+            <a:off x="838201" y="1825625"/>
+            <a:ext cx="6050872" cy="4667250"/>
+          </a:xfrm>
+        </p:spPr>
         <p:txBody>
           <a:bodyPr/>
           <a:lstStyle/>
           <a:p>
-            <a:endParaRPr lang="en-IN"/>
-          </a:p>
-        </p:txBody>
-      </p:sp>
+            <a:r>
+              <a:rPr lang="en-US" dirty="0"/>
+              <a:t>We can think of RNNs as a bunch of cells with inputs and outputs.</a:t>
+            </a:r>
+          </a:p>
+          <a:p>
+            <a:r>
+              <a:rPr lang="en-US" dirty="0"/>
+              <a:t>Inside the cell, we have network layers, such as the sigmoid layer labelled with a sigma here.</a:t>
+            </a:r>
+          </a:p>
+          <a:p>
+            <a:r>
+              <a:rPr lang="en-US" dirty="0"/>
+              <a:t>To solve the problem of the vanishing gradients, we can use more complicated cells called long short-term memory or LSTM </a:t>
+            </a:r>
+            <a:endParaRPr lang="en-CA" dirty="0"/>
+          </a:p>
+        </p:txBody>
+      </p:sp>
+      <p:pic>
+        <p:nvPicPr>
+          <p:cNvPr id="4" name="Picture 3">
+            <a:extLst>
+              <a:ext uri="{FF2B5EF4-FFF2-40B4-BE49-F238E27FC236}">
+                <a16:creationId xmlns:a16="http://schemas.microsoft.com/office/drawing/2014/main" id="{D36DD25A-6446-4B5E-BCCE-22C38E091C64}"/>
+              </a:ext>
+            </a:extLst>
+          </p:cNvPr>
+          <p:cNvPicPr>
+            <a:picLocks noChangeAspect="1"/>
+          </p:cNvPicPr>
+          <p:nvPr/>
+        </p:nvPicPr>
+        <p:blipFill>
+          <a:blip r:embed="rId2"/>
+          <a:stretch>
+            <a:fillRect/>
+          </a:stretch>
+        </p:blipFill>
+        <p:spPr>
+          <a:xfrm>
+            <a:off x="7059314" y="1825625"/>
+            <a:ext cx="4805553" cy="2935457"/>
+          </a:xfrm>
+          <a:prstGeom prst="rect">
+            <a:avLst/>
+          </a:prstGeom>
+        </p:spPr>
+      </p:pic>
     </p:spTree>
     <p:extLst>
       <p:ext uri="{BB962C8B-B14F-4D97-AF65-F5344CB8AC3E}">
-        <p14:creationId xmlns:p14="http://schemas.microsoft.com/office/powerpoint/2010/main" val="4097401390"/>
+        <p14:creationId xmlns:p14="http://schemas.microsoft.com/office/powerpoint/2010/main" val="3699617439"/>
       </p:ext>
     </p:extLst>
   </p:cSld>
@@ -5032,7 +5592,7 @@
           <p:cNvPr id="2" name="Title 1">
             <a:extLst>
               <a:ext uri="{FF2B5EF4-FFF2-40B4-BE49-F238E27FC236}">
-                <a16:creationId xmlns:a16="http://schemas.microsoft.com/office/drawing/2014/main" id="{BADB776B-6812-42DF-A5DC-3926B2391B64}"/>
+                <a16:creationId xmlns:a16="http://schemas.microsoft.com/office/drawing/2014/main" id="{33CA8870-3263-4584-8658-7253B0D7BD52}"/>
               </a:ext>
             </a:extLst>
           </p:cNvPr>
@@ -5049,9 +5609,10 @@
           <a:lstStyle/>
           <a:p>
             <a:r>
-              <a:rPr lang="en-IN" dirty="0"/>
-              <a:t>Saving model as a checkpoint file</a:t>
-            </a:r>
+              <a:rPr lang="en-US" dirty="0"/>
+              <a:t>LSTM Cell</a:t>
+            </a:r>
+            <a:endParaRPr lang="en-CA" dirty="0"/>
           </a:p>
         </p:txBody>
       </p:sp>
@@ -5060,7 +5621,7 @@
           <p:cNvPr id="3" name="Content Placeholder 2">
             <a:extLst>
               <a:ext uri="{FF2B5EF4-FFF2-40B4-BE49-F238E27FC236}">
-                <a16:creationId xmlns:a16="http://schemas.microsoft.com/office/drawing/2014/main" id="{22851A52-0B9D-4567-BD41-05DBF753F495}"/>
+                <a16:creationId xmlns:a16="http://schemas.microsoft.com/office/drawing/2014/main" id="{C1F0658B-CEB9-47A3-9448-E0DA7F6B4AEB}"/>
               </a:ext>
             </a:extLst>
           </p:cNvPr>
@@ -5071,19 +5632,906 @@
             <p:ph idx="1"/>
           </p:nvPr>
         </p:nvSpPr>
-        <p:spPr/>
-        <p:txBody>
-          <a:bodyPr/>
-          <a:lstStyle/>
-          <a:p>
-            <a:endParaRPr lang="en-IN"/>
-          </a:p>
-        </p:txBody>
-      </p:sp>
+        <p:spPr>
+          <a:xfrm>
+            <a:off x="838200" y="1825625"/>
+            <a:ext cx="6281691" cy="4351338"/>
+          </a:xfrm>
+        </p:spPr>
+        <p:txBody>
+          <a:bodyPr>
+            <a:normAutofit fontScale="62500" lnSpcReduction="20000"/>
+          </a:bodyPr>
+          <a:lstStyle/>
+          <a:p>
+            <a:r>
+              <a:rPr lang="en-US" dirty="0"/>
+              <a:t>Let’s break down LSTM to understand:</a:t>
+            </a:r>
+          </a:p>
+          <a:p>
+            <a:r>
+              <a:rPr lang="en-US" dirty="0"/>
+              <a:t>The key addition here is the cell state labelled C</a:t>
+            </a:r>
+          </a:p>
+          <a:p>
+            <a:r>
+              <a:rPr lang="en-US" dirty="0"/>
+              <a:t>In this cell, there are four network layers shown as yellow boxes. Each of them with their own weights. The layers labelled with sigma are sigmoid and tanh is the hyperbolic tangent function. Tanh is similar to a sigmoid in that it squashes input, but the output is between -1 to 1 instead of 0 and 1</a:t>
+            </a:r>
+          </a:p>
+          <a:p>
+            <a:r>
+              <a:rPr lang="en-US" dirty="0"/>
+              <a:t>The red circles are point-wise or element-wise operations i.e. they operate on matrices element by element</a:t>
+            </a:r>
+          </a:p>
+          <a:p>
+            <a:r>
+              <a:rPr lang="en-US" dirty="0"/>
+              <a:t>The main improvement here is through the cell state. The cell state goes through LSTM cell with little interaction allowing information to flow easily through the cells. The cell state is modified only through element-wise operation which functions as gates.</a:t>
+            </a:r>
+          </a:p>
+          <a:p>
+            <a:r>
+              <a:rPr lang="en-US" dirty="0"/>
+              <a:t>And the hidden state is now calculated through cell state, then passed on </a:t>
+            </a:r>
+          </a:p>
+          <a:p>
+            <a:endParaRPr lang="en-CA" dirty="0"/>
+          </a:p>
+        </p:txBody>
+      </p:sp>
+      <p:pic>
+        <p:nvPicPr>
+          <p:cNvPr id="4" name="Picture 3">
+            <a:extLst>
+              <a:ext uri="{FF2B5EF4-FFF2-40B4-BE49-F238E27FC236}">
+                <a16:creationId xmlns:a16="http://schemas.microsoft.com/office/drawing/2014/main" id="{2FF862D4-242F-4E2A-A102-DC74840C4364}"/>
+              </a:ext>
+            </a:extLst>
+          </p:cNvPr>
+          <p:cNvPicPr>
+            <a:picLocks noChangeAspect="1"/>
+          </p:cNvPicPr>
+          <p:nvPr/>
+        </p:nvPicPr>
+        <p:blipFill>
+          <a:blip r:embed="rId2"/>
+          <a:stretch>
+            <a:fillRect/>
+          </a:stretch>
+        </p:blipFill>
+        <p:spPr>
+          <a:xfrm>
+            <a:off x="6924583" y="1690688"/>
+            <a:ext cx="5022581" cy="2938959"/>
+          </a:xfrm>
+          <a:prstGeom prst="rect">
+            <a:avLst/>
+          </a:prstGeom>
+        </p:spPr>
+      </p:pic>
     </p:spTree>
     <p:extLst>
       <p:ext uri="{BB962C8B-B14F-4D97-AF65-F5344CB8AC3E}">
-        <p14:creationId xmlns:p14="http://schemas.microsoft.com/office/powerpoint/2010/main" val="1603034709"/>
+        <p14:creationId xmlns:p14="http://schemas.microsoft.com/office/powerpoint/2010/main" val="3298954363"/>
+      </p:ext>
+    </p:extLst>
+  </p:cSld>
+  <p:clrMapOvr>
+    <a:masterClrMapping/>
+  </p:clrMapOvr>
+</p:sld>
+</file>
+
+<file path=ppt/slides/slide14.xml><?xml version="1.0" encoding="utf-8"?>
+<p:sld xmlns:a="http://schemas.openxmlformats.org/drawingml/2006/main" xmlns:r="http://schemas.openxmlformats.org/officeDocument/2006/relationships" xmlns:p="http://schemas.openxmlformats.org/presentationml/2006/main">
+  <p:cSld>
+    <p:spTree>
+      <p:nvGrpSpPr>
+        <p:cNvPr id="1" name=""/>
+        <p:cNvGrpSpPr/>
+        <p:nvPr/>
+      </p:nvGrpSpPr>
+      <p:grpSpPr>
+        <a:xfrm>
+          <a:off x="0" y="0"/>
+          <a:ext cx="0" cy="0"/>
+          <a:chOff x="0" y="0"/>
+          <a:chExt cx="0" cy="0"/>
+        </a:xfrm>
+      </p:grpSpPr>
+      <p:sp>
+        <p:nvSpPr>
+          <p:cNvPr id="2" name="Title 1">
+            <a:extLst>
+              <a:ext uri="{FF2B5EF4-FFF2-40B4-BE49-F238E27FC236}">
+                <a16:creationId xmlns:a16="http://schemas.microsoft.com/office/drawing/2014/main" id="{33CA8870-3263-4584-8658-7253B0D7BD52}"/>
+              </a:ext>
+            </a:extLst>
+          </p:cNvPr>
+          <p:cNvSpPr>
+            <a:spLocks noGrp="1"/>
+          </p:cNvSpPr>
+          <p:nvPr>
+            <p:ph type="title"/>
+          </p:nvPr>
+        </p:nvSpPr>
+        <p:spPr/>
+        <p:txBody>
+          <a:bodyPr/>
+          <a:lstStyle/>
+          <a:p>
+            <a:r>
+              <a:rPr lang="en-US" dirty="0"/>
+              <a:t>FORGET Gate</a:t>
+            </a:r>
+            <a:endParaRPr lang="en-CA" dirty="0"/>
+          </a:p>
+        </p:txBody>
+      </p:sp>
+      <p:sp>
+        <p:nvSpPr>
+          <p:cNvPr id="3" name="Content Placeholder 2">
+            <a:extLst>
+              <a:ext uri="{FF2B5EF4-FFF2-40B4-BE49-F238E27FC236}">
+                <a16:creationId xmlns:a16="http://schemas.microsoft.com/office/drawing/2014/main" id="{C1F0658B-CEB9-47A3-9448-E0DA7F6B4AEB}"/>
+              </a:ext>
+            </a:extLst>
+          </p:cNvPr>
+          <p:cNvSpPr>
+            <a:spLocks noGrp="1"/>
+          </p:cNvSpPr>
+          <p:nvPr>
+            <p:ph idx="1"/>
+          </p:nvPr>
+        </p:nvSpPr>
+        <p:spPr>
+          <a:xfrm>
+            <a:off x="838200" y="1825625"/>
+            <a:ext cx="6281691" cy="4351338"/>
+          </a:xfrm>
+        </p:spPr>
+        <p:txBody>
+          <a:bodyPr>
+            <a:normAutofit fontScale="85000" lnSpcReduction="20000"/>
+          </a:bodyPr>
+          <a:lstStyle/>
+          <a:p>
+            <a:r>
+              <a:rPr lang="en-US" dirty="0"/>
+              <a:t>The first gate is the forget gate. The values coming out of sigmoid layer are between 0 and 1. Then they are multiplied element-wise with the cell state. </a:t>
+            </a:r>
+          </a:p>
+          <a:p>
+            <a:r>
+              <a:rPr lang="en-US" dirty="0"/>
+              <a:t>So the values from this layer close to 0 will shut off certain elements in the cell state. Effectively, forgetting that information going forward. Conversely, values close to 1 will allow information to pass through unchanged. </a:t>
+            </a:r>
+          </a:p>
+          <a:p>
+            <a:r>
+              <a:rPr lang="en-US" dirty="0"/>
+              <a:t>This is helpful, because the network can learn to forget information that causes incorrect predictions. On the other hand, long range information that are helpful is allowed to flow through freely</a:t>
+            </a:r>
+          </a:p>
+          <a:p>
+            <a:endParaRPr lang="en-US" dirty="0"/>
+          </a:p>
+          <a:p>
+            <a:endParaRPr lang="en-US" dirty="0"/>
+          </a:p>
+          <a:p>
+            <a:endParaRPr lang="en-CA" dirty="0"/>
+          </a:p>
+        </p:txBody>
+      </p:sp>
+      <p:pic>
+        <p:nvPicPr>
+          <p:cNvPr id="5" name="Picture 4">
+            <a:extLst>
+              <a:ext uri="{FF2B5EF4-FFF2-40B4-BE49-F238E27FC236}">
+                <a16:creationId xmlns:a16="http://schemas.microsoft.com/office/drawing/2014/main" id="{FBF89480-D9EE-4931-91A3-9D2152B31DA2}"/>
+              </a:ext>
+            </a:extLst>
+          </p:cNvPr>
+          <p:cNvPicPr>
+            <a:picLocks noChangeAspect="1"/>
+          </p:cNvPicPr>
+          <p:nvPr/>
+        </p:nvPicPr>
+        <p:blipFill>
+          <a:blip r:embed="rId2"/>
+          <a:stretch>
+            <a:fillRect/>
+          </a:stretch>
+        </p:blipFill>
+        <p:spPr>
+          <a:xfrm>
+            <a:off x="7315252" y="1825625"/>
+            <a:ext cx="4362324" cy="2684231"/>
+          </a:xfrm>
+          <a:prstGeom prst="rect">
+            <a:avLst/>
+          </a:prstGeom>
+        </p:spPr>
+      </p:pic>
+    </p:spTree>
+    <p:extLst>
+      <p:ext uri="{BB962C8B-B14F-4D97-AF65-F5344CB8AC3E}">
+        <p14:creationId xmlns:p14="http://schemas.microsoft.com/office/powerpoint/2010/main" val="3639906559"/>
+      </p:ext>
+    </p:extLst>
+  </p:cSld>
+  <p:clrMapOvr>
+    <a:masterClrMapping/>
+  </p:clrMapOvr>
+</p:sld>
+</file>
+
+<file path=ppt/slides/slide15.xml><?xml version="1.0" encoding="utf-8"?>
+<p:sld xmlns:a="http://schemas.openxmlformats.org/drawingml/2006/main" xmlns:r="http://schemas.openxmlformats.org/officeDocument/2006/relationships" xmlns:p="http://schemas.openxmlformats.org/presentationml/2006/main">
+  <p:cSld>
+    <p:spTree>
+      <p:nvGrpSpPr>
+        <p:cNvPr id="1" name=""/>
+        <p:cNvGrpSpPr/>
+        <p:nvPr/>
+      </p:nvGrpSpPr>
+      <p:grpSpPr>
+        <a:xfrm>
+          <a:off x="0" y="0"/>
+          <a:ext cx="0" cy="0"/>
+          <a:chOff x="0" y="0"/>
+          <a:chExt cx="0" cy="0"/>
+        </a:xfrm>
+      </p:grpSpPr>
+      <p:sp>
+        <p:nvSpPr>
+          <p:cNvPr id="2" name="Title 1">
+            <a:extLst>
+              <a:ext uri="{FF2B5EF4-FFF2-40B4-BE49-F238E27FC236}">
+                <a16:creationId xmlns:a16="http://schemas.microsoft.com/office/drawing/2014/main" id="{33CA8870-3263-4584-8658-7253B0D7BD52}"/>
+              </a:ext>
+            </a:extLst>
+          </p:cNvPr>
+          <p:cNvSpPr>
+            <a:spLocks noGrp="1"/>
+          </p:cNvSpPr>
+          <p:nvPr>
+            <p:ph type="title"/>
+          </p:nvPr>
+        </p:nvSpPr>
+        <p:spPr/>
+        <p:txBody>
+          <a:bodyPr/>
+          <a:lstStyle/>
+          <a:p>
+            <a:r>
+              <a:rPr lang="en-US" dirty="0"/>
+              <a:t>Update Gate</a:t>
+            </a:r>
+            <a:endParaRPr lang="en-CA" dirty="0"/>
+          </a:p>
+        </p:txBody>
+      </p:sp>
+      <p:sp>
+        <p:nvSpPr>
+          <p:cNvPr id="3" name="Content Placeholder 2">
+            <a:extLst>
+              <a:ext uri="{FF2B5EF4-FFF2-40B4-BE49-F238E27FC236}">
+                <a16:creationId xmlns:a16="http://schemas.microsoft.com/office/drawing/2014/main" id="{C1F0658B-CEB9-47A3-9448-E0DA7F6B4AEB}"/>
+              </a:ext>
+            </a:extLst>
+          </p:cNvPr>
+          <p:cNvSpPr>
+            <a:spLocks noGrp="1"/>
+          </p:cNvSpPr>
+          <p:nvPr>
+            <p:ph idx="1"/>
+          </p:nvPr>
+        </p:nvSpPr>
+        <p:spPr>
+          <a:xfrm>
+            <a:off x="838200" y="1825625"/>
+            <a:ext cx="6281691" cy="4351338"/>
+          </a:xfrm>
+        </p:spPr>
+        <p:txBody>
+          <a:bodyPr>
+            <a:normAutofit/>
+          </a:bodyPr>
+          <a:lstStyle/>
+          <a:p>
+            <a:r>
+              <a:rPr lang="en-US" dirty="0"/>
+              <a:t>The next gate updates the cell state from the input and previous hidden state. </a:t>
+            </a:r>
+          </a:p>
+          <a:p>
+            <a:r>
+              <a:rPr lang="en-US" dirty="0"/>
+              <a:t>The tanh layer output is added to the cell state and again gated by a sigmoid  layer. </a:t>
+            </a:r>
+          </a:p>
+          <a:p>
+            <a:r>
+              <a:rPr lang="en-US" dirty="0"/>
+              <a:t>In this way, the cell state can be updated in the step and passed along to the next cell</a:t>
+            </a:r>
+          </a:p>
+          <a:p>
+            <a:endParaRPr lang="en-US" dirty="0"/>
+          </a:p>
+          <a:p>
+            <a:endParaRPr lang="en-CA" dirty="0"/>
+          </a:p>
+        </p:txBody>
+      </p:sp>
+      <p:pic>
+        <p:nvPicPr>
+          <p:cNvPr id="5" name="Picture 4">
+            <a:extLst>
+              <a:ext uri="{FF2B5EF4-FFF2-40B4-BE49-F238E27FC236}">
+                <a16:creationId xmlns:a16="http://schemas.microsoft.com/office/drawing/2014/main" id="{4556D281-F81B-4C7B-9B58-B9ECEA207552}"/>
+              </a:ext>
+            </a:extLst>
+          </p:cNvPr>
+          <p:cNvPicPr>
+            <a:picLocks noChangeAspect="1"/>
+          </p:cNvPicPr>
+          <p:nvPr/>
+        </p:nvPicPr>
+        <p:blipFill>
+          <a:blip r:embed="rId2"/>
+          <a:stretch>
+            <a:fillRect/>
+          </a:stretch>
+        </p:blipFill>
+        <p:spPr>
+          <a:xfrm>
+            <a:off x="6638273" y="1690688"/>
+            <a:ext cx="5367296" cy="3235910"/>
+          </a:xfrm>
+          <a:prstGeom prst="rect">
+            <a:avLst/>
+          </a:prstGeom>
+        </p:spPr>
+      </p:pic>
+    </p:spTree>
+    <p:extLst>
+      <p:ext uri="{BB962C8B-B14F-4D97-AF65-F5344CB8AC3E}">
+        <p14:creationId xmlns:p14="http://schemas.microsoft.com/office/powerpoint/2010/main" val="3407977505"/>
+      </p:ext>
+    </p:extLst>
+  </p:cSld>
+  <p:clrMapOvr>
+    <a:masterClrMapping/>
+  </p:clrMapOvr>
+</p:sld>
+</file>
+
+<file path=ppt/slides/slide16.xml><?xml version="1.0" encoding="utf-8"?>
+<p:sld xmlns:a="http://schemas.openxmlformats.org/drawingml/2006/main" xmlns:r="http://schemas.openxmlformats.org/officeDocument/2006/relationships" xmlns:p="http://schemas.openxmlformats.org/presentationml/2006/main">
+  <p:cSld>
+    <p:spTree>
+      <p:nvGrpSpPr>
+        <p:cNvPr id="1" name=""/>
+        <p:cNvGrpSpPr/>
+        <p:nvPr/>
+      </p:nvGrpSpPr>
+      <p:grpSpPr>
+        <a:xfrm>
+          <a:off x="0" y="0"/>
+          <a:ext cx="0" cy="0"/>
+          <a:chOff x="0" y="0"/>
+          <a:chExt cx="0" cy="0"/>
+        </a:xfrm>
+      </p:grpSpPr>
+      <p:sp>
+        <p:nvSpPr>
+          <p:cNvPr id="2" name="Title 1">
+            <a:extLst>
+              <a:ext uri="{FF2B5EF4-FFF2-40B4-BE49-F238E27FC236}">
+                <a16:creationId xmlns:a16="http://schemas.microsoft.com/office/drawing/2014/main" id="{33CA8870-3263-4584-8658-7253B0D7BD52}"/>
+              </a:ext>
+            </a:extLst>
+          </p:cNvPr>
+          <p:cNvSpPr>
+            <a:spLocks noGrp="1"/>
+          </p:cNvSpPr>
+          <p:nvPr>
+            <p:ph type="title"/>
+          </p:nvPr>
+        </p:nvSpPr>
+        <p:spPr/>
+        <p:txBody>
+          <a:bodyPr/>
+          <a:lstStyle/>
+          <a:p>
+            <a:r>
+              <a:rPr lang="en-US" dirty="0"/>
+              <a:t>Cell State to Hidden Output</a:t>
+            </a:r>
+            <a:endParaRPr lang="en-CA" dirty="0"/>
+          </a:p>
+        </p:txBody>
+      </p:sp>
+      <p:sp>
+        <p:nvSpPr>
+          <p:cNvPr id="3" name="Content Placeholder 2">
+            <a:extLst>
+              <a:ext uri="{FF2B5EF4-FFF2-40B4-BE49-F238E27FC236}">
+                <a16:creationId xmlns:a16="http://schemas.microsoft.com/office/drawing/2014/main" id="{C1F0658B-CEB9-47A3-9448-E0DA7F6B4AEB}"/>
+              </a:ext>
+            </a:extLst>
+          </p:cNvPr>
+          <p:cNvSpPr>
+            <a:spLocks noGrp="1"/>
+          </p:cNvSpPr>
+          <p:nvPr>
+            <p:ph idx="1"/>
+          </p:nvPr>
+        </p:nvSpPr>
+        <p:spPr>
+          <a:xfrm>
+            <a:off x="838200" y="1825625"/>
+            <a:ext cx="6281691" cy="4351338"/>
+          </a:xfrm>
+        </p:spPr>
+        <p:txBody>
+          <a:bodyPr>
+            <a:normAutofit/>
+          </a:bodyPr>
+          <a:lstStyle/>
+          <a:p>
+            <a:r>
+              <a:rPr lang="en-US" dirty="0"/>
+              <a:t>Here, the cell state is used to produce the hidden state which is sent to the next hidden cell as well as to higher layers. It’s the arrow pointing up here</a:t>
+            </a:r>
+          </a:p>
+          <a:p>
+            <a:r>
+              <a:rPr lang="en-US" dirty="0"/>
+              <a:t>The cell state is passed through another tanh then gated again with another sigmoid layer. All these sigmoid gates let the network learn which information to keep and which information to get rid of.</a:t>
+            </a:r>
+          </a:p>
+          <a:p>
+            <a:endParaRPr lang="en-US" dirty="0"/>
+          </a:p>
+          <a:p>
+            <a:endParaRPr lang="en-US" dirty="0"/>
+          </a:p>
+          <a:p>
+            <a:endParaRPr lang="en-CA" dirty="0"/>
+          </a:p>
+        </p:txBody>
+      </p:sp>
+      <p:pic>
+        <p:nvPicPr>
+          <p:cNvPr id="4" name="Picture 3">
+            <a:extLst>
+              <a:ext uri="{FF2B5EF4-FFF2-40B4-BE49-F238E27FC236}">
+                <a16:creationId xmlns:a16="http://schemas.microsoft.com/office/drawing/2014/main" id="{F773FEF3-F428-4CD2-99E9-B5956621D06D}"/>
+              </a:ext>
+            </a:extLst>
+          </p:cNvPr>
+          <p:cNvPicPr>
+            <a:picLocks noChangeAspect="1"/>
+          </p:cNvPicPr>
+          <p:nvPr/>
+        </p:nvPicPr>
+        <p:blipFill>
+          <a:blip r:embed="rId2"/>
+          <a:stretch>
+            <a:fillRect/>
+          </a:stretch>
+        </p:blipFill>
+        <p:spPr>
+          <a:xfrm>
+            <a:off x="7119891" y="1935496"/>
+            <a:ext cx="4951830" cy="2987007"/>
+          </a:xfrm>
+          <a:prstGeom prst="rect">
+            <a:avLst/>
+          </a:prstGeom>
+        </p:spPr>
+      </p:pic>
+    </p:spTree>
+    <p:extLst>
+      <p:ext uri="{BB962C8B-B14F-4D97-AF65-F5344CB8AC3E}">
+        <p14:creationId xmlns:p14="http://schemas.microsoft.com/office/powerpoint/2010/main" val="3984414527"/>
+      </p:ext>
+    </p:extLst>
+  </p:cSld>
+  <p:clrMapOvr>
+    <a:masterClrMapping/>
+  </p:clrMapOvr>
+</p:sld>
+</file>
+
+<file path=ppt/slides/slide17.xml><?xml version="1.0" encoding="utf-8"?>
+<p:sld xmlns:a="http://schemas.openxmlformats.org/drawingml/2006/main" xmlns:r="http://schemas.openxmlformats.org/officeDocument/2006/relationships" xmlns:p="http://schemas.openxmlformats.org/presentationml/2006/main">
+  <p:cSld>
+    <p:spTree>
+      <p:nvGrpSpPr>
+        <p:cNvPr id="1" name=""/>
+        <p:cNvGrpSpPr/>
+        <p:nvPr/>
+      </p:nvGrpSpPr>
+      <p:grpSpPr>
+        <a:xfrm>
+          <a:off x="0" y="0"/>
+          <a:ext cx="0" cy="0"/>
+          <a:chOff x="0" y="0"/>
+          <a:chExt cx="0" cy="0"/>
+        </a:xfrm>
+      </p:grpSpPr>
+      <p:sp>
+        <p:nvSpPr>
+          <p:cNvPr id="2" name="Title 1">
+            <a:extLst>
+              <a:ext uri="{FF2B5EF4-FFF2-40B4-BE49-F238E27FC236}">
+                <a16:creationId xmlns:a16="http://schemas.microsoft.com/office/drawing/2014/main" id="{33CA8870-3263-4584-8658-7253B0D7BD52}"/>
+              </a:ext>
+            </a:extLst>
+          </p:cNvPr>
+          <p:cNvSpPr>
+            <a:spLocks noGrp="1"/>
+          </p:cNvSpPr>
+          <p:nvPr>
+            <p:ph type="title"/>
+          </p:nvPr>
+        </p:nvSpPr>
+        <p:spPr/>
+        <p:txBody>
+          <a:bodyPr/>
+          <a:lstStyle/>
+          <a:p>
+            <a:r>
+              <a:rPr lang="en-US" dirty="0"/>
+              <a:t>LSTM Cell</a:t>
+            </a:r>
+            <a:endParaRPr lang="en-CA" dirty="0"/>
+          </a:p>
+        </p:txBody>
+      </p:sp>
+      <p:sp>
+        <p:nvSpPr>
+          <p:cNvPr id="3" name="Content Placeholder 2">
+            <a:extLst>
+              <a:ext uri="{FF2B5EF4-FFF2-40B4-BE49-F238E27FC236}">
+                <a16:creationId xmlns:a16="http://schemas.microsoft.com/office/drawing/2014/main" id="{C1F0658B-CEB9-47A3-9448-E0DA7F6B4AEB}"/>
+              </a:ext>
+            </a:extLst>
+          </p:cNvPr>
+          <p:cNvSpPr>
+            <a:spLocks noGrp="1"/>
+          </p:cNvSpPr>
+          <p:nvPr>
+            <p:ph idx="1"/>
+          </p:nvPr>
+        </p:nvSpPr>
+        <p:spPr>
+          <a:xfrm>
+            <a:off x="838200" y="1825625"/>
+            <a:ext cx="6281691" cy="4351338"/>
+          </a:xfrm>
+        </p:spPr>
+        <p:txBody>
+          <a:bodyPr>
+            <a:normAutofit/>
+          </a:bodyPr>
+          <a:lstStyle/>
+          <a:p>
+            <a:r>
+              <a:rPr lang="en-US" dirty="0"/>
+              <a:t>Putting all this together, the LSTM cell consists of a cell state with a bunch of gates used to update it, and leak it out to the hidden state. </a:t>
+            </a:r>
+          </a:p>
+          <a:p>
+            <a:r>
+              <a:rPr lang="en-US" dirty="0"/>
+              <a:t>This is just the basic LSTM. There are multiple variations and lot of ongoing experimentation into improving these. </a:t>
+            </a:r>
+          </a:p>
+          <a:p>
+            <a:r>
+              <a:rPr lang="en-US" dirty="0"/>
+              <a:t>They are also stacked into deeper layer. We just send the output from one cell to the input of another </a:t>
+            </a:r>
+            <a:endParaRPr lang="en-CA" dirty="0"/>
+          </a:p>
+        </p:txBody>
+      </p:sp>
+      <p:pic>
+        <p:nvPicPr>
+          <p:cNvPr id="4" name="Picture 3">
+            <a:extLst>
+              <a:ext uri="{FF2B5EF4-FFF2-40B4-BE49-F238E27FC236}">
+                <a16:creationId xmlns:a16="http://schemas.microsoft.com/office/drawing/2014/main" id="{2FF862D4-242F-4E2A-A102-DC74840C4364}"/>
+              </a:ext>
+            </a:extLst>
+          </p:cNvPr>
+          <p:cNvPicPr>
+            <a:picLocks noChangeAspect="1"/>
+          </p:cNvPicPr>
+          <p:nvPr/>
+        </p:nvPicPr>
+        <p:blipFill>
+          <a:blip r:embed="rId2"/>
+          <a:stretch>
+            <a:fillRect/>
+          </a:stretch>
+        </p:blipFill>
+        <p:spPr>
+          <a:xfrm>
+            <a:off x="6924583" y="1690688"/>
+            <a:ext cx="5022581" cy="2938959"/>
+          </a:xfrm>
+          <a:prstGeom prst="rect">
+            <a:avLst/>
+          </a:prstGeom>
+        </p:spPr>
+      </p:pic>
+    </p:spTree>
+    <p:extLst>
+      <p:ext uri="{BB962C8B-B14F-4D97-AF65-F5344CB8AC3E}">
+        <p14:creationId xmlns:p14="http://schemas.microsoft.com/office/powerpoint/2010/main" val="3584256100"/>
+      </p:ext>
+    </p:extLst>
+  </p:cSld>
+  <p:clrMapOvr>
+    <a:masterClrMapping/>
+  </p:clrMapOvr>
+</p:sld>
+</file>
+
+<file path=ppt/slides/slide18.xml><?xml version="1.0" encoding="utf-8"?>
+<p:sld xmlns:a="http://schemas.openxmlformats.org/drawingml/2006/main" xmlns:r="http://schemas.openxmlformats.org/officeDocument/2006/relationships" xmlns:p="http://schemas.openxmlformats.org/presentationml/2006/main">
+  <p:cSld>
+    <p:spTree>
+      <p:nvGrpSpPr>
+        <p:cNvPr id="1" name=""/>
+        <p:cNvGrpSpPr/>
+        <p:nvPr/>
+      </p:nvGrpSpPr>
+      <p:grpSpPr>
+        <a:xfrm>
+          <a:off x="0" y="0"/>
+          <a:ext cx="0" cy="0"/>
+          <a:chOff x="0" y="0"/>
+          <a:chExt cx="0" cy="0"/>
+        </a:xfrm>
+      </p:grpSpPr>
+      <p:sp>
+        <p:nvSpPr>
+          <p:cNvPr id="2" name="Title 1">
+            <a:extLst>
+              <a:ext uri="{FF2B5EF4-FFF2-40B4-BE49-F238E27FC236}">
+                <a16:creationId xmlns:a16="http://schemas.microsoft.com/office/drawing/2014/main" id="{33CA8870-3263-4584-8658-7253B0D7BD52}"/>
+              </a:ext>
+            </a:extLst>
+          </p:cNvPr>
+          <p:cNvSpPr>
+            <a:spLocks noGrp="1"/>
+          </p:cNvSpPr>
+          <p:nvPr>
+            <p:ph type="title"/>
+          </p:nvPr>
+        </p:nvSpPr>
+        <p:spPr>
+          <a:xfrm>
+            <a:off x="533400" y="271340"/>
+            <a:ext cx="10515600" cy="1325563"/>
+          </a:xfrm>
+        </p:spPr>
+        <p:txBody>
+          <a:bodyPr/>
+          <a:lstStyle/>
+          <a:p>
+            <a:r>
+              <a:rPr lang="en-US" dirty="0"/>
+              <a:t>How this fix the gradient problem ?</a:t>
+            </a:r>
+            <a:endParaRPr lang="en-CA" dirty="0"/>
+          </a:p>
+        </p:txBody>
+      </p:sp>
+      <p:sp>
+        <p:nvSpPr>
+          <p:cNvPr id="3" name="Content Placeholder 2">
+            <a:extLst>
+              <a:ext uri="{FF2B5EF4-FFF2-40B4-BE49-F238E27FC236}">
+                <a16:creationId xmlns:a16="http://schemas.microsoft.com/office/drawing/2014/main" id="{C1F0658B-CEB9-47A3-9448-E0DA7F6B4AEB}"/>
+              </a:ext>
+            </a:extLst>
+          </p:cNvPr>
+          <p:cNvSpPr>
+            <a:spLocks noGrp="1"/>
+          </p:cNvSpPr>
+          <p:nvPr>
+            <p:ph idx="1"/>
+          </p:nvPr>
+        </p:nvSpPr>
+        <p:spPr>
+          <a:xfrm>
+            <a:off x="533400" y="1690688"/>
+            <a:ext cx="6446267" cy="4667250"/>
+          </a:xfrm>
+        </p:spPr>
+        <p:txBody>
+          <a:bodyPr>
+            <a:normAutofit fontScale="85000" lnSpcReduction="20000"/>
+          </a:bodyPr>
+          <a:lstStyle/>
+          <a:p>
+            <a:r>
+              <a:rPr lang="en-US" dirty="0"/>
+              <a:t>Since the cell state is allowed to flow through the hidden layers with only this linear sum operation. Gradient can easily move through the network without being diminished.</a:t>
+            </a:r>
+          </a:p>
+          <a:p>
+            <a:r>
+              <a:rPr lang="en-US" dirty="0"/>
+              <a:t>We can also get gradients added into the network through the LSTM cells but they are just added to the gradients flowing through</a:t>
+            </a:r>
+          </a:p>
+          <a:p>
+            <a:r>
+              <a:rPr lang="en-CA" dirty="0"/>
+              <a:t>Math behind LSTMs </a:t>
+            </a:r>
+            <a:r>
+              <a:rPr lang="en-CA" dirty="0">
+                <a:hlinkClick r:id="rId2"/>
+              </a:rPr>
+              <a:t>https://www.youtube.com/watch?v=iX5V1WpxxkY</a:t>
+            </a:r>
+            <a:endParaRPr lang="en-CA" dirty="0"/>
+          </a:p>
+          <a:p>
+            <a:r>
+              <a:rPr lang="en-CA" dirty="0"/>
+              <a:t>Understanding LSTM Networks </a:t>
+            </a:r>
+            <a:r>
+              <a:rPr lang="en-CA" dirty="0">
+                <a:hlinkClick r:id="rId3"/>
+              </a:rPr>
+              <a:t>http://colah.github.io/posts/2015-08-Understanding-LSTMs/</a:t>
+            </a:r>
+            <a:endParaRPr lang="en-CA" dirty="0"/>
+          </a:p>
+          <a:p>
+            <a:r>
+              <a:rPr lang="en-US" dirty="0"/>
+              <a:t>LSTMs are basic unit of RNNs in many applications</a:t>
+            </a:r>
+            <a:endParaRPr lang="en-CA" dirty="0"/>
+          </a:p>
+        </p:txBody>
+      </p:sp>
+      <p:pic>
+        <p:nvPicPr>
+          <p:cNvPr id="5" name="Picture 4">
+            <a:extLst>
+              <a:ext uri="{FF2B5EF4-FFF2-40B4-BE49-F238E27FC236}">
+                <a16:creationId xmlns:a16="http://schemas.microsoft.com/office/drawing/2014/main" id="{DA6AAC52-2ED4-4444-9FF8-7202AFEFAA19}"/>
+              </a:ext>
+            </a:extLst>
+          </p:cNvPr>
+          <p:cNvPicPr>
+            <a:picLocks noChangeAspect="1"/>
+          </p:cNvPicPr>
+          <p:nvPr/>
+        </p:nvPicPr>
+        <p:blipFill>
+          <a:blip r:embed="rId4"/>
+          <a:stretch>
+            <a:fillRect/>
+          </a:stretch>
+        </p:blipFill>
+        <p:spPr>
+          <a:xfrm>
+            <a:off x="7284467" y="1825625"/>
+            <a:ext cx="4663894" cy="3119437"/>
+          </a:xfrm>
+          <a:prstGeom prst="rect">
+            <a:avLst/>
+          </a:prstGeom>
+        </p:spPr>
+      </p:pic>
+    </p:spTree>
+    <p:extLst>
+      <p:ext uri="{BB962C8B-B14F-4D97-AF65-F5344CB8AC3E}">
+        <p14:creationId xmlns:p14="http://schemas.microsoft.com/office/powerpoint/2010/main" val="2751684910"/>
+      </p:ext>
+    </p:extLst>
+  </p:cSld>
+  <p:clrMapOvr>
+    <a:masterClrMapping/>
+  </p:clrMapOvr>
+</p:sld>
+</file>
+
+<file path=ppt/slides/slide19.xml><?xml version="1.0" encoding="utf-8"?>
+<p:sld xmlns:a="http://schemas.openxmlformats.org/drawingml/2006/main" xmlns:r="http://schemas.openxmlformats.org/officeDocument/2006/relationships" xmlns:p="http://schemas.openxmlformats.org/presentationml/2006/main">
+  <p:cSld>
+    <p:spTree>
+      <p:nvGrpSpPr>
+        <p:cNvPr id="1" name=""/>
+        <p:cNvGrpSpPr/>
+        <p:nvPr/>
+      </p:nvGrpSpPr>
+      <p:grpSpPr>
+        <a:xfrm>
+          <a:off x="0" y="0"/>
+          <a:ext cx="0" cy="0"/>
+          <a:chOff x="0" y="0"/>
+          <a:chExt cx="0" cy="0"/>
+        </a:xfrm>
+      </p:grpSpPr>
+      <p:sp>
+        <p:nvSpPr>
+          <p:cNvPr id="2" name="Title 1">
+            <a:extLst>
+              <a:ext uri="{FF2B5EF4-FFF2-40B4-BE49-F238E27FC236}">
+                <a16:creationId xmlns:a16="http://schemas.microsoft.com/office/drawing/2014/main" id="{EBF51890-9E62-4464-927E-9C05D6102BF8}"/>
+              </a:ext>
+            </a:extLst>
+          </p:cNvPr>
+          <p:cNvSpPr>
+            <a:spLocks noGrp="1"/>
+          </p:cNvSpPr>
+          <p:nvPr>
+            <p:ph type="title"/>
+          </p:nvPr>
+        </p:nvSpPr>
+        <p:spPr/>
+        <p:txBody>
+          <a:bodyPr/>
+          <a:lstStyle/>
+          <a:p>
+            <a:r>
+              <a:rPr lang="en-IN" dirty="0"/>
+              <a:t>Framework/Libraries Used</a:t>
+            </a:r>
+          </a:p>
+        </p:txBody>
+      </p:sp>
+      <p:sp>
+        <p:nvSpPr>
+          <p:cNvPr id="3" name="Content Placeholder 2">
+            <a:extLst>
+              <a:ext uri="{FF2B5EF4-FFF2-40B4-BE49-F238E27FC236}">
+                <a16:creationId xmlns:a16="http://schemas.microsoft.com/office/drawing/2014/main" id="{F2758553-8EC4-4B34-9A6D-F9494FD8DFFD}"/>
+              </a:ext>
+            </a:extLst>
+          </p:cNvPr>
+          <p:cNvSpPr>
+            <a:spLocks noGrp="1"/>
+          </p:cNvSpPr>
+          <p:nvPr>
+            <p:ph idx="1"/>
+          </p:nvPr>
+        </p:nvSpPr>
+        <p:spPr/>
+        <p:txBody>
+          <a:bodyPr/>
+          <a:lstStyle/>
+          <a:p>
+            <a:endParaRPr lang="en-IN"/>
+          </a:p>
+        </p:txBody>
+      </p:sp>
+    </p:spTree>
+    <p:extLst>
+      <p:ext uri="{BB962C8B-B14F-4D97-AF65-F5344CB8AC3E}">
+        <p14:creationId xmlns:p14="http://schemas.microsoft.com/office/powerpoint/2010/main" val="2998837831"/>
       </p:ext>
     </p:extLst>
   </p:cSld>
@@ -5250,6 +6698,587 @@
     <p:extLst>
       <p:ext uri="{BB962C8B-B14F-4D97-AF65-F5344CB8AC3E}">
         <p14:creationId xmlns:p14="http://schemas.microsoft.com/office/powerpoint/2010/main" val="3084410744"/>
+      </p:ext>
+    </p:extLst>
+  </p:cSld>
+  <p:clrMapOvr>
+    <a:masterClrMapping/>
+  </p:clrMapOvr>
+</p:sld>
+</file>
+
+<file path=ppt/slides/slide20.xml><?xml version="1.0" encoding="utf-8"?>
+<p:sld xmlns:a="http://schemas.openxmlformats.org/drawingml/2006/main" xmlns:r="http://schemas.openxmlformats.org/officeDocument/2006/relationships" xmlns:p="http://schemas.openxmlformats.org/presentationml/2006/main">
+  <p:cSld>
+    <p:spTree>
+      <p:nvGrpSpPr>
+        <p:cNvPr id="1" name=""/>
+        <p:cNvGrpSpPr/>
+        <p:nvPr/>
+      </p:nvGrpSpPr>
+      <p:grpSpPr>
+        <a:xfrm>
+          <a:off x="0" y="0"/>
+          <a:ext cx="0" cy="0"/>
+          <a:chOff x="0" y="0"/>
+          <a:chExt cx="0" cy="0"/>
+        </a:xfrm>
+      </p:grpSpPr>
+      <p:sp>
+        <p:nvSpPr>
+          <p:cNvPr id="2" name="Title 1">
+            <a:extLst>
+              <a:ext uri="{FF2B5EF4-FFF2-40B4-BE49-F238E27FC236}">
+                <a16:creationId xmlns:a16="http://schemas.microsoft.com/office/drawing/2014/main" id="{19CB314F-A554-45E1-BE78-336A63D7BADC}"/>
+              </a:ext>
+            </a:extLst>
+          </p:cNvPr>
+          <p:cNvSpPr>
+            <a:spLocks noGrp="1"/>
+          </p:cNvSpPr>
+          <p:nvPr>
+            <p:ph type="title"/>
+          </p:nvPr>
+        </p:nvSpPr>
+        <p:spPr/>
+        <p:txBody>
+          <a:bodyPr/>
+          <a:lstStyle/>
+          <a:p>
+            <a:r>
+              <a:rPr lang="en-IN" dirty="0"/>
+              <a:t>Pre-processing of Input data </a:t>
+            </a:r>
+          </a:p>
+        </p:txBody>
+      </p:sp>
+      <p:sp>
+        <p:nvSpPr>
+          <p:cNvPr id="3" name="Content Placeholder 2">
+            <a:extLst>
+              <a:ext uri="{FF2B5EF4-FFF2-40B4-BE49-F238E27FC236}">
+                <a16:creationId xmlns:a16="http://schemas.microsoft.com/office/drawing/2014/main" id="{4DC3DAC3-C43C-4734-A621-BC1205C1F496}"/>
+              </a:ext>
+            </a:extLst>
+          </p:cNvPr>
+          <p:cNvSpPr>
+            <a:spLocks noGrp="1"/>
+          </p:cNvSpPr>
+          <p:nvPr>
+            <p:ph idx="1"/>
+          </p:nvPr>
+        </p:nvSpPr>
+        <p:spPr/>
+        <p:txBody>
+          <a:bodyPr/>
+          <a:lstStyle/>
+          <a:p>
+            <a:endParaRPr lang="en-IN"/>
+          </a:p>
+        </p:txBody>
+      </p:sp>
+    </p:spTree>
+    <p:extLst>
+      <p:ext uri="{BB962C8B-B14F-4D97-AF65-F5344CB8AC3E}">
+        <p14:creationId xmlns:p14="http://schemas.microsoft.com/office/powerpoint/2010/main" val="4063040355"/>
+      </p:ext>
+    </p:extLst>
+  </p:cSld>
+  <p:clrMapOvr>
+    <a:masterClrMapping/>
+  </p:clrMapOvr>
+</p:sld>
+</file>
+
+<file path=ppt/slides/slide21.xml><?xml version="1.0" encoding="utf-8"?>
+<p:sld xmlns:a="http://schemas.openxmlformats.org/drawingml/2006/main" xmlns:r="http://schemas.openxmlformats.org/officeDocument/2006/relationships" xmlns:p="http://schemas.openxmlformats.org/presentationml/2006/main">
+  <p:cSld>
+    <p:spTree>
+      <p:nvGrpSpPr>
+        <p:cNvPr id="1" name=""/>
+        <p:cNvGrpSpPr/>
+        <p:nvPr/>
+      </p:nvGrpSpPr>
+      <p:grpSpPr>
+        <a:xfrm>
+          <a:off x="0" y="0"/>
+          <a:ext cx="0" cy="0"/>
+          <a:chOff x="0" y="0"/>
+          <a:chExt cx="0" cy="0"/>
+        </a:xfrm>
+      </p:grpSpPr>
+      <p:sp>
+        <p:nvSpPr>
+          <p:cNvPr id="2" name="Title 1">
+            <a:extLst>
+              <a:ext uri="{FF2B5EF4-FFF2-40B4-BE49-F238E27FC236}">
+                <a16:creationId xmlns:a16="http://schemas.microsoft.com/office/drawing/2014/main" id="{0913B5EB-A318-4652-9A0A-AF6487187C2E}"/>
+              </a:ext>
+            </a:extLst>
+          </p:cNvPr>
+          <p:cNvSpPr>
+            <a:spLocks noGrp="1"/>
+          </p:cNvSpPr>
+          <p:nvPr>
+            <p:ph type="title"/>
+          </p:nvPr>
+        </p:nvSpPr>
+        <p:spPr/>
+        <p:txBody>
+          <a:bodyPr/>
+          <a:lstStyle/>
+          <a:p>
+            <a:r>
+              <a:rPr lang="en-IN" dirty="0"/>
+              <a:t>Creating batches of data </a:t>
+            </a:r>
+          </a:p>
+        </p:txBody>
+      </p:sp>
+      <p:sp>
+        <p:nvSpPr>
+          <p:cNvPr id="3" name="Content Placeholder 2">
+            <a:extLst>
+              <a:ext uri="{FF2B5EF4-FFF2-40B4-BE49-F238E27FC236}">
+                <a16:creationId xmlns:a16="http://schemas.microsoft.com/office/drawing/2014/main" id="{D9E39990-C9E9-491A-B187-87AC0314DA90}"/>
+              </a:ext>
+            </a:extLst>
+          </p:cNvPr>
+          <p:cNvSpPr>
+            <a:spLocks noGrp="1"/>
+          </p:cNvSpPr>
+          <p:nvPr>
+            <p:ph idx="1"/>
+          </p:nvPr>
+        </p:nvSpPr>
+        <p:spPr/>
+        <p:txBody>
+          <a:bodyPr/>
+          <a:lstStyle/>
+          <a:p>
+            <a:endParaRPr lang="en-IN"/>
+          </a:p>
+        </p:txBody>
+      </p:sp>
+    </p:spTree>
+    <p:extLst>
+      <p:ext uri="{BB962C8B-B14F-4D97-AF65-F5344CB8AC3E}">
+        <p14:creationId xmlns:p14="http://schemas.microsoft.com/office/powerpoint/2010/main" val="856473193"/>
+      </p:ext>
+    </p:extLst>
+  </p:cSld>
+  <p:clrMapOvr>
+    <a:masterClrMapping/>
+  </p:clrMapOvr>
+</p:sld>
+</file>
+
+<file path=ppt/slides/slide22.xml><?xml version="1.0" encoding="utf-8"?>
+<p:sld xmlns:a="http://schemas.openxmlformats.org/drawingml/2006/main" xmlns:r="http://schemas.openxmlformats.org/officeDocument/2006/relationships" xmlns:p="http://schemas.openxmlformats.org/presentationml/2006/main">
+  <p:cSld>
+    <p:spTree>
+      <p:nvGrpSpPr>
+        <p:cNvPr id="1" name=""/>
+        <p:cNvGrpSpPr/>
+        <p:nvPr/>
+      </p:nvGrpSpPr>
+      <p:grpSpPr>
+        <a:xfrm>
+          <a:off x="0" y="0"/>
+          <a:ext cx="0" cy="0"/>
+          <a:chOff x="0" y="0"/>
+          <a:chExt cx="0" cy="0"/>
+        </a:xfrm>
+      </p:grpSpPr>
+      <p:sp>
+        <p:nvSpPr>
+          <p:cNvPr id="2" name="Title 1">
+            <a:extLst>
+              <a:ext uri="{FF2B5EF4-FFF2-40B4-BE49-F238E27FC236}">
+                <a16:creationId xmlns:a16="http://schemas.microsoft.com/office/drawing/2014/main" id="{E9CA9394-F7A3-4D0E-B802-4EBADD856421}"/>
+              </a:ext>
+            </a:extLst>
+          </p:cNvPr>
+          <p:cNvSpPr>
+            <a:spLocks noGrp="1"/>
+          </p:cNvSpPr>
+          <p:nvPr>
+            <p:ph type="title"/>
+          </p:nvPr>
+        </p:nvSpPr>
+        <p:spPr/>
+        <p:txBody>
+          <a:bodyPr/>
+          <a:lstStyle/>
+          <a:p>
+            <a:r>
+              <a:rPr lang="en-IN" dirty="0"/>
+              <a:t>Neural Network Architecture</a:t>
+            </a:r>
+          </a:p>
+        </p:txBody>
+      </p:sp>
+      <p:sp>
+        <p:nvSpPr>
+          <p:cNvPr id="3" name="Content Placeholder 2">
+            <a:extLst>
+              <a:ext uri="{FF2B5EF4-FFF2-40B4-BE49-F238E27FC236}">
+                <a16:creationId xmlns:a16="http://schemas.microsoft.com/office/drawing/2014/main" id="{66374872-F7F3-4D90-A746-81D5F82F782F}"/>
+              </a:ext>
+            </a:extLst>
+          </p:cNvPr>
+          <p:cNvSpPr>
+            <a:spLocks noGrp="1"/>
+          </p:cNvSpPr>
+          <p:nvPr>
+            <p:ph idx="1"/>
+          </p:nvPr>
+        </p:nvSpPr>
+        <p:spPr/>
+        <p:txBody>
+          <a:bodyPr/>
+          <a:lstStyle/>
+          <a:p>
+            <a:endParaRPr lang="en-IN"/>
+          </a:p>
+        </p:txBody>
+      </p:sp>
+    </p:spTree>
+    <p:extLst>
+      <p:ext uri="{BB962C8B-B14F-4D97-AF65-F5344CB8AC3E}">
+        <p14:creationId xmlns:p14="http://schemas.microsoft.com/office/powerpoint/2010/main" val="1605735911"/>
+      </p:ext>
+    </p:extLst>
+  </p:cSld>
+  <p:clrMapOvr>
+    <a:masterClrMapping/>
+  </p:clrMapOvr>
+</p:sld>
+</file>
+
+<file path=ppt/slides/slide23.xml><?xml version="1.0" encoding="utf-8"?>
+<p:sld xmlns:a="http://schemas.openxmlformats.org/drawingml/2006/main" xmlns:r="http://schemas.openxmlformats.org/officeDocument/2006/relationships" xmlns:p="http://schemas.openxmlformats.org/presentationml/2006/main">
+  <p:cSld>
+    <p:spTree>
+      <p:nvGrpSpPr>
+        <p:cNvPr id="1" name=""/>
+        <p:cNvGrpSpPr/>
+        <p:nvPr/>
+      </p:nvGrpSpPr>
+      <p:grpSpPr>
+        <a:xfrm>
+          <a:off x="0" y="0"/>
+          <a:ext cx="0" cy="0"/>
+          <a:chOff x="0" y="0"/>
+          <a:chExt cx="0" cy="0"/>
+        </a:xfrm>
+      </p:grpSpPr>
+      <p:sp>
+        <p:nvSpPr>
+          <p:cNvPr id="2" name="Title 1">
+            <a:extLst>
+              <a:ext uri="{FF2B5EF4-FFF2-40B4-BE49-F238E27FC236}">
+                <a16:creationId xmlns:a16="http://schemas.microsoft.com/office/drawing/2014/main" id="{B734B636-6FCA-4D65-BFF0-C521F7C770F0}"/>
+              </a:ext>
+            </a:extLst>
+          </p:cNvPr>
+          <p:cNvSpPr>
+            <a:spLocks noGrp="1"/>
+          </p:cNvSpPr>
+          <p:nvPr>
+            <p:ph type="title"/>
+          </p:nvPr>
+        </p:nvSpPr>
+        <p:spPr/>
+        <p:txBody>
+          <a:bodyPr/>
+          <a:lstStyle/>
+          <a:p>
+            <a:r>
+              <a:rPr lang="en-IN" dirty="0"/>
+              <a:t>Backpropagation</a:t>
+            </a:r>
+          </a:p>
+        </p:txBody>
+      </p:sp>
+      <p:sp>
+        <p:nvSpPr>
+          <p:cNvPr id="3" name="Content Placeholder 2">
+            <a:extLst>
+              <a:ext uri="{FF2B5EF4-FFF2-40B4-BE49-F238E27FC236}">
+                <a16:creationId xmlns:a16="http://schemas.microsoft.com/office/drawing/2014/main" id="{7DA921A4-A19B-4196-A3AD-A34DB25C32FB}"/>
+              </a:ext>
+            </a:extLst>
+          </p:cNvPr>
+          <p:cNvSpPr>
+            <a:spLocks noGrp="1"/>
+          </p:cNvSpPr>
+          <p:nvPr>
+            <p:ph idx="1"/>
+          </p:nvPr>
+        </p:nvSpPr>
+        <p:spPr/>
+        <p:txBody>
+          <a:bodyPr/>
+          <a:lstStyle/>
+          <a:p>
+            <a:endParaRPr lang="en-IN"/>
+          </a:p>
+        </p:txBody>
+      </p:sp>
+    </p:spTree>
+    <p:extLst>
+      <p:ext uri="{BB962C8B-B14F-4D97-AF65-F5344CB8AC3E}">
+        <p14:creationId xmlns:p14="http://schemas.microsoft.com/office/powerpoint/2010/main" val="2481473372"/>
+      </p:ext>
+    </p:extLst>
+  </p:cSld>
+  <p:clrMapOvr>
+    <a:masterClrMapping/>
+  </p:clrMapOvr>
+</p:sld>
+</file>
+
+<file path=ppt/slides/slide24.xml><?xml version="1.0" encoding="utf-8"?>
+<p:sld xmlns:a="http://schemas.openxmlformats.org/drawingml/2006/main" xmlns:r="http://schemas.openxmlformats.org/officeDocument/2006/relationships" xmlns:p="http://schemas.openxmlformats.org/presentationml/2006/main">
+  <p:cSld>
+    <p:spTree>
+      <p:nvGrpSpPr>
+        <p:cNvPr id="1" name=""/>
+        <p:cNvGrpSpPr/>
+        <p:nvPr/>
+      </p:nvGrpSpPr>
+      <p:grpSpPr>
+        <a:xfrm>
+          <a:off x="0" y="0"/>
+          <a:ext cx="0" cy="0"/>
+          <a:chOff x="0" y="0"/>
+          <a:chExt cx="0" cy="0"/>
+        </a:xfrm>
+      </p:grpSpPr>
+      <p:sp>
+        <p:nvSpPr>
+          <p:cNvPr id="2" name="Title 1">
+            <a:extLst>
+              <a:ext uri="{FF2B5EF4-FFF2-40B4-BE49-F238E27FC236}">
+                <a16:creationId xmlns:a16="http://schemas.microsoft.com/office/drawing/2014/main" id="{A76E450D-4B27-4674-B263-DACA0A0B388C}"/>
+              </a:ext>
+            </a:extLst>
+          </p:cNvPr>
+          <p:cNvSpPr>
+            <a:spLocks noGrp="1"/>
+          </p:cNvSpPr>
+          <p:nvPr>
+            <p:ph type="title"/>
+          </p:nvPr>
+        </p:nvSpPr>
+        <p:spPr/>
+        <p:txBody>
+          <a:bodyPr/>
+          <a:lstStyle/>
+          <a:p>
+            <a:r>
+              <a:rPr lang="en-IN" dirty="0"/>
+              <a:t>Hyperparameters</a:t>
+            </a:r>
+          </a:p>
+        </p:txBody>
+      </p:sp>
+      <p:sp>
+        <p:nvSpPr>
+          <p:cNvPr id="3" name="Content Placeholder 2">
+            <a:extLst>
+              <a:ext uri="{FF2B5EF4-FFF2-40B4-BE49-F238E27FC236}">
+                <a16:creationId xmlns:a16="http://schemas.microsoft.com/office/drawing/2014/main" id="{A3215CCB-ED8E-49A8-A8D9-661F7169939F}"/>
+              </a:ext>
+            </a:extLst>
+          </p:cNvPr>
+          <p:cNvSpPr>
+            <a:spLocks noGrp="1"/>
+          </p:cNvSpPr>
+          <p:nvPr>
+            <p:ph idx="1"/>
+          </p:nvPr>
+        </p:nvSpPr>
+        <p:spPr/>
+        <p:txBody>
+          <a:bodyPr/>
+          <a:lstStyle/>
+          <a:p>
+            <a:endParaRPr lang="en-IN"/>
+          </a:p>
+        </p:txBody>
+      </p:sp>
+    </p:spTree>
+    <p:extLst>
+      <p:ext uri="{BB962C8B-B14F-4D97-AF65-F5344CB8AC3E}">
+        <p14:creationId xmlns:p14="http://schemas.microsoft.com/office/powerpoint/2010/main" val="3307515375"/>
+      </p:ext>
+    </p:extLst>
+  </p:cSld>
+  <p:clrMapOvr>
+    <a:masterClrMapping/>
+  </p:clrMapOvr>
+</p:sld>
+</file>
+
+<file path=ppt/slides/slide25.xml><?xml version="1.0" encoding="utf-8"?>
+<p:sld xmlns:a="http://schemas.openxmlformats.org/drawingml/2006/main" xmlns:r="http://schemas.openxmlformats.org/officeDocument/2006/relationships" xmlns:p="http://schemas.openxmlformats.org/presentationml/2006/main">
+  <p:cSld>
+    <p:spTree>
+      <p:nvGrpSpPr>
+        <p:cNvPr id="1" name=""/>
+        <p:cNvGrpSpPr/>
+        <p:nvPr/>
+      </p:nvGrpSpPr>
+      <p:grpSpPr>
+        <a:xfrm>
+          <a:off x="0" y="0"/>
+          <a:ext cx="0" cy="0"/>
+          <a:chOff x="0" y="0"/>
+          <a:chExt cx="0" cy="0"/>
+        </a:xfrm>
+      </p:grpSpPr>
+      <p:sp>
+        <p:nvSpPr>
+          <p:cNvPr id="2" name="Title 1">
+            <a:extLst>
+              <a:ext uri="{FF2B5EF4-FFF2-40B4-BE49-F238E27FC236}">
+                <a16:creationId xmlns:a16="http://schemas.microsoft.com/office/drawing/2014/main" id="{584CD6A2-C342-4419-B6DC-975AA0B7B94E}"/>
+              </a:ext>
+            </a:extLst>
+          </p:cNvPr>
+          <p:cNvSpPr>
+            <a:spLocks noGrp="1"/>
+          </p:cNvSpPr>
+          <p:nvPr>
+            <p:ph type="title"/>
+          </p:nvPr>
+        </p:nvSpPr>
+        <p:spPr/>
+        <p:txBody>
+          <a:bodyPr/>
+          <a:lstStyle/>
+          <a:p>
+            <a:r>
+              <a:rPr lang="en-IN" dirty="0"/>
+              <a:t>Script Generation </a:t>
+            </a:r>
+          </a:p>
+        </p:txBody>
+      </p:sp>
+      <p:sp>
+        <p:nvSpPr>
+          <p:cNvPr id="3" name="Content Placeholder 2">
+            <a:extLst>
+              <a:ext uri="{FF2B5EF4-FFF2-40B4-BE49-F238E27FC236}">
+                <a16:creationId xmlns:a16="http://schemas.microsoft.com/office/drawing/2014/main" id="{ED1C0153-170A-46B9-BDC7-89EA21C485D5}"/>
+              </a:ext>
+            </a:extLst>
+          </p:cNvPr>
+          <p:cNvSpPr>
+            <a:spLocks noGrp="1"/>
+          </p:cNvSpPr>
+          <p:nvPr>
+            <p:ph idx="1"/>
+          </p:nvPr>
+        </p:nvSpPr>
+        <p:spPr/>
+        <p:txBody>
+          <a:bodyPr/>
+          <a:lstStyle/>
+          <a:p>
+            <a:endParaRPr lang="en-IN"/>
+          </a:p>
+        </p:txBody>
+      </p:sp>
+    </p:spTree>
+    <p:extLst>
+      <p:ext uri="{BB962C8B-B14F-4D97-AF65-F5344CB8AC3E}">
+        <p14:creationId xmlns:p14="http://schemas.microsoft.com/office/powerpoint/2010/main" val="4097401390"/>
+      </p:ext>
+    </p:extLst>
+  </p:cSld>
+  <p:clrMapOvr>
+    <a:masterClrMapping/>
+  </p:clrMapOvr>
+</p:sld>
+</file>
+
+<file path=ppt/slides/slide26.xml><?xml version="1.0" encoding="utf-8"?>
+<p:sld xmlns:a="http://schemas.openxmlformats.org/drawingml/2006/main" xmlns:r="http://schemas.openxmlformats.org/officeDocument/2006/relationships" xmlns:p="http://schemas.openxmlformats.org/presentationml/2006/main">
+  <p:cSld>
+    <p:spTree>
+      <p:nvGrpSpPr>
+        <p:cNvPr id="1" name=""/>
+        <p:cNvGrpSpPr/>
+        <p:nvPr/>
+      </p:nvGrpSpPr>
+      <p:grpSpPr>
+        <a:xfrm>
+          <a:off x="0" y="0"/>
+          <a:ext cx="0" cy="0"/>
+          <a:chOff x="0" y="0"/>
+          <a:chExt cx="0" cy="0"/>
+        </a:xfrm>
+      </p:grpSpPr>
+      <p:sp>
+        <p:nvSpPr>
+          <p:cNvPr id="2" name="Title 1">
+            <a:extLst>
+              <a:ext uri="{FF2B5EF4-FFF2-40B4-BE49-F238E27FC236}">
+                <a16:creationId xmlns:a16="http://schemas.microsoft.com/office/drawing/2014/main" id="{BADB776B-6812-42DF-A5DC-3926B2391B64}"/>
+              </a:ext>
+            </a:extLst>
+          </p:cNvPr>
+          <p:cNvSpPr>
+            <a:spLocks noGrp="1"/>
+          </p:cNvSpPr>
+          <p:nvPr>
+            <p:ph type="title"/>
+          </p:nvPr>
+        </p:nvSpPr>
+        <p:spPr/>
+        <p:txBody>
+          <a:bodyPr/>
+          <a:lstStyle/>
+          <a:p>
+            <a:r>
+              <a:rPr lang="en-IN" dirty="0"/>
+              <a:t>Saving model as a checkpoint file</a:t>
+            </a:r>
+          </a:p>
+        </p:txBody>
+      </p:sp>
+      <p:sp>
+        <p:nvSpPr>
+          <p:cNvPr id="3" name="Content Placeholder 2">
+            <a:extLst>
+              <a:ext uri="{FF2B5EF4-FFF2-40B4-BE49-F238E27FC236}">
+                <a16:creationId xmlns:a16="http://schemas.microsoft.com/office/drawing/2014/main" id="{22851A52-0B9D-4567-BD41-05DBF753F495}"/>
+              </a:ext>
+            </a:extLst>
+          </p:cNvPr>
+          <p:cNvSpPr>
+            <a:spLocks noGrp="1"/>
+          </p:cNvSpPr>
+          <p:nvPr>
+            <p:ph idx="1"/>
+          </p:nvPr>
+        </p:nvSpPr>
+        <p:spPr/>
+        <p:txBody>
+          <a:bodyPr/>
+          <a:lstStyle/>
+          <a:p>
+            <a:endParaRPr lang="en-IN"/>
+          </a:p>
+        </p:txBody>
+      </p:sp>
+    </p:spTree>
+    <p:extLst>
+      <p:ext uri="{BB962C8B-B14F-4D97-AF65-F5344CB8AC3E}">
+        <p14:creationId xmlns:p14="http://schemas.microsoft.com/office/powerpoint/2010/main" val="1603034709"/>
       </p:ext>
     </p:extLst>
   </p:cSld>
@@ -5386,6 +7415,224 @@
           </a:prstGeom>
         </p:spPr>
       </p:pic>
+      <p:sp>
+        <p:nvSpPr>
+          <p:cNvPr id="5" name="Content Placeholder 2">
+            <a:extLst>
+              <a:ext uri="{FF2B5EF4-FFF2-40B4-BE49-F238E27FC236}">
+                <a16:creationId xmlns:a16="http://schemas.microsoft.com/office/drawing/2014/main" id="{41731081-84F1-44A0-B44D-7B3F0C72F5BA}"/>
+              </a:ext>
+            </a:extLst>
+          </p:cNvPr>
+          <p:cNvSpPr txBox="1">
+            <a:spLocks/>
+          </p:cNvSpPr>
+          <p:nvPr/>
+        </p:nvSpPr>
+        <p:spPr>
+          <a:xfrm>
+            <a:off x="838199" y="1825625"/>
+            <a:ext cx="8231155" cy="4351338"/>
+          </a:xfrm>
+          <a:prstGeom prst="rect">
+            <a:avLst/>
+          </a:prstGeom>
+        </p:spPr>
+        <p:txBody>
+          <a:bodyPr vert="horz" lIns="91440" tIns="45720" rIns="91440" bIns="45720" rtlCol="0">
+            <a:normAutofit/>
+          </a:bodyPr>
+          <a:lstStyle>
+            <a:lvl1pPr marL="228600" indent="-228600" algn="l" defTabSz="914400" rtl="0" eaLnBrk="1" latinLnBrk="0" hangingPunct="1">
+              <a:lnSpc>
+                <a:spcPct val="90000"/>
+              </a:lnSpc>
+              <a:spcBef>
+                <a:spcPts val="1000"/>
+              </a:spcBef>
+              <a:buFont typeface="Arial" panose="020B0604020202020204" pitchFamily="34" charset="0"/>
+              <a:buChar char="•"/>
+              <a:defRPr sz="2800" kern="1200">
+                <a:solidFill>
+                  <a:schemeClr val="tx1"/>
+                </a:solidFill>
+                <a:latin typeface="+mn-lt"/>
+                <a:ea typeface="+mn-ea"/>
+                <a:cs typeface="+mn-cs"/>
+              </a:defRPr>
+            </a:lvl1pPr>
+            <a:lvl2pPr marL="685800" indent="-228600" algn="l" defTabSz="914400" rtl="0" eaLnBrk="1" latinLnBrk="0" hangingPunct="1">
+              <a:lnSpc>
+                <a:spcPct val="90000"/>
+              </a:lnSpc>
+              <a:spcBef>
+                <a:spcPts val="500"/>
+              </a:spcBef>
+              <a:buFont typeface="Arial" panose="020B0604020202020204" pitchFamily="34" charset="0"/>
+              <a:buChar char="•"/>
+              <a:defRPr sz="2400" kern="1200">
+                <a:solidFill>
+                  <a:schemeClr val="tx1"/>
+                </a:solidFill>
+                <a:latin typeface="+mn-lt"/>
+                <a:ea typeface="+mn-ea"/>
+                <a:cs typeface="+mn-cs"/>
+              </a:defRPr>
+            </a:lvl2pPr>
+            <a:lvl3pPr marL="1143000" indent="-228600" algn="l" defTabSz="914400" rtl="0" eaLnBrk="1" latinLnBrk="0" hangingPunct="1">
+              <a:lnSpc>
+                <a:spcPct val="90000"/>
+              </a:lnSpc>
+              <a:spcBef>
+                <a:spcPts val="500"/>
+              </a:spcBef>
+              <a:buFont typeface="Arial" panose="020B0604020202020204" pitchFamily="34" charset="0"/>
+              <a:buChar char="•"/>
+              <a:defRPr sz="2000" kern="1200">
+                <a:solidFill>
+                  <a:schemeClr val="tx1"/>
+                </a:solidFill>
+                <a:latin typeface="+mn-lt"/>
+                <a:ea typeface="+mn-ea"/>
+                <a:cs typeface="+mn-cs"/>
+              </a:defRPr>
+            </a:lvl3pPr>
+            <a:lvl4pPr marL="1600200" indent="-228600" algn="l" defTabSz="914400" rtl="0" eaLnBrk="1" latinLnBrk="0" hangingPunct="1">
+              <a:lnSpc>
+                <a:spcPct val="90000"/>
+              </a:lnSpc>
+              <a:spcBef>
+                <a:spcPts val="500"/>
+              </a:spcBef>
+              <a:buFont typeface="Arial" panose="020B0604020202020204" pitchFamily="34" charset="0"/>
+              <a:buChar char="•"/>
+              <a:defRPr sz="1800" kern="1200">
+                <a:solidFill>
+                  <a:schemeClr val="tx1"/>
+                </a:solidFill>
+                <a:latin typeface="+mn-lt"/>
+                <a:ea typeface="+mn-ea"/>
+                <a:cs typeface="+mn-cs"/>
+              </a:defRPr>
+            </a:lvl4pPr>
+            <a:lvl5pPr marL="2057400" indent="-228600" algn="l" defTabSz="914400" rtl="0" eaLnBrk="1" latinLnBrk="0" hangingPunct="1">
+              <a:lnSpc>
+                <a:spcPct val="90000"/>
+              </a:lnSpc>
+              <a:spcBef>
+                <a:spcPts val="500"/>
+              </a:spcBef>
+              <a:buFont typeface="Arial" panose="020B0604020202020204" pitchFamily="34" charset="0"/>
+              <a:buChar char="•"/>
+              <a:defRPr sz="1800" kern="1200">
+                <a:solidFill>
+                  <a:schemeClr val="tx1"/>
+                </a:solidFill>
+                <a:latin typeface="+mn-lt"/>
+                <a:ea typeface="+mn-ea"/>
+                <a:cs typeface="+mn-cs"/>
+              </a:defRPr>
+            </a:lvl5pPr>
+            <a:lvl6pPr marL="2514600" indent="-228600" algn="l" defTabSz="914400" rtl="0" eaLnBrk="1" latinLnBrk="0" hangingPunct="1">
+              <a:lnSpc>
+                <a:spcPct val="90000"/>
+              </a:lnSpc>
+              <a:spcBef>
+                <a:spcPts val="500"/>
+              </a:spcBef>
+              <a:buFont typeface="Arial" panose="020B0604020202020204" pitchFamily="34" charset="0"/>
+              <a:buChar char="•"/>
+              <a:defRPr sz="1800" kern="1200">
+                <a:solidFill>
+                  <a:schemeClr val="tx1"/>
+                </a:solidFill>
+                <a:latin typeface="+mn-lt"/>
+                <a:ea typeface="+mn-ea"/>
+                <a:cs typeface="+mn-cs"/>
+              </a:defRPr>
+            </a:lvl6pPr>
+            <a:lvl7pPr marL="2971800" indent="-228600" algn="l" defTabSz="914400" rtl="0" eaLnBrk="1" latinLnBrk="0" hangingPunct="1">
+              <a:lnSpc>
+                <a:spcPct val="90000"/>
+              </a:lnSpc>
+              <a:spcBef>
+                <a:spcPts val="500"/>
+              </a:spcBef>
+              <a:buFont typeface="Arial" panose="020B0604020202020204" pitchFamily="34" charset="0"/>
+              <a:buChar char="•"/>
+              <a:defRPr sz="1800" kern="1200">
+                <a:solidFill>
+                  <a:schemeClr val="tx1"/>
+                </a:solidFill>
+                <a:latin typeface="+mn-lt"/>
+                <a:ea typeface="+mn-ea"/>
+                <a:cs typeface="+mn-cs"/>
+              </a:defRPr>
+            </a:lvl7pPr>
+            <a:lvl8pPr marL="3429000" indent="-228600" algn="l" defTabSz="914400" rtl="0" eaLnBrk="1" latinLnBrk="0" hangingPunct="1">
+              <a:lnSpc>
+                <a:spcPct val="90000"/>
+              </a:lnSpc>
+              <a:spcBef>
+                <a:spcPts val="500"/>
+              </a:spcBef>
+              <a:buFont typeface="Arial" panose="020B0604020202020204" pitchFamily="34" charset="0"/>
+              <a:buChar char="•"/>
+              <a:defRPr sz="1800" kern="1200">
+                <a:solidFill>
+                  <a:schemeClr val="tx1"/>
+                </a:solidFill>
+                <a:latin typeface="+mn-lt"/>
+                <a:ea typeface="+mn-ea"/>
+                <a:cs typeface="+mn-cs"/>
+              </a:defRPr>
+            </a:lvl8pPr>
+            <a:lvl9pPr marL="3886200" indent="-228600" algn="l" defTabSz="914400" rtl="0" eaLnBrk="1" latinLnBrk="0" hangingPunct="1">
+              <a:lnSpc>
+                <a:spcPct val="90000"/>
+              </a:lnSpc>
+              <a:spcBef>
+                <a:spcPts val="500"/>
+              </a:spcBef>
+              <a:buFont typeface="Arial" panose="020B0604020202020204" pitchFamily="34" charset="0"/>
+              <a:buChar char="•"/>
+              <a:defRPr sz="1800" kern="1200">
+                <a:solidFill>
+                  <a:schemeClr val="tx1"/>
+                </a:solidFill>
+                <a:latin typeface="+mn-lt"/>
+                <a:ea typeface="+mn-ea"/>
+                <a:cs typeface="+mn-cs"/>
+              </a:defRPr>
+            </a:lvl9pPr>
+          </a:lstStyle>
+          <a:p>
+            <a:r>
+              <a:rPr lang="en-IN" dirty="0"/>
+              <a:t>Using Tv sitcom Seinfeld script to generate a new script</a:t>
+            </a:r>
+          </a:p>
+          <a:p>
+            <a:r>
+              <a:rPr lang="en-IN" dirty="0"/>
+              <a:t>Dataset source: </a:t>
+            </a:r>
+            <a:r>
+              <a:rPr lang="en-IN" dirty="0">
+                <a:hlinkClick r:id="rId2"/>
+              </a:rPr>
+              <a:t>https://www.kaggle.com/thec03u5/seinfeld-chronicles#scripts.csv</a:t>
+            </a:r>
+            <a:endParaRPr lang="en-IN" dirty="0"/>
+          </a:p>
+          <a:p>
+            <a:r>
+              <a:rPr lang="en-IN" dirty="0"/>
+              <a:t>The neural network will generate fake/new script by learning the patterns from training data.</a:t>
+            </a:r>
+          </a:p>
+        </p:txBody>
+      </p:sp>
     </p:spTree>
     <p:extLst>
       <p:ext uri="{BB962C8B-B14F-4D97-AF65-F5344CB8AC3E}">
@@ -5432,14 +7679,19 @@
             <p:ph type="title"/>
           </p:nvPr>
         </p:nvSpPr>
-        <p:spPr/>
+        <p:spPr>
+          <a:xfrm>
+            <a:off x="838200" y="365126"/>
+            <a:ext cx="10515600" cy="1055302"/>
+          </a:xfrm>
+        </p:spPr>
         <p:txBody>
           <a:bodyPr/>
           <a:lstStyle/>
           <a:p>
             <a:r>
               <a:rPr lang="en-US" dirty="0"/>
-              <a:t>Input and Output</a:t>
+              <a:t>Input Script and Output Script</a:t>
             </a:r>
             <a:endParaRPr lang="en-IN" dirty="0"/>
           </a:p>
@@ -5461,12 +7713,530 @@
             <p:ph idx="1"/>
           </p:nvPr>
         </p:nvSpPr>
-        <p:spPr/>
-        <p:txBody>
-          <a:bodyPr/>
-          <a:lstStyle/>
-          <a:p>
-            <a:endParaRPr lang="en-IN"/>
+        <p:spPr>
+          <a:xfrm>
+            <a:off x="731668" y="1822449"/>
+            <a:ext cx="5163105" cy="4436307"/>
+          </a:xfrm>
+        </p:spPr>
+        <p:txBody>
+          <a:bodyPr>
+            <a:normAutofit fontScale="85000" lnSpcReduction="20000"/>
+          </a:bodyPr>
+          <a:lstStyle/>
+          <a:p>
+            <a:pPr marL="0" indent="0">
+              <a:buNone/>
+            </a:pPr>
+            <a:r>
+              <a:rPr lang="en-IN" sz="4100" b="1" dirty="0"/>
+              <a:t>Input</a:t>
+            </a:r>
+          </a:p>
+          <a:p>
+            <a:pPr marL="0" indent="0">
+              <a:buNone/>
+            </a:pPr>
+            <a:r>
+              <a:rPr lang="en-CA" dirty="0" err="1"/>
+              <a:t>george</a:t>
+            </a:r>
+            <a:r>
+              <a:rPr lang="en-CA" dirty="0"/>
+              <a:t>: so, </a:t>
+            </a:r>
+            <a:r>
+              <a:rPr lang="en-CA" dirty="0" err="1"/>
+              <a:t>i</a:t>
+            </a:r>
+            <a:r>
+              <a:rPr lang="en-CA" dirty="0"/>
+              <a:t> was in the contrary.</a:t>
+            </a:r>
+          </a:p>
+          <a:p>
+            <a:pPr marL="0" indent="0">
+              <a:buNone/>
+            </a:pPr>
+            <a:r>
+              <a:rPr lang="en-CA" dirty="0" err="1"/>
+              <a:t>george</a:t>
+            </a:r>
+            <a:r>
+              <a:rPr lang="en-CA" dirty="0"/>
+              <a:t>: so, </a:t>
+            </a:r>
+            <a:r>
+              <a:rPr lang="en-CA" dirty="0" err="1"/>
+              <a:t>i</a:t>
+            </a:r>
+            <a:r>
+              <a:rPr lang="en-CA" dirty="0"/>
+              <a:t> guess </a:t>
+            </a:r>
+            <a:r>
+              <a:rPr lang="en-CA" dirty="0" err="1"/>
+              <a:t>i</a:t>
+            </a:r>
+            <a:r>
+              <a:rPr lang="en-CA" dirty="0"/>
+              <a:t> was a woman, and the defendants was a good boy.</a:t>
+            </a:r>
+          </a:p>
+          <a:p>
+            <a:pPr marL="0" indent="0">
+              <a:buNone/>
+            </a:pPr>
+            <a:r>
+              <a:rPr lang="en-CA" dirty="0"/>
+              <a:t>elaine: </a:t>
+            </a:r>
+            <a:r>
+              <a:rPr lang="en-CA" dirty="0" err="1"/>
+              <a:t>i</a:t>
+            </a:r>
+            <a:r>
+              <a:rPr lang="en-CA" dirty="0"/>
+              <a:t> don't know where it is.</a:t>
+            </a:r>
+          </a:p>
+          <a:p>
+            <a:pPr marL="0" indent="0">
+              <a:buNone/>
+            </a:pPr>
+            <a:r>
+              <a:rPr lang="en-CA" dirty="0"/>
+              <a:t>jerry: so </a:t>
+            </a:r>
+            <a:r>
+              <a:rPr lang="en-CA" dirty="0" err="1"/>
+              <a:t>i</a:t>
+            </a:r>
+            <a:r>
+              <a:rPr lang="en-CA" dirty="0"/>
+              <a:t> was thinking about this one?</a:t>
+            </a:r>
+          </a:p>
+          <a:p>
+            <a:pPr marL="0" indent="0">
+              <a:buNone/>
+            </a:pPr>
+            <a:r>
+              <a:rPr lang="en-CA" dirty="0" err="1"/>
+              <a:t>hoyt</a:t>
+            </a:r>
+            <a:r>
+              <a:rPr lang="en-CA" dirty="0"/>
+              <a:t>: </a:t>
+            </a:r>
+            <a:r>
+              <a:rPr lang="en-CA" dirty="0" err="1"/>
+              <a:t>i</a:t>
+            </a:r>
+            <a:r>
+              <a:rPr lang="en-CA" dirty="0"/>
+              <a:t> thought </a:t>
+            </a:r>
+            <a:r>
+              <a:rPr lang="en-CA" dirty="0" err="1"/>
+              <a:t>i</a:t>
+            </a:r>
+            <a:r>
+              <a:rPr lang="en-CA" dirty="0"/>
+              <a:t> was a little adjustment.</a:t>
+            </a:r>
+          </a:p>
+          <a:p>
+            <a:pPr marL="0" indent="0">
+              <a:buNone/>
+            </a:pPr>
+            <a:r>
+              <a:rPr lang="en-CA" dirty="0"/>
+              <a:t>jerry: what is that?</a:t>
+            </a:r>
+          </a:p>
+          <a:p>
+            <a:pPr marL="0" indent="0">
+              <a:buNone/>
+            </a:pPr>
+            <a:r>
+              <a:rPr lang="en-CA" dirty="0" err="1"/>
+              <a:t>hoyt</a:t>
+            </a:r>
+            <a:r>
+              <a:rPr lang="en-CA" dirty="0"/>
+              <a:t>: yes, yes. yes. </a:t>
+            </a:r>
+            <a:r>
+              <a:rPr lang="en-CA" dirty="0" err="1"/>
+              <a:t>i</a:t>
+            </a:r>
+            <a:r>
+              <a:rPr lang="en-CA" dirty="0"/>
+              <a:t> got a pee on this. you were in the middle of a plane, and </a:t>
+            </a:r>
+            <a:r>
+              <a:rPr lang="en-CA" dirty="0" err="1"/>
+              <a:t>i</a:t>
+            </a:r>
+            <a:r>
+              <a:rPr lang="en-CA" dirty="0"/>
+              <a:t> have a little adjustment.</a:t>
+            </a:r>
+          </a:p>
+          <a:p>
+            <a:pPr marL="0" indent="0">
+              <a:buNone/>
+            </a:pPr>
+            <a:r>
+              <a:rPr lang="en-CA" dirty="0" err="1"/>
+              <a:t>george</a:t>
+            </a:r>
+            <a:r>
+              <a:rPr lang="en-CA" dirty="0"/>
+              <a:t>: what happened to him?</a:t>
+            </a:r>
+          </a:p>
+          <a:p>
+            <a:pPr marL="0" indent="0">
+              <a:buNone/>
+            </a:pPr>
+            <a:endParaRPr lang="en-CA" dirty="0"/>
+          </a:p>
+        </p:txBody>
+      </p:sp>
+      <p:sp>
+        <p:nvSpPr>
+          <p:cNvPr id="4" name="Content Placeholder 2">
+            <a:extLst>
+              <a:ext uri="{FF2B5EF4-FFF2-40B4-BE49-F238E27FC236}">
+                <a16:creationId xmlns:a16="http://schemas.microsoft.com/office/drawing/2014/main" id="{A42FE7DE-55DF-4429-8971-AAD74E1964ED}"/>
+              </a:ext>
+            </a:extLst>
+          </p:cNvPr>
+          <p:cNvSpPr txBox="1">
+            <a:spLocks/>
+          </p:cNvSpPr>
+          <p:nvPr/>
+        </p:nvSpPr>
+        <p:spPr>
+          <a:xfrm>
+            <a:off x="6379346" y="1822449"/>
+            <a:ext cx="5163105" cy="4498452"/>
+          </a:xfrm>
+          <a:prstGeom prst="rect">
+            <a:avLst/>
+          </a:prstGeom>
+        </p:spPr>
+        <p:txBody>
+          <a:bodyPr vert="horz" lIns="91440" tIns="45720" rIns="91440" bIns="45720" rtlCol="0">
+            <a:normAutofit fontScale="77500" lnSpcReduction="20000"/>
+          </a:bodyPr>
+          <a:lstStyle>
+            <a:lvl1pPr marL="228600" indent="-228600" algn="l" defTabSz="914400" rtl="0" eaLnBrk="1" latinLnBrk="0" hangingPunct="1">
+              <a:lnSpc>
+                <a:spcPct val="90000"/>
+              </a:lnSpc>
+              <a:spcBef>
+                <a:spcPts val="1000"/>
+              </a:spcBef>
+              <a:buFont typeface="Arial" panose="020B0604020202020204" pitchFamily="34" charset="0"/>
+              <a:buChar char="•"/>
+              <a:defRPr sz="2800" kern="1200">
+                <a:solidFill>
+                  <a:schemeClr val="tx1"/>
+                </a:solidFill>
+                <a:latin typeface="+mn-lt"/>
+                <a:ea typeface="+mn-ea"/>
+                <a:cs typeface="+mn-cs"/>
+              </a:defRPr>
+            </a:lvl1pPr>
+            <a:lvl2pPr marL="685800" indent="-228600" algn="l" defTabSz="914400" rtl="0" eaLnBrk="1" latinLnBrk="0" hangingPunct="1">
+              <a:lnSpc>
+                <a:spcPct val="90000"/>
+              </a:lnSpc>
+              <a:spcBef>
+                <a:spcPts val="500"/>
+              </a:spcBef>
+              <a:buFont typeface="Arial" panose="020B0604020202020204" pitchFamily="34" charset="0"/>
+              <a:buChar char="•"/>
+              <a:defRPr sz="2400" kern="1200">
+                <a:solidFill>
+                  <a:schemeClr val="tx1"/>
+                </a:solidFill>
+                <a:latin typeface="+mn-lt"/>
+                <a:ea typeface="+mn-ea"/>
+                <a:cs typeface="+mn-cs"/>
+              </a:defRPr>
+            </a:lvl2pPr>
+            <a:lvl3pPr marL="1143000" indent="-228600" algn="l" defTabSz="914400" rtl="0" eaLnBrk="1" latinLnBrk="0" hangingPunct="1">
+              <a:lnSpc>
+                <a:spcPct val="90000"/>
+              </a:lnSpc>
+              <a:spcBef>
+                <a:spcPts val="500"/>
+              </a:spcBef>
+              <a:buFont typeface="Arial" panose="020B0604020202020204" pitchFamily="34" charset="0"/>
+              <a:buChar char="•"/>
+              <a:defRPr sz="2000" kern="1200">
+                <a:solidFill>
+                  <a:schemeClr val="tx1"/>
+                </a:solidFill>
+                <a:latin typeface="+mn-lt"/>
+                <a:ea typeface="+mn-ea"/>
+                <a:cs typeface="+mn-cs"/>
+              </a:defRPr>
+            </a:lvl3pPr>
+            <a:lvl4pPr marL="1600200" indent="-228600" algn="l" defTabSz="914400" rtl="0" eaLnBrk="1" latinLnBrk="0" hangingPunct="1">
+              <a:lnSpc>
+                <a:spcPct val="90000"/>
+              </a:lnSpc>
+              <a:spcBef>
+                <a:spcPts val="500"/>
+              </a:spcBef>
+              <a:buFont typeface="Arial" panose="020B0604020202020204" pitchFamily="34" charset="0"/>
+              <a:buChar char="•"/>
+              <a:defRPr sz="1800" kern="1200">
+                <a:solidFill>
+                  <a:schemeClr val="tx1"/>
+                </a:solidFill>
+                <a:latin typeface="+mn-lt"/>
+                <a:ea typeface="+mn-ea"/>
+                <a:cs typeface="+mn-cs"/>
+              </a:defRPr>
+            </a:lvl4pPr>
+            <a:lvl5pPr marL="2057400" indent="-228600" algn="l" defTabSz="914400" rtl="0" eaLnBrk="1" latinLnBrk="0" hangingPunct="1">
+              <a:lnSpc>
+                <a:spcPct val="90000"/>
+              </a:lnSpc>
+              <a:spcBef>
+                <a:spcPts val="500"/>
+              </a:spcBef>
+              <a:buFont typeface="Arial" panose="020B0604020202020204" pitchFamily="34" charset="0"/>
+              <a:buChar char="•"/>
+              <a:defRPr sz="1800" kern="1200">
+                <a:solidFill>
+                  <a:schemeClr val="tx1"/>
+                </a:solidFill>
+                <a:latin typeface="+mn-lt"/>
+                <a:ea typeface="+mn-ea"/>
+                <a:cs typeface="+mn-cs"/>
+              </a:defRPr>
+            </a:lvl5pPr>
+            <a:lvl6pPr marL="2514600" indent="-228600" algn="l" defTabSz="914400" rtl="0" eaLnBrk="1" latinLnBrk="0" hangingPunct="1">
+              <a:lnSpc>
+                <a:spcPct val="90000"/>
+              </a:lnSpc>
+              <a:spcBef>
+                <a:spcPts val="500"/>
+              </a:spcBef>
+              <a:buFont typeface="Arial" panose="020B0604020202020204" pitchFamily="34" charset="0"/>
+              <a:buChar char="•"/>
+              <a:defRPr sz="1800" kern="1200">
+                <a:solidFill>
+                  <a:schemeClr val="tx1"/>
+                </a:solidFill>
+                <a:latin typeface="+mn-lt"/>
+                <a:ea typeface="+mn-ea"/>
+                <a:cs typeface="+mn-cs"/>
+              </a:defRPr>
+            </a:lvl6pPr>
+            <a:lvl7pPr marL="2971800" indent="-228600" algn="l" defTabSz="914400" rtl="0" eaLnBrk="1" latinLnBrk="0" hangingPunct="1">
+              <a:lnSpc>
+                <a:spcPct val="90000"/>
+              </a:lnSpc>
+              <a:spcBef>
+                <a:spcPts val="500"/>
+              </a:spcBef>
+              <a:buFont typeface="Arial" panose="020B0604020202020204" pitchFamily="34" charset="0"/>
+              <a:buChar char="•"/>
+              <a:defRPr sz="1800" kern="1200">
+                <a:solidFill>
+                  <a:schemeClr val="tx1"/>
+                </a:solidFill>
+                <a:latin typeface="+mn-lt"/>
+                <a:ea typeface="+mn-ea"/>
+                <a:cs typeface="+mn-cs"/>
+              </a:defRPr>
+            </a:lvl7pPr>
+            <a:lvl8pPr marL="3429000" indent="-228600" algn="l" defTabSz="914400" rtl="0" eaLnBrk="1" latinLnBrk="0" hangingPunct="1">
+              <a:lnSpc>
+                <a:spcPct val="90000"/>
+              </a:lnSpc>
+              <a:spcBef>
+                <a:spcPts val="500"/>
+              </a:spcBef>
+              <a:buFont typeface="Arial" panose="020B0604020202020204" pitchFamily="34" charset="0"/>
+              <a:buChar char="•"/>
+              <a:defRPr sz="1800" kern="1200">
+                <a:solidFill>
+                  <a:schemeClr val="tx1"/>
+                </a:solidFill>
+                <a:latin typeface="+mn-lt"/>
+                <a:ea typeface="+mn-ea"/>
+                <a:cs typeface="+mn-cs"/>
+              </a:defRPr>
+            </a:lvl8pPr>
+            <a:lvl9pPr marL="3886200" indent="-228600" algn="l" defTabSz="914400" rtl="0" eaLnBrk="1" latinLnBrk="0" hangingPunct="1">
+              <a:lnSpc>
+                <a:spcPct val="90000"/>
+              </a:lnSpc>
+              <a:spcBef>
+                <a:spcPts val="500"/>
+              </a:spcBef>
+              <a:buFont typeface="Arial" panose="020B0604020202020204" pitchFamily="34" charset="0"/>
+              <a:buChar char="•"/>
+              <a:defRPr sz="1800" kern="1200">
+                <a:solidFill>
+                  <a:schemeClr val="tx1"/>
+                </a:solidFill>
+                <a:latin typeface="+mn-lt"/>
+                <a:ea typeface="+mn-ea"/>
+                <a:cs typeface="+mn-cs"/>
+              </a:defRPr>
+            </a:lvl9pPr>
+          </a:lstStyle>
+          <a:p>
+            <a:pPr marL="0" indent="0">
+              <a:buNone/>
+            </a:pPr>
+            <a:r>
+              <a:rPr lang="en-IN" sz="4600" b="1" dirty="0"/>
+              <a:t>Output</a:t>
+            </a:r>
+          </a:p>
+          <a:p>
+            <a:pPr marL="0" indent="0">
+              <a:buNone/>
+            </a:pPr>
+            <a:r>
+              <a:rPr lang="en-CA" dirty="0" err="1"/>
+              <a:t>george</a:t>
+            </a:r>
+            <a:r>
+              <a:rPr lang="en-CA" dirty="0"/>
+              <a:t>: so you want to see how you could do that?</a:t>
+            </a:r>
+          </a:p>
+          <a:p>
+            <a:pPr marL="0" indent="0">
+              <a:buNone/>
+            </a:pPr>
+            <a:r>
+              <a:rPr lang="en-CA" dirty="0" err="1"/>
+              <a:t>hoyt</a:t>
+            </a:r>
+            <a:r>
+              <a:rPr lang="en-CA" dirty="0"/>
+              <a:t>: </a:t>
+            </a:r>
+            <a:r>
+              <a:rPr lang="en-CA" dirty="0" err="1"/>
+              <a:t>i</a:t>
+            </a:r>
+            <a:r>
+              <a:rPr lang="en-CA" dirty="0"/>
+              <a:t> don't want to see you in a hotel.</a:t>
+            </a:r>
+          </a:p>
+          <a:p>
+            <a:pPr marL="0" indent="0">
+              <a:buNone/>
+            </a:pPr>
+            <a:r>
+              <a:rPr lang="en-CA" dirty="0"/>
+              <a:t>elaine: you want to get the car on the street and a wheelchair?</a:t>
+            </a:r>
+          </a:p>
+          <a:p>
+            <a:pPr marL="0" indent="0">
+              <a:buNone/>
+            </a:pPr>
+            <a:r>
+              <a:rPr lang="en-CA" dirty="0" err="1"/>
+              <a:t>hoyt</a:t>
+            </a:r>
+            <a:r>
+              <a:rPr lang="en-CA" dirty="0"/>
+              <a:t>: what do you think?</a:t>
+            </a:r>
+          </a:p>
+          <a:p>
+            <a:pPr marL="0" indent="0">
+              <a:buNone/>
+            </a:pPr>
+            <a:r>
+              <a:rPr lang="en-CA" dirty="0" err="1"/>
+              <a:t>george</a:t>
+            </a:r>
+            <a:r>
+              <a:rPr lang="en-CA" dirty="0"/>
+              <a:t>: yeah, </a:t>
+            </a:r>
+            <a:r>
+              <a:rPr lang="en-CA" dirty="0" err="1"/>
+              <a:t>i</a:t>
+            </a:r>
+            <a:r>
+              <a:rPr lang="en-CA" dirty="0"/>
+              <a:t> guess </a:t>
+            </a:r>
+            <a:r>
+              <a:rPr lang="en-CA" dirty="0" err="1"/>
+              <a:t>i</a:t>
+            </a:r>
+            <a:r>
+              <a:rPr lang="en-CA" dirty="0"/>
+              <a:t> was wondering about it.</a:t>
+            </a:r>
+          </a:p>
+          <a:p>
+            <a:pPr marL="0" indent="0">
+              <a:buNone/>
+            </a:pPr>
+            <a:r>
+              <a:rPr lang="en-CA" dirty="0"/>
+              <a:t>jerry: what are you doing with this girl?</a:t>
+            </a:r>
+          </a:p>
+          <a:p>
+            <a:pPr marL="0" indent="0">
+              <a:buNone/>
+            </a:pPr>
+            <a:r>
+              <a:rPr lang="en-CA" dirty="0"/>
+              <a:t>elaine: no, </a:t>
+            </a:r>
+            <a:r>
+              <a:rPr lang="en-CA" dirty="0" err="1"/>
+              <a:t>i</a:t>
+            </a:r>
+            <a:r>
+              <a:rPr lang="en-CA" dirty="0"/>
+              <a:t> got to tell him.</a:t>
+            </a:r>
+          </a:p>
+          <a:p>
+            <a:pPr marL="0" indent="0">
+              <a:buNone/>
+            </a:pPr>
+            <a:r>
+              <a:rPr lang="en-CA" dirty="0" err="1"/>
+              <a:t>george</a:t>
+            </a:r>
+            <a:r>
+              <a:rPr lang="en-CA" dirty="0"/>
+              <a:t>: </a:t>
+            </a:r>
+            <a:r>
+              <a:rPr lang="en-CA" dirty="0" err="1"/>
+              <a:t>i</a:t>
+            </a:r>
+            <a:r>
+              <a:rPr lang="en-CA" dirty="0"/>
+              <a:t> can't believe this is the most exciting thing.</a:t>
+            </a:r>
+            <a:endParaRPr lang="en-IN" dirty="0"/>
           </a:p>
         </p:txBody>
       </p:sp>
@@ -5544,15 +8314,95 @@
             <p:ph idx="1"/>
           </p:nvPr>
         </p:nvSpPr>
-        <p:spPr/>
+        <p:spPr>
+          <a:xfrm>
+            <a:off x="838200" y="1825625"/>
+            <a:ext cx="8243656" cy="4351338"/>
+          </a:xfrm>
+        </p:spPr>
         <p:txBody>
           <a:bodyPr/>
           <a:lstStyle/>
           <a:p>
-            <a:endParaRPr lang="en-IN"/>
-          </a:p>
-        </p:txBody>
-      </p:sp>
+            <a:r>
+              <a:rPr lang="en-IN" dirty="0"/>
+              <a:t>Our script generations takes a word and determine the next word in a sentence. This requires keeping a sequence or order of words.</a:t>
+            </a:r>
+          </a:p>
+          <a:p>
+            <a:r>
+              <a:rPr lang="en-IN" dirty="0"/>
+              <a:t>In Feed-Forward Network, there is no sense of order in the input. How to build order into our network ? </a:t>
+            </a:r>
+          </a:p>
+          <a:p>
+            <a:r>
+              <a:rPr lang="en-IN" dirty="0"/>
+              <a:t>Recurrence relations need to applied at each time step t, such that model learns the concepts of memory by updating the hidden state.</a:t>
+            </a:r>
+          </a:p>
+        </p:txBody>
+      </p:sp>
+      <p:pic>
+        <p:nvPicPr>
+          <p:cNvPr id="4" name="Picture 3">
+            <a:extLst>
+              <a:ext uri="{FF2B5EF4-FFF2-40B4-BE49-F238E27FC236}">
+                <a16:creationId xmlns:a16="http://schemas.microsoft.com/office/drawing/2014/main" id="{72B12D82-E265-4ECD-828E-8B11413DB33D}"/>
+              </a:ext>
+            </a:extLst>
+          </p:cNvPr>
+          <p:cNvPicPr>
+            <a:picLocks noChangeAspect="1"/>
+          </p:cNvPicPr>
+          <p:nvPr/>
+        </p:nvPicPr>
+        <p:blipFill>
+          <a:blip r:embed="rId2"/>
+          <a:stretch>
+            <a:fillRect/>
+          </a:stretch>
+        </p:blipFill>
+        <p:spPr>
+          <a:xfrm>
+            <a:off x="9081856" y="1401285"/>
+            <a:ext cx="2368859" cy="2728418"/>
+          </a:xfrm>
+          <a:prstGeom prst="rect">
+            <a:avLst/>
+          </a:prstGeom>
+        </p:spPr>
+      </p:pic>
+      <p:pic>
+        <p:nvPicPr>
+          <p:cNvPr id="5" name="Picture 4">
+            <a:extLst>
+              <a:ext uri="{FF2B5EF4-FFF2-40B4-BE49-F238E27FC236}">
+                <a16:creationId xmlns:a16="http://schemas.microsoft.com/office/drawing/2014/main" id="{DD855AF7-EC56-414B-AD79-68756D515EFE}"/>
+              </a:ext>
+            </a:extLst>
+          </p:cNvPr>
+          <p:cNvPicPr>
+            <a:picLocks noChangeAspect="1"/>
+          </p:cNvPicPr>
+          <p:nvPr/>
+        </p:nvPicPr>
+        <p:blipFill>
+          <a:blip r:embed="rId3"/>
+          <a:stretch>
+            <a:fillRect/>
+          </a:stretch>
+        </p:blipFill>
+        <p:spPr>
+          <a:xfrm>
+            <a:off x="9081857" y="4289024"/>
+            <a:ext cx="2511734" cy="1765570"/>
+          </a:xfrm>
+          <a:prstGeom prst="rect">
+            <a:avLst/>
+          </a:prstGeom>
+        </p:spPr>
+      </p:pic>
     </p:spTree>
     <p:extLst>
       <p:ext uri="{BB962C8B-B14F-4D97-AF65-F5344CB8AC3E}">
@@ -5588,7 +8438,7 @@
           <p:cNvPr id="2" name="Title 1">
             <a:extLst>
               <a:ext uri="{FF2B5EF4-FFF2-40B4-BE49-F238E27FC236}">
-                <a16:creationId xmlns:a16="http://schemas.microsoft.com/office/drawing/2014/main" id="{EBF51890-9E62-4464-927E-9C05D6102BF8}"/>
+                <a16:creationId xmlns:a16="http://schemas.microsoft.com/office/drawing/2014/main" id="{C973C04A-DF61-43B0-8DB4-3CDE18284E7D}"/>
               </a:ext>
             </a:extLst>
           </p:cNvPr>
@@ -5605,9 +8455,10 @@
           <a:lstStyle/>
           <a:p>
             <a:r>
-              <a:rPr lang="en-IN" dirty="0"/>
-              <a:t>Framework/Libraries Used</a:t>
-            </a:r>
+              <a:rPr lang="en-US" dirty="0"/>
+              <a:t>Example </a:t>
+            </a:r>
+            <a:endParaRPr lang="en-CA" dirty="0"/>
           </a:p>
         </p:txBody>
       </p:sp>
@@ -5616,7 +8467,7 @@
           <p:cNvPr id="3" name="Content Placeholder 2">
             <a:extLst>
               <a:ext uri="{FF2B5EF4-FFF2-40B4-BE49-F238E27FC236}">
-                <a16:creationId xmlns:a16="http://schemas.microsoft.com/office/drawing/2014/main" id="{F2758553-8EC4-4B34-9A6D-F9494FD8DFFD}"/>
+                <a16:creationId xmlns:a16="http://schemas.microsoft.com/office/drawing/2014/main" id="{61C85D26-52FD-4900-B647-8763986C8FB5}"/>
               </a:ext>
             </a:extLst>
           </p:cNvPr>
@@ -5627,19 +8478,84 @@
             <p:ph idx="1"/>
           </p:nvPr>
         </p:nvSpPr>
-        <p:spPr/>
-        <p:txBody>
-          <a:bodyPr/>
-          <a:lstStyle/>
-          <a:p>
-            <a:endParaRPr lang="en-IN"/>
-          </a:p>
-        </p:txBody>
-      </p:sp>
+        <p:spPr>
+          <a:xfrm>
+            <a:off x="838200" y="1825625"/>
+            <a:ext cx="4603812" cy="4351338"/>
+          </a:xfrm>
+        </p:spPr>
+        <p:txBody>
+          <a:bodyPr>
+            <a:normAutofit fontScale="85000" lnSpcReduction="20000"/>
+          </a:bodyPr>
+          <a:lstStyle/>
+          <a:p>
+            <a:r>
+              <a:rPr lang="en-US" dirty="0"/>
+              <a:t>Our goal here is to predict the next character in word “steep”</a:t>
+            </a:r>
+          </a:p>
+          <a:p>
+            <a:r>
+              <a:rPr lang="en-US" dirty="0"/>
+              <a:t>When we pass “s”, desired output is “t”. </a:t>
+            </a:r>
+          </a:p>
+          <a:p>
+            <a:r>
+              <a:rPr lang="en-US" dirty="0"/>
+              <a:t>When we pass “t”, desired output is “e”.</a:t>
+            </a:r>
+          </a:p>
+          <a:p>
+            <a:r>
+              <a:rPr lang="en-US" dirty="0"/>
+              <a:t>When we pass “e”, desired output could be “e” or “p”. The network doesn’t have enough information to determine which character to predict !</a:t>
+            </a:r>
+          </a:p>
+          <a:p>
+            <a:r>
+              <a:rPr lang="en-US" dirty="0"/>
+              <a:t>To solve this problem we need to include information about the sequence of characters.</a:t>
+            </a:r>
+            <a:endParaRPr lang="en-CA" dirty="0"/>
+          </a:p>
+        </p:txBody>
+      </p:sp>
+      <p:pic>
+        <p:nvPicPr>
+          <p:cNvPr id="4" name="Picture 3">
+            <a:extLst>
+              <a:ext uri="{FF2B5EF4-FFF2-40B4-BE49-F238E27FC236}">
+                <a16:creationId xmlns:a16="http://schemas.microsoft.com/office/drawing/2014/main" id="{1E1AB7EE-C1FE-4727-AAA4-CFF9B954D101}"/>
+              </a:ext>
+            </a:extLst>
+          </p:cNvPr>
+          <p:cNvPicPr>
+            <a:picLocks noChangeAspect="1"/>
+          </p:cNvPicPr>
+          <p:nvPr/>
+        </p:nvPicPr>
+        <p:blipFill>
+          <a:blip r:embed="rId2"/>
+          <a:stretch>
+            <a:fillRect/>
+          </a:stretch>
+        </p:blipFill>
+        <p:spPr>
+          <a:xfrm>
+            <a:off x="6586833" y="1904492"/>
+            <a:ext cx="5082123" cy="4272471"/>
+          </a:xfrm>
+          <a:prstGeom prst="rect">
+            <a:avLst/>
+          </a:prstGeom>
+        </p:spPr>
+      </p:pic>
     </p:spTree>
     <p:extLst>
       <p:ext uri="{BB962C8B-B14F-4D97-AF65-F5344CB8AC3E}">
-        <p14:creationId xmlns:p14="http://schemas.microsoft.com/office/powerpoint/2010/main" val="2998837831"/>
+        <p14:creationId xmlns:p14="http://schemas.microsoft.com/office/powerpoint/2010/main" val="2495334827"/>
       </p:ext>
     </p:extLst>
   </p:cSld>
@@ -5671,7 +8587,7 @@
           <p:cNvPr id="2" name="Title 1">
             <a:extLst>
               <a:ext uri="{FF2B5EF4-FFF2-40B4-BE49-F238E27FC236}">
-                <a16:creationId xmlns:a16="http://schemas.microsoft.com/office/drawing/2014/main" id="{19CB314F-A554-45E1-BE78-336A63D7BADC}"/>
+                <a16:creationId xmlns:a16="http://schemas.microsoft.com/office/drawing/2014/main" id="{C973C04A-DF61-43B0-8DB4-3CDE18284E7D}"/>
               </a:ext>
             </a:extLst>
           </p:cNvPr>
@@ -5688,9 +8604,10 @@
           <a:lstStyle/>
           <a:p>
             <a:r>
-              <a:rPr lang="en-IN" dirty="0"/>
-              <a:t>Pre-processing of Input data </a:t>
-            </a:r>
+              <a:rPr lang="en-US" dirty="0"/>
+              <a:t>Example</a:t>
+            </a:r>
+            <a:endParaRPr lang="en-CA" dirty="0"/>
           </a:p>
         </p:txBody>
       </p:sp>
@@ -5699,7 +8616,7 @@
           <p:cNvPr id="3" name="Content Placeholder 2">
             <a:extLst>
               <a:ext uri="{FF2B5EF4-FFF2-40B4-BE49-F238E27FC236}">
-                <a16:creationId xmlns:a16="http://schemas.microsoft.com/office/drawing/2014/main" id="{4DC3DAC3-C43C-4734-A621-BC1205C1F496}"/>
+                <a16:creationId xmlns:a16="http://schemas.microsoft.com/office/drawing/2014/main" id="{61C85D26-52FD-4900-B647-8763986C8FB5}"/>
               </a:ext>
             </a:extLst>
           </p:cNvPr>
@@ -5710,19 +8627,114 @@
             <p:ph idx="1"/>
           </p:nvPr>
         </p:nvSpPr>
-        <p:spPr/>
-        <p:txBody>
-          <a:bodyPr/>
-          <a:lstStyle/>
-          <a:p>
-            <a:endParaRPr lang="en-IN"/>
-          </a:p>
-        </p:txBody>
-      </p:sp>
+        <p:spPr>
+          <a:xfrm>
+            <a:off x="678401" y="1594806"/>
+            <a:ext cx="6175160" cy="4667250"/>
+          </a:xfrm>
+        </p:spPr>
+        <p:txBody>
+          <a:bodyPr>
+            <a:normAutofit fontScale="92500" lnSpcReduction="20000"/>
+          </a:bodyPr>
+          <a:lstStyle/>
+          <a:p>
+            <a:r>
+              <a:rPr lang="en-US" dirty="0"/>
+              <a:t>We can solve this problem we routing the hidden layer output from the previous step back into the hidden layer.</a:t>
+            </a:r>
+          </a:p>
+          <a:p>
+            <a:r>
+              <a:rPr lang="en-US" dirty="0"/>
+              <a:t>The box in the diagram means the value from the previous sequence, or time step.</a:t>
+            </a:r>
+          </a:p>
+          <a:p>
+            <a:r>
+              <a:rPr lang="en-US" dirty="0"/>
+              <a:t>Now the network sees an “e”, it knows it saw an “s” and a “t” before, so the next character should be another “e”</a:t>
+            </a:r>
+          </a:p>
+          <a:p>
+            <a:r>
+              <a:rPr lang="en-US" dirty="0"/>
+              <a:t>This architecture is known as Recurrent Neural Network or RNN</a:t>
+            </a:r>
+          </a:p>
+          <a:p>
+            <a:r>
+              <a:rPr lang="en-US" dirty="0"/>
+              <a:t>Now the total input in the hidden layer is the sum of the layered combinations from the input layer and previous hidden layer</a:t>
+            </a:r>
+            <a:endParaRPr lang="en-CA" dirty="0"/>
+          </a:p>
+        </p:txBody>
+      </p:sp>
+      <p:pic>
+        <p:nvPicPr>
+          <p:cNvPr id="5" name="Picture 4">
+            <a:extLst>
+              <a:ext uri="{FF2B5EF4-FFF2-40B4-BE49-F238E27FC236}">
+                <a16:creationId xmlns:a16="http://schemas.microsoft.com/office/drawing/2014/main" id="{BB728E48-6AAD-4BF0-BB79-F2FD2032E3BA}"/>
+              </a:ext>
+            </a:extLst>
+          </p:cNvPr>
+          <p:cNvPicPr>
+            <a:picLocks noChangeAspect="1"/>
+          </p:cNvPicPr>
+          <p:nvPr/>
+        </p:nvPicPr>
+        <p:blipFill>
+          <a:blip r:embed="rId2"/>
+          <a:stretch>
+            <a:fillRect/>
+          </a:stretch>
+        </p:blipFill>
+        <p:spPr>
+          <a:xfrm>
+            <a:off x="7227005" y="489413"/>
+            <a:ext cx="4126795" cy="4658427"/>
+          </a:xfrm>
+          <a:prstGeom prst="rect">
+            <a:avLst/>
+          </a:prstGeom>
+        </p:spPr>
+      </p:pic>
+      <p:pic>
+        <p:nvPicPr>
+          <p:cNvPr id="6" name="Picture 5">
+            <a:extLst>
+              <a:ext uri="{FF2B5EF4-FFF2-40B4-BE49-F238E27FC236}">
+                <a16:creationId xmlns:a16="http://schemas.microsoft.com/office/drawing/2014/main" id="{6AED5F21-3AFC-422F-9A6A-326A7E8DA16E}"/>
+              </a:ext>
+            </a:extLst>
+          </p:cNvPr>
+          <p:cNvPicPr>
+            <a:picLocks noChangeAspect="1"/>
+          </p:cNvPicPr>
+          <p:nvPr/>
+        </p:nvPicPr>
+        <p:blipFill>
+          <a:blip r:embed="rId3"/>
+          <a:stretch>
+            <a:fillRect/>
+          </a:stretch>
+        </p:blipFill>
+        <p:spPr>
+          <a:xfrm>
+            <a:off x="7265791" y="5432237"/>
+            <a:ext cx="4088009" cy="729029"/>
+          </a:xfrm>
+          <a:prstGeom prst="rect">
+            <a:avLst/>
+          </a:prstGeom>
+        </p:spPr>
+      </p:pic>
     </p:spTree>
     <p:extLst>
       <p:ext uri="{BB962C8B-B14F-4D97-AF65-F5344CB8AC3E}">
-        <p14:creationId xmlns:p14="http://schemas.microsoft.com/office/powerpoint/2010/main" val="4063040355"/>
+        <p14:creationId xmlns:p14="http://schemas.microsoft.com/office/powerpoint/2010/main" val="3003024813"/>
       </p:ext>
     </p:extLst>
   </p:cSld>
@@ -5754,7 +8766,7 @@
           <p:cNvPr id="2" name="Title 1">
             <a:extLst>
               <a:ext uri="{FF2B5EF4-FFF2-40B4-BE49-F238E27FC236}">
-                <a16:creationId xmlns:a16="http://schemas.microsoft.com/office/drawing/2014/main" id="{0913B5EB-A318-4652-9A0A-AF6487187C2E}"/>
+                <a16:creationId xmlns:a16="http://schemas.microsoft.com/office/drawing/2014/main" id="{C973C04A-DF61-43B0-8DB4-3CDE18284E7D}"/>
               </a:ext>
             </a:extLst>
           </p:cNvPr>
@@ -5771,9 +8783,10 @@
           <a:lstStyle/>
           <a:p>
             <a:r>
-              <a:rPr lang="en-IN" dirty="0"/>
-              <a:t>Creating batches of data </a:t>
-            </a:r>
+              <a:rPr lang="en-US" dirty="0"/>
+              <a:t>Example</a:t>
+            </a:r>
+            <a:endParaRPr lang="en-CA" dirty="0"/>
           </a:p>
         </p:txBody>
       </p:sp>
@@ -5782,7 +8795,7 @@
           <p:cNvPr id="3" name="Content Placeholder 2">
             <a:extLst>
               <a:ext uri="{FF2B5EF4-FFF2-40B4-BE49-F238E27FC236}">
-                <a16:creationId xmlns:a16="http://schemas.microsoft.com/office/drawing/2014/main" id="{D9E39990-C9E9-491A-B187-87AC0314DA90}"/>
+                <a16:creationId xmlns:a16="http://schemas.microsoft.com/office/drawing/2014/main" id="{61C85D26-52FD-4900-B647-8763986C8FB5}"/>
               </a:ext>
             </a:extLst>
           </p:cNvPr>
@@ -5793,19 +8806,72 @@
             <p:ph idx="1"/>
           </p:nvPr>
         </p:nvSpPr>
-        <p:spPr/>
-        <p:txBody>
-          <a:bodyPr/>
-          <a:lstStyle/>
-          <a:p>
-            <a:endParaRPr lang="en-IN"/>
-          </a:p>
-        </p:txBody>
-      </p:sp>
+        <p:spPr>
+          <a:xfrm>
+            <a:off x="678401" y="1594806"/>
+            <a:ext cx="6175160" cy="4667250"/>
+          </a:xfrm>
+        </p:spPr>
+        <p:txBody>
+          <a:bodyPr>
+            <a:normAutofit/>
+          </a:bodyPr>
+          <a:lstStyle/>
+          <a:p>
+            <a:r>
+              <a:rPr lang="en-US" dirty="0"/>
+              <a:t>We can view our recurrent network as one big graph by unrolling it.</a:t>
+            </a:r>
+          </a:p>
+          <a:p>
+            <a:r>
+              <a:rPr lang="en-US" dirty="0"/>
+              <a:t>Now, we have a feed-forward network for each character but connected through the hidden layers.</a:t>
+            </a:r>
+          </a:p>
+          <a:p>
+            <a:r>
+              <a:rPr lang="en-US" dirty="0"/>
+              <a:t>Each hidden nodes receives inputs from input node  and hidden node from the previous step</a:t>
+            </a:r>
+            <a:endParaRPr lang="en-CA" dirty="0"/>
+          </a:p>
+        </p:txBody>
+      </p:sp>
+      <p:pic>
+        <p:nvPicPr>
+          <p:cNvPr id="4" name="Picture 3">
+            <a:extLst>
+              <a:ext uri="{FF2B5EF4-FFF2-40B4-BE49-F238E27FC236}">
+                <a16:creationId xmlns:a16="http://schemas.microsoft.com/office/drawing/2014/main" id="{B3315119-3AD1-4C24-B406-BA8996723302}"/>
+              </a:ext>
+            </a:extLst>
+          </p:cNvPr>
+          <p:cNvPicPr>
+            <a:picLocks noChangeAspect="1"/>
+          </p:cNvPicPr>
+          <p:nvPr/>
+        </p:nvPicPr>
+        <p:blipFill>
+          <a:blip r:embed="rId2"/>
+          <a:stretch>
+            <a:fillRect/>
+          </a:stretch>
+        </p:blipFill>
+        <p:spPr>
+          <a:xfrm>
+            <a:off x="7632815" y="1309502"/>
+            <a:ext cx="4244999" cy="4238995"/>
+          </a:xfrm>
+          <a:prstGeom prst="rect">
+            <a:avLst/>
+          </a:prstGeom>
+        </p:spPr>
+      </p:pic>
     </p:spTree>
     <p:extLst>
       <p:ext uri="{BB962C8B-B14F-4D97-AF65-F5344CB8AC3E}">
-        <p14:creationId xmlns:p14="http://schemas.microsoft.com/office/powerpoint/2010/main" val="856473193"/>
+        <p14:creationId xmlns:p14="http://schemas.microsoft.com/office/powerpoint/2010/main" val="403383643"/>
       </p:ext>
     </p:extLst>
   </p:cSld>
@@ -5837,7 +8903,7 @@
           <p:cNvPr id="2" name="Title 1">
             <a:extLst>
               <a:ext uri="{FF2B5EF4-FFF2-40B4-BE49-F238E27FC236}">
-                <a16:creationId xmlns:a16="http://schemas.microsoft.com/office/drawing/2014/main" id="{E9CA9394-F7A3-4D0E-B802-4EBADD856421}"/>
+                <a16:creationId xmlns:a16="http://schemas.microsoft.com/office/drawing/2014/main" id="{C973C04A-DF61-43B0-8DB4-3CDE18284E7D}"/>
               </a:ext>
             </a:extLst>
           </p:cNvPr>
@@ -5854,9 +8920,10 @@
           <a:lstStyle/>
           <a:p>
             <a:r>
-              <a:rPr lang="en-IN" dirty="0"/>
-              <a:t>Neural Network Architecture</a:t>
-            </a:r>
+              <a:rPr lang="en-US" dirty="0"/>
+              <a:t>Example</a:t>
+            </a:r>
+            <a:endParaRPr lang="en-CA" dirty="0"/>
           </a:p>
         </p:txBody>
       </p:sp>
@@ -5865,7 +8932,7 @@
           <p:cNvPr id="3" name="Content Placeholder 2">
             <a:extLst>
               <a:ext uri="{FF2B5EF4-FFF2-40B4-BE49-F238E27FC236}">
-                <a16:creationId xmlns:a16="http://schemas.microsoft.com/office/drawing/2014/main" id="{66374872-F7F3-4D90-A746-81D5F82F782F}"/>
+                <a16:creationId xmlns:a16="http://schemas.microsoft.com/office/drawing/2014/main" id="{61C85D26-52FD-4900-B647-8763986C8FB5}"/>
               </a:ext>
             </a:extLst>
           </p:cNvPr>
@@ -5876,19 +8943,100 @@
             <p:ph idx="1"/>
           </p:nvPr>
         </p:nvSpPr>
-        <p:spPr/>
-        <p:txBody>
-          <a:bodyPr/>
-          <a:lstStyle/>
-          <a:p>
-            <a:endParaRPr lang="en-IN"/>
-          </a:p>
-        </p:txBody>
-      </p:sp>
+        <p:spPr>
+          <a:xfrm>
+            <a:off x="678401" y="1594806"/>
+            <a:ext cx="6175160" cy="4667250"/>
+          </a:xfrm>
+        </p:spPr>
+        <p:txBody>
+          <a:bodyPr>
+            <a:normAutofit fontScale="92500" lnSpcReduction="20000"/>
+          </a:bodyPr>
+          <a:lstStyle/>
+          <a:p>
+            <a:r>
+              <a:rPr lang="en-US" dirty="0"/>
+              <a:t>Let’s visualize by adding some numbers here</a:t>
+            </a:r>
+          </a:p>
+          <a:p>
+            <a:r>
+              <a:rPr lang="en-US" dirty="0"/>
+              <a:t>Here, we’re one hot encoding the input characters. </a:t>
+            </a:r>
+          </a:p>
+          <a:p>
+            <a:r>
+              <a:rPr lang="en-US" dirty="0"/>
+              <a:t>1000 = “s”, 0100 = “t”, “0010” = “e”, 0010 = “e”</a:t>
+            </a:r>
+          </a:p>
+          <a:p>
+            <a:r>
+              <a:rPr lang="en-US" dirty="0"/>
+              <a:t>There are three units in the hidden layer and the output layer is showing the logits</a:t>
+            </a:r>
+          </a:p>
+          <a:p>
+            <a:r>
+              <a:rPr lang="en-US" dirty="0"/>
+              <a:t>We pass the logits into </a:t>
+            </a:r>
+            <a:r>
+              <a:rPr lang="en-US" dirty="0" err="1"/>
+              <a:t>Softmax</a:t>
+            </a:r>
+            <a:r>
+              <a:rPr lang="en-US" dirty="0"/>
+              <a:t> function to get prediction and to train with a cross entropy loss.</a:t>
+            </a:r>
+          </a:p>
+          <a:p>
+            <a:r>
+              <a:rPr lang="en-US" dirty="0"/>
+              <a:t>This is basic architecture for Character-Wise RNN.</a:t>
+            </a:r>
+          </a:p>
+          <a:p>
+            <a:endParaRPr lang="en-CA" dirty="0"/>
+          </a:p>
+        </p:txBody>
+      </p:sp>
+      <p:pic>
+        <p:nvPicPr>
+          <p:cNvPr id="5" name="Picture 4">
+            <a:extLst>
+              <a:ext uri="{FF2B5EF4-FFF2-40B4-BE49-F238E27FC236}">
+                <a16:creationId xmlns:a16="http://schemas.microsoft.com/office/drawing/2014/main" id="{7B2D4CDF-FC55-4C5F-9DB5-F1906D7A5FD8}"/>
+              </a:ext>
+            </a:extLst>
+          </p:cNvPr>
+          <p:cNvPicPr>
+            <a:picLocks noChangeAspect="1"/>
+          </p:cNvPicPr>
+          <p:nvPr/>
+        </p:nvPicPr>
+        <p:blipFill>
+          <a:blip r:embed="rId3"/>
+          <a:stretch>
+            <a:fillRect/>
+          </a:stretch>
+        </p:blipFill>
+        <p:spPr>
+          <a:xfrm>
+            <a:off x="7013360" y="1594806"/>
+            <a:ext cx="4893196" cy="3978784"/>
+          </a:xfrm>
+          <a:prstGeom prst="rect">
+            <a:avLst/>
+          </a:prstGeom>
+        </p:spPr>
+      </p:pic>
     </p:spTree>
     <p:extLst>
       <p:ext uri="{BB962C8B-B14F-4D97-AF65-F5344CB8AC3E}">
-        <p14:creationId xmlns:p14="http://schemas.microsoft.com/office/powerpoint/2010/main" val="1605735911"/>
+        <p14:creationId xmlns:p14="http://schemas.microsoft.com/office/powerpoint/2010/main" val="740506803"/>
       </p:ext>
     </p:extLst>
   </p:cSld>

</xml_diff>

<commit_message>
Saving the progress on presentation
</commit_message>
<xml_diff>
--- a/Presentation.pptx
+++ b/Presentation.pptx
@@ -5,7 +5,7 @@
     <p:sldMasterId id="2147483756" r:id="rId1"/>
   </p:sldMasterIdLst>
   <p:notesMasterIdLst>
-    <p:notesMasterId r:id="rId28"/>
+    <p:notesMasterId r:id="rId36"/>
   </p:notesMasterIdLst>
   <p:sldIdLst>
     <p:sldId id="256" r:id="rId2"/>
@@ -28,12 +28,20 @@
     <p:sldId id="281" r:id="rId19"/>
     <p:sldId id="261" r:id="rId20"/>
     <p:sldId id="262" r:id="rId21"/>
-    <p:sldId id="263" r:id="rId22"/>
-    <p:sldId id="264" r:id="rId23"/>
-    <p:sldId id="265" r:id="rId24"/>
-    <p:sldId id="266" r:id="rId25"/>
-    <p:sldId id="267" r:id="rId26"/>
-    <p:sldId id="268" r:id="rId27"/>
+    <p:sldId id="282" r:id="rId22"/>
+    <p:sldId id="263" r:id="rId23"/>
+    <p:sldId id="283" r:id="rId24"/>
+    <p:sldId id="264" r:id="rId25"/>
+    <p:sldId id="284" r:id="rId26"/>
+    <p:sldId id="285" r:id="rId27"/>
+    <p:sldId id="265" r:id="rId28"/>
+    <p:sldId id="286" r:id="rId29"/>
+    <p:sldId id="266" r:id="rId30"/>
+    <p:sldId id="287" r:id="rId31"/>
+    <p:sldId id="289" r:id="rId32"/>
+    <p:sldId id="288" r:id="rId33"/>
+    <p:sldId id="267" r:id="rId34"/>
+    <p:sldId id="290" r:id="rId35"/>
   </p:sldIdLst>
   <p:sldSz cx="12192000" cy="6858000"/>
   <p:notesSz cx="6858000" cy="9144000"/>
@@ -4900,7 +4908,7 @@
             <a:round/>
             <a:extLst>
               <a:ext uri="{C807C97D-BFC1-408E-A445-0C87EB9F89A2}">
-                <ask:lineSketchStyleProps xmlns:ask="http://schemas.microsoft.com/office/drawing/2018/sketchyshapes" xmlns="" sd="1219033472">
+                <ask:lineSketchStyleProps xmlns:ask="http://schemas.microsoft.com/office/drawing/2018/sketchyshapes" sd="1219033472">
                   <a:prstGeom prst="rect">
                     <a:avLst/>
                   </a:prstGeom>
@@ -6335,7 +6343,7 @@
           <a:p>
             <a:r>
               <a:rPr lang="en-US" dirty="0"/>
-              <a:t>How this fix the gradient problem ?</a:t>
+              <a:t>How  fix the gradient problem ?</a:t>
             </a:r>
             <a:endParaRPr lang="en-CA" dirty="0"/>
           </a:p>
@@ -6524,7 +6532,27 @@
           <a:bodyPr/>
           <a:lstStyle/>
           <a:p>
-            <a:endParaRPr lang="en-IN"/>
+            <a:r>
+              <a:rPr lang="en-IN" dirty="0" err="1"/>
+              <a:t>Pytorch</a:t>
+            </a:r>
+            <a:endParaRPr lang="en-IN" dirty="0"/>
+          </a:p>
+          <a:p>
+            <a:r>
+              <a:rPr lang="en-IN" dirty="0" err="1"/>
+              <a:t>numpy</a:t>
+            </a:r>
+            <a:r>
+              <a:rPr lang="en-IN" dirty="0"/>
+              <a:t> </a:t>
+            </a:r>
+          </a:p>
+          <a:p>
+            <a:r>
+              <a:rPr lang="en-IN" dirty="0"/>
+              <a:t>pickle</a:t>
+            </a:r>
           </a:p>
         </p:txBody>
       </p:sp>
@@ -6768,15 +6796,87 @@
             <p:ph idx="1"/>
           </p:nvPr>
         </p:nvSpPr>
-        <p:spPr/>
-        <p:txBody>
-          <a:bodyPr/>
-          <a:lstStyle/>
-          <a:p>
-            <a:endParaRPr lang="en-IN"/>
-          </a:p>
-        </p:txBody>
-      </p:sp>
+        <p:spPr>
+          <a:xfrm>
+            <a:off x="617483" y="1690688"/>
+            <a:ext cx="5257800" cy="4351338"/>
+          </a:xfrm>
+        </p:spPr>
+        <p:txBody>
+          <a:bodyPr>
+            <a:normAutofit fontScale="92500" lnSpcReduction="10000"/>
+          </a:bodyPr>
+          <a:lstStyle/>
+          <a:p>
+            <a:r>
+              <a:rPr lang="en-IN" dirty="0"/>
+              <a:t>Changing the entire data set into lowercase </a:t>
+            </a:r>
+          </a:p>
+          <a:p>
+            <a:r>
+              <a:rPr lang="en-IN" dirty="0"/>
+              <a:t>Splitting the sentences to get all the words</a:t>
+            </a:r>
+          </a:p>
+          <a:p>
+            <a:r>
+              <a:rPr lang="en-IN" dirty="0"/>
+              <a:t>Creating lookup table to generate word embeddings i.e. transforms the word to integer ids</a:t>
+            </a:r>
+          </a:p>
+          <a:p>
+            <a:r>
+              <a:rPr lang="en-IN" b="1" dirty="0" err="1"/>
+              <a:t>vocab_to_int</a:t>
+            </a:r>
+            <a:r>
+              <a:rPr lang="en-IN" dirty="0"/>
+              <a:t> : dictionary to go from a word to id</a:t>
+            </a:r>
+          </a:p>
+          <a:p>
+            <a:r>
+              <a:rPr lang="en-IN" b="1" dirty="0" err="1"/>
+              <a:t>int_to_vocab</a:t>
+            </a:r>
+            <a:r>
+              <a:rPr lang="en-IN" dirty="0"/>
+              <a:t> : dictionary to go from the id to word  </a:t>
+            </a:r>
+          </a:p>
+        </p:txBody>
+      </p:sp>
+      <p:pic>
+        <p:nvPicPr>
+          <p:cNvPr id="5" name="Picture 4">
+            <a:extLst>
+              <a:ext uri="{FF2B5EF4-FFF2-40B4-BE49-F238E27FC236}">
+                <a16:creationId xmlns:a16="http://schemas.microsoft.com/office/drawing/2014/main" id="{01505825-A922-41CB-95E3-963DFDAD80EA}"/>
+              </a:ext>
+            </a:extLst>
+          </p:cNvPr>
+          <p:cNvPicPr>
+            <a:picLocks noChangeAspect="1"/>
+          </p:cNvPicPr>
+          <p:nvPr/>
+        </p:nvPicPr>
+        <p:blipFill>
+          <a:blip r:embed="rId2"/>
+          <a:stretch>
+            <a:fillRect/>
+          </a:stretch>
+        </p:blipFill>
+        <p:spPr>
+          <a:xfrm>
+            <a:off x="5875283" y="1835890"/>
+            <a:ext cx="6193142" cy="2052937"/>
+          </a:xfrm>
+          <a:prstGeom prst="rect">
+            <a:avLst/>
+          </a:prstGeom>
+        </p:spPr>
+      </p:pic>
     </p:spTree>
     <p:extLst>
       <p:ext uri="{BB962C8B-B14F-4D97-AF65-F5344CB8AC3E}">
@@ -6812,7 +6912,7 @@
           <p:cNvPr id="2" name="Title 1">
             <a:extLst>
               <a:ext uri="{FF2B5EF4-FFF2-40B4-BE49-F238E27FC236}">
-                <a16:creationId xmlns:a16="http://schemas.microsoft.com/office/drawing/2014/main" id="{0913B5EB-A318-4652-9A0A-AF6487187C2E}"/>
+                <a16:creationId xmlns:a16="http://schemas.microsoft.com/office/drawing/2014/main" id="{19CB314F-A554-45E1-BE78-336A63D7BADC}"/>
               </a:ext>
             </a:extLst>
           </p:cNvPr>
@@ -6830,7 +6930,7 @@
           <a:p>
             <a:r>
               <a:rPr lang="en-IN" dirty="0"/>
-              <a:t>Creating batches of data </a:t>
+              <a:t>Pre-processing of Input data </a:t>
             </a:r>
           </a:p>
         </p:txBody>
@@ -6840,7 +6940,7 @@
           <p:cNvPr id="3" name="Content Placeholder 2">
             <a:extLst>
               <a:ext uri="{FF2B5EF4-FFF2-40B4-BE49-F238E27FC236}">
-                <a16:creationId xmlns:a16="http://schemas.microsoft.com/office/drawing/2014/main" id="{D9E39990-C9E9-491A-B187-87AC0314DA90}"/>
+                <a16:creationId xmlns:a16="http://schemas.microsoft.com/office/drawing/2014/main" id="{4DC3DAC3-C43C-4734-A621-BC1205C1F496}"/>
               </a:ext>
             </a:extLst>
           </p:cNvPr>
@@ -6851,19 +6951,71 @@
             <p:ph idx="1"/>
           </p:nvPr>
         </p:nvSpPr>
-        <p:spPr/>
-        <p:txBody>
-          <a:bodyPr/>
-          <a:lstStyle/>
-          <a:p>
-            <a:endParaRPr lang="en-IN"/>
-          </a:p>
-        </p:txBody>
-      </p:sp>
+        <p:spPr>
+          <a:xfrm>
+            <a:off x="617483" y="1690688"/>
+            <a:ext cx="5257800" cy="4351338"/>
+          </a:xfrm>
+        </p:spPr>
+        <p:txBody>
+          <a:bodyPr>
+            <a:normAutofit fontScale="92500" lnSpcReduction="10000"/>
+          </a:bodyPr>
+          <a:lstStyle/>
+          <a:p>
+            <a:r>
+              <a:rPr lang="en-IN" dirty="0"/>
+              <a:t>Tokenize Punctuation</a:t>
+            </a:r>
+          </a:p>
+          <a:p>
+            <a:r>
+              <a:rPr lang="en-IN" dirty="0"/>
+              <a:t>Punctuations like periods and exclamation marks can create multiple ids for the same word. For e.g. bye, bye!</a:t>
+            </a:r>
+          </a:p>
+          <a:p>
+            <a:r>
+              <a:rPr lang="en-IN" dirty="0"/>
+              <a:t>This dictionary will be used to tokenize the symbols and add the delimiter (space) around it. This separates each symbols as its own word, making it easier for the neural network to predict the next word.</a:t>
+            </a:r>
+          </a:p>
+        </p:txBody>
+      </p:sp>
+      <p:pic>
+        <p:nvPicPr>
+          <p:cNvPr id="6" name="Picture 5">
+            <a:extLst>
+              <a:ext uri="{FF2B5EF4-FFF2-40B4-BE49-F238E27FC236}">
+                <a16:creationId xmlns:a16="http://schemas.microsoft.com/office/drawing/2014/main" id="{CC112EF2-9815-4F69-8F38-A5469BD43C19}"/>
+              </a:ext>
+            </a:extLst>
+          </p:cNvPr>
+          <p:cNvPicPr>
+            <a:picLocks noChangeAspect="1"/>
+          </p:cNvPicPr>
+          <p:nvPr/>
+        </p:nvPicPr>
+        <p:blipFill>
+          <a:blip r:embed="rId2"/>
+          <a:stretch>
+            <a:fillRect/>
+          </a:stretch>
+        </p:blipFill>
+        <p:spPr>
+          <a:xfrm>
+            <a:off x="6867525" y="1428421"/>
+            <a:ext cx="4486275" cy="4400550"/>
+          </a:xfrm>
+          <a:prstGeom prst="rect">
+            <a:avLst/>
+          </a:prstGeom>
+        </p:spPr>
+      </p:pic>
     </p:spTree>
     <p:extLst>
       <p:ext uri="{BB962C8B-B14F-4D97-AF65-F5344CB8AC3E}">
-        <p14:creationId xmlns:p14="http://schemas.microsoft.com/office/powerpoint/2010/main" val="856473193"/>
+        <p14:creationId xmlns:p14="http://schemas.microsoft.com/office/powerpoint/2010/main" val="2941247207"/>
       </p:ext>
     </p:extLst>
   </p:cSld>
@@ -6895,7 +7047,7 @@
           <p:cNvPr id="2" name="Title 1">
             <a:extLst>
               <a:ext uri="{FF2B5EF4-FFF2-40B4-BE49-F238E27FC236}">
-                <a16:creationId xmlns:a16="http://schemas.microsoft.com/office/drawing/2014/main" id="{E9CA9394-F7A3-4D0E-B802-4EBADD856421}"/>
+                <a16:creationId xmlns:a16="http://schemas.microsoft.com/office/drawing/2014/main" id="{0913B5EB-A318-4652-9A0A-AF6487187C2E}"/>
               </a:ext>
             </a:extLst>
           </p:cNvPr>
@@ -6906,14 +7058,19 @@
             <p:ph type="title"/>
           </p:nvPr>
         </p:nvSpPr>
-        <p:spPr/>
+        <p:spPr>
+          <a:xfrm>
+            <a:off x="438807" y="365125"/>
+            <a:ext cx="10515600" cy="1325563"/>
+          </a:xfrm>
+        </p:spPr>
         <p:txBody>
           <a:bodyPr/>
           <a:lstStyle/>
           <a:p>
             <a:r>
               <a:rPr lang="en-IN" dirty="0"/>
-              <a:t>Neural Network Architecture</a:t>
+              <a:t>Creating batches of data </a:t>
             </a:r>
           </a:p>
         </p:txBody>
@@ -6923,7 +7080,7 @@
           <p:cNvPr id="3" name="Content Placeholder 2">
             <a:extLst>
               <a:ext uri="{FF2B5EF4-FFF2-40B4-BE49-F238E27FC236}">
-                <a16:creationId xmlns:a16="http://schemas.microsoft.com/office/drawing/2014/main" id="{66374872-F7F3-4D90-A746-81D5F82F782F}"/>
+                <a16:creationId xmlns:a16="http://schemas.microsoft.com/office/drawing/2014/main" id="{D9E39990-C9E9-491A-B187-87AC0314DA90}"/>
               </a:ext>
             </a:extLst>
           </p:cNvPr>
@@ -6934,19 +7091,198 @@
             <p:ph idx="1"/>
           </p:nvPr>
         </p:nvSpPr>
-        <p:spPr/>
-        <p:txBody>
-          <a:bodyPr/>
-          <a:lstStyle/>
-          <a:p>
-            <a:endParaRPr lang="en-IN"/>
-          </a:p>
-        </p:txBody>
-      </p:sp>
+        <p:spPr>
+          <a:xfrm>
+            <a:off x="322218" y="1690688"/>
+            <a:ext cx="6026031" cy="4351338"/>
+          </a:xfrm>
+        </p:spPr>
+        <p:txBody>
+          <a:bodyPr>
+            <a:normAutofit fontScale="77500" lnSpcReduction="20000"/>
+          </a:bodyPr>
+          <a:lstStyle/>
+          <a:p>
+            <a:r>
+              <a:rPr lang="en-IN" b="1" dirty="0" err="1"/>
+              <a:t>batch_data</a:t>
+            </a:r>
+            <a:r>
+              <a:rPr lang="en-IN" b="1" dirty="0"/>
+              <a:t> </a:t>
+            </a:r>
+            <a:r>
+              <a:rPr lang="en-IN" dirty="0"/>
+              <a:t>function to batch words data into chunks of size </a:t>
+            </a:r>
+            <a:r>
+              <a:rPr lang="en-IN" b="1" dirty="0" err="1"/>
+              <a:t>batch_size</a:t>
+            </a:r>
+            <a:r>
+              <a:rPr lang="en-IN" b="1" dirty="0"/>
+              <a:t> </a:t>
+            </a:r>
+            <a:r>
+              <a:rPr lang="en-IN" dirty="0"/>
+              <a:t>using </a:t>
+            </a:r>
+            <a:r>
+              <a:rPr lang="en-IN" dirty="0" err="1"/>
+              <a:t>pytorch’s</a:t>
+            </a:r>
+            <a:r>
+              <a:rPr lang="en-IN" dirty="0"/>
+              <a:t> </a:t>
+            </a:r>
+            <a:r>
+              <a:rPr lang="en-IN" dirty="0" err="1"/>
+              <a:t>DataLoader</a:t>
+            </a:r>
+            <a:r>
+              <a:rPr lang="en-IN" dirty="0"/>
+              <a:t> classes.</a:t>
+            </a:r>
+          </a:p>
+          <a:p>
+            <a:r>
+              <a:rPr lang="en-IN" dirty="0" err="1"/>
+              <a:t>DataLoader</a:t>
+            </a:r>
+            <a:r>
+              <a:rPr lang="en-IN" dirty="0"/>
+              <a:t> class will help to create </a:t>
+            </a:r>
+            <a:r>
+              <a:rPr lang="en-IN" dirty="0" err="1"/>
+              <a:t>feature_tensors</a:t>
+            </a:r>
+            <a:r>
+              <a:rPr lang="en-IN" dirty="0"/>
+              <a:t> and </a:t>
+            </a:r>
+            <a:r>
+              <a:rPr lang="en-IN" dirty="0" err="1"/>
+              <a:t>target_tensors</a:t>
+            </a:r>
+            <a:r>
+              <a:rPr lang="en-IN" dirty="0"/>
+              <a:t> of correct size and content of given </a:t>
+            </a:r>
+            <a:r>
+              <a:rPr lang="en-IN" dirty="0" err="1"/>
+              <a:t>sequence_length</a:t>
+            </a:r>
+            <a:endParaRPr lang="en-IN" dirty="0"/>
+          </a:p>
+          <a:p>
+            <a:r>
+              <a:rPr lang="en-IN" dirty="0"/>
+              <a:t>E.g. words = [1, 2, 3, 4, 5, 6, 7]</a:t>
+            </a:r>
+          </a:p>
+          <a:p>
+            <a:r>
+              <a:rPr lang="en-IN" b="1" dirty="0" err="1"/>
+              <a:t>sequence_length</a:t>
+            </a:r>
+            <a:r>
+              <a:rPr lang="en-IN" dirty="0"/>
+              <a:t> = 4</a:t>
+            </a:r>
+          </a:p>
+          <a:p>
+            <a:r>
+              <a:rPr lang="en-IN" dirty="0"/>
+              <a:t>First </a:t>
+            </a:r>
+            <a:r>
+              <a:rPr lang="en-IN" b="1" dirty="0" err="1"/>
+              <a:t>feature_tensor</a:t>
+            </a:r>
+            <a:r>
+              <a:rPr lang="en-IN" dirty="0"/>
+              <a:t> would be : [1, 2, 3, 4]</a:t>
+            </a:r>
+          </a:p>
+          <a:p>
+            <a:r>
+              <a:rPr lang="en-IN" dirty="0"/>
+              <a:t>The corresponding </a:t>
+            </a:r>
+            <a:r>
+              <a:rPr lang="en-IN" b="1" dirty="0" err="1"/>
+              <a:t>target_tensor</a:t>
+            </a:r>
+            <a:r>
+              <a:rPr lang="en-IN" dirty="0"/>
+              <a:t> would be: 5</a:t>
+            </a:r>
+          </a:p>
+          <a:p>
+            <a:r>
+              <a:rPr lang="en-IN" dirty="0"/>
+              <a:t>Second </a:t>
+            </a:r>
+            <a:r>
+              <a:rPr lang="en-IN" b="1" dirty="0" err="1"/>
+              <a:t>feature_tensor</a:t>
+            </a:r>
+            <a:r>
+              <a:rPr lang="en-IN" dirty="0"/>
+              <a:t> would be : [2, 3, 4, 5]</a:t>
+            </a:r>
+          </a:p>
+          <a:p>
+            <a:r>
+              <a:rPr lang="en-IN" dirty="0"/>
+              <a:t>And the second </a:t>
+            </a:r>
+            <a:r>
+              <a:rPr lang="en-IN" b="1" dirty="0" err="1"/>
+              <a:t>target_tensor</a:t>
+            </a:r>
+            <a:r>
+              <a:rPr lang="en-IN" dirty="0"/>
+              <a:t> would be : 6</a:t>
+            </a:r>
+          </a:p>
+        </p:txBody>
+      </p:sp>
+      <p:pic>
+        <p:nvPicPr>
+          <p:cNvPr id="5" name="Picture 4">
+            <a:extLst>
+              <a:ext uri="{FF2B5EF4-FFF2-40B4-BE49-F238E27FC236}">
+                <a16:creationId xmlns:a16="http://schemas.microsoft.com/office/drawing/2014/main" id="{AF45C919-496C-4D2F-8890-D18F73FFB0D3}"/>
+              </a:ext>
+            </a:extLst>
+          </p:cNvPr>
+          <p:cNvPicPr>
+            <a:picLocks noChangeAspect="1"/>
+          </p:cNvPicPr>
+          <p:nvPr/>
+        </p:nvPicPr>
+        <p:blipFill>
+          <a:blip r:embed="rId2"/>
+          <a:stretch>
+            <a:fillRect/>
+          </a:stretch>
+        </p:blipFill>
+        <p:spPr>
+          <a:xfrm>
+            <a:off x="6348249" y="1690688"/>
+            <a:ext cx="5521533" cy="3785202"/>
+          </a:xfrm>
+          <a:prstGeom prst="rect">
+            <a:avLst/>
+          </a:prstGeom>
+        </p:spPr>
+      </p:pic>
     </p:spTree>
     <p:extLst>
       <p:ext uri="{BB962C8B-B14F-4D97-AF65-F5344CB8AC3E}">
-        <p14:creationId xmlns:p14="http://schemas.microsoft.com/office/powerpoint/2010/main" val="1605735911"/>
+        <p14:creationId xmlns:p14="http://schemas.microsoft.com/office/powerpoint/2010/main" val="856473193"/>
       </p:ext>
     </p:extLst>
   </p:cSld>
@@ -6978,7 +7314,7 @@
           <p:cNvPr id="2" name="Title 1">
             <a:extLst>
               <a:ext uri="{FF2B5EF4-FFF2-40B4-BE49-F238E27FC236}">
-                <a16:creationId xmlns:a16="http://schemas.microsoft.com/office/drawing/2014/main" id="{B734B636-6FCA-4D65-BFF0-C521F7C770F0}"/>
+                <a16:creationId xmlns:a16="http://schemas.microsoft.com/office/drawing/2014/main" id="{7EE7A9E0-CB51-46AE-B4F8-DA600BF4C08C}"/>
               </a:ext>
             </a:extLst>
           </p:cNvPr>
@@ -6996,7 +7332,15 @@
           <a:p>
             <a:r>
               <a:rPr lang="en-IN" dirty="0"/>
-              <a:t>Backpropagation</a:t>
+              <a:t>How </a:t>
+            </a:r>
+            <a:r>
+              <a:rPr lang="en-IN" dirty="0" err="1"/>
+              <a:t>dataloader</a:t>
+            </a:r>
+            <a:r>
+              <a:rPr lang="en-IN" dirty="0"/>
+              <a:t> looks like </a:t>
             </a:r>
           </a:p>
         </p:txBody>
@@ -7006,7 +7350,7 @@
           <p:cNvPr id="3" name="Content Placeholder 2">
             <a:extLst>
               <a:ext uri="{FF2B5EF4-FFF2-40B4-BE49-F238E27FC236}">
-                <a16:creationId xmlns:a16="http://schemas.microsoft.com/office/drawing/2014/main" id="{7DA921A4-A19B-4196-A3AD-A34DB25C32FB}"/>
+                <a16:creationId xmlns:a16="http://schemas.microsoft.com/office/drawing/2014/main" id="{BF58F395-9299-4889-9798-1D57A49A97D0}"/>
               </a:ext>
             </a:extLst>
           </p:cNvPr>
@@ -7017,19 +7361,100 @@
             <p:ph idx="1"/>
           </p:nvPr>
         </p:nvSpPr>
-        <p:spPr/>
+        <p:spPr>
+          <a:xfrm>
+            <a:off x="838200" y="1825625"/>
+            <a:ext cx="4313183" cy="4351338"/>
+          </a:xfrm>
+        </p:spPr>
         <p:txBody>
           <a:bodyPr/>
           <a:lstStyle/>
           <a:p>
-            <a:endParaRPr lang="en-IN"/>
-          </a:p>
-        </p:txBody>
-      </p:sp>
+            <a:r>
+              <a:rPr lang="en-IN" dirty="0"/>
+              <a:t>Sample batch of inputs </a:t>
+            </a:r>
+            <a:r>
+              <a:rPr lang="en-IN" i="1" dirty="0" err="1"/>
+              <a:t>sample_x</a:t>
+            </a:r>
+            <a:r>
+              <a:rPr lang="en-IN" i="1" dirty="0"/>
+              <a:t> </a:t>
+            </a:r>
+            <a:r>
+              <a:rPr lang="en-IN" dirty="0"/>
+              <a:t>and targets </a:t>
+            </a:r>
+            <a:r>
+              <a:rPr lang="en-IN" i="1" dirty="0" err="1"/>
+              <a:t>sample_y</a:t>
+            </a:r>
+            <a:r>
+              <a:rPr lang="en-IN" i="1" dirty="0"/>
+              <a:t> </a:t>
+            </a:r>
+            <a:r>
+              <a:rPr lang="en-IN" dirty="0"/>
+              <a:t> from the </a:t>
+            </a:r>
+            <a:r>
+              <a:rPr lang="en-IN" dirty="0" err="1"/>
+              <a:t>dataloader</a:t>
+            </a:r>
+            <a:endParaRPr lang="en-IN" dirty="0"/>
+          </a:p>
+          <a:p>
+            <a:r>
+              <a:rPr lang="en-IN" dirty="0"/>
+              <a:t>We are shuffling the data in the </a:t>
+            </a:r>
+            <a:r>
+              <a:rPr lang="en-IN" dirty="0" err="1"/>
+              <a:t>dataloader</a:t>
+            </a:r>
+            <a:r>
+              <a:rPr lang="en-IN" dirty="0"/>
+              <a:t> to get random batches.</a:t>
+            </a:r>
+          </a:p>
+        </p:txBody>
+      </p:sp>
+      <p:pic>
+        <p:nvPicPr>
+          <p:cNvPr id="5" name="Picture 4">
+            <a:extLst>
+              <a:ext uri="{FF2B5EF4-FFF2-40B4-BE49-F238E27FC236}">
+                <a16:creationId xmlns:a16="http://schemas.microsoft.com/office/drawing/2014/main" id="{6F56AEF5-993C-4631-809F-B6F85E4B8E9A}"/>
+              </a:ext>
+            </a:extLst>
+          </p:cNvPr>
+          <p:cNvPicPr>
+            <a:picLocks noChangeAspect="1"/>
+          </p:cNvPicPr>
+          <p:nvPr/>
+        </p:nvPicPr>
+        <p:blipFill>
+          <a:blip r:embed="rId2"/>
+          <a:stretch>
+            <a:fillRect/>
+          </a:stretch>
+        </p:blipFill>
+        <p:spPr>
+          <a:xfrm>
+            <a:off x="5151383" y="1932426"/>
+            <a:ext cx="6311022" cy="3753671"/>
+          </a:xfrm>
+          <a:prstGeom prst="rect">
+            <a:avLst/>
+          </a:prstGeom>
+        </p:spPr>
+      </p:pic>
     </p:spTree>
     <p:extLst>
       <p:ext uri="{BB962C8B-B14F-4D97-AF65-F5344CB8AC3E}">
-        <p14:creationId xmlns:p14="http://schemas.microsoft.com/office/powerpoint/2010/main" val="2481473372"/>
+        <p14:creationId xmlns:p14="http://schemas.microsoft.com/office/powerpoint/2010/main" val="3129157155"/>
       </p:ext>
     </p:extLst>
   </p:cSld>
@@ -7061,7 +7486,7 @@
           <p:cNvPr id="2" name="Title 1">
             <a:extLst>
               <a:ext uri="{FF2B5EF4-FFF2-40B4-BE49-F238E27FC236}">
-                <a16:creationId xmlns:a16="http://schemas.microsoft.com/office/drawing/2014/main" id="{A76E450D-4B27-4674-B263-DACA0A0B388C}"/>
+                <a16:creationId xmlns:a16="http://schemas.microsoft.com/office/drawing/2014/main" id="{E9CA9394-F7A3-4D0E-B802-4EBADD856421}"/>
               </a:ext>
             </a:extLst>
           </p:cNvPr>
@@ -7079,7 +7504,7 @@
           <a:p>
             <a:r>
               <a:rPr lang="en-IN" dirty="0"/>
-              <a:t>Hyperparameters</a:t>
+              <a:t>Neural Network Architecture</a:t>
             </a:r>
           </a:p>
         </p:txBody>
@@ -7089,7 +7514,7 @@
           <p:cNvPr id="3" name="Content Placeholder 2">
             <a:extLst>
               <a:ext uri="{FF2B5EF4-FFF2-40B4-BE49-F238E27FC236}">
-                <a16:creationId xmlns:a16="http://schemas.microsoft.com/office/drawing/2014/main" id="{A3215CCB-ED8E-49A8-A8D9-661F7169939F}"/>
+                <a16:creationId xmlns:a16="http://schemas.microsoft.com/office/drawing/2014/main" id="{66374872-F7F3-4D90-A746-81D5F82F782F}"/>
               </a:ext>
             </a:extLst>
           </p:cNvPr>
@@ -7100,19 +7525,63 @@
             <p:ph idx="1"/>
           </p:nvPr>
         </p:nvSpPr>
-        <p:spPr/>
+        <p:spPr>
+          <a:xfrm>
+            <a:off x="838200" y="1825625"/>
+            <a:ext cx="2115207" cy="4351338"/>
+          </a:xfrm>
+        </p:spPr>
         <p:txBody>
           <a:bodyPr/>
           <a:lstStyle/>
           <a:p>
-            <a:endParaRPr lang="en-IN"/>
-          </a:p>
-        </p:txBody>
-      </p:sp>
+            <a:r>
+              <a:rPr lang="en-IN" dirty="0"/>
+              <a:t>RNN Class</a:t>
+            </a:r>
+          </a:p>
+          <a:p>
+            <a:r>
+              <a:rPr lang="en-IN" dirty="0"/>
+              <a:t>constructor</a:t>
+            </a:r>
+          </a:p>
+        </p:txBody>
+      </p:sp>
+      <p:pic>
+        <p:nvPicPr>
+          <p:cNvPr id="7" name="Picture 6">
+            <a:extLst>
+              <a:ext uri="{FF2B5EF4-FFF2-40B4-BE49-F238E27FC236}">
+                <a16:creationId xmlns:a16="http://schemas.microsoft.com/office/drawing/2014/main" id="{F6ACD13B-0B60-4B16-AF0A-74AF8005D5E9}"/>
+              </a:ext>
+            </a:extLst>
+          </p:cNvPr>
+          <p:cNvPicPr>
+            <a:picLocks noChangeAspect="1"/>
+          </p:cNvPicPr>
+          <p:nvPr/>
+        </p:nvPicPr>
+        <p:blipFill>
+          <a:blip r:embed="rId2"/>
+          <a:stretch>
+            <a:fillRect/>
+          </a:stretch>
+        </p:blipFill>
+        <p:spPr>
+          <a:xfrm>
+            <a:off x="3183890" y="1952270"/>
+            <a:ext cx="8169910" cy="4098048"/>
+          </a:xfrm>
+          <a:prstGeom prst="rect">
+            <a:avLst/>
+          </a:prstGeom>
+        </p:spPr>
+      </p:pic>
     </p:spTree>
     <p:extLst>
       <p:ext uri="{BB962C8B-B14F-4D97-AF65-F5344CB8AC3E}">
-        <p14:creationId xmlns:p14="http://schemas.microsoft.com/office/powerpoint/2010/main" val="3307515375"/>
+        <p14:creationId xmlns:p14="http://schemas.microsoft.com/office/powerpoint/2010/main" val="1605735911"/>
       </p:ext>
     </p:extLst>
   </p:cSld>
@@ -7144,7 +7613,7 @@
           <p:cNvPr id="2" name="Title 1">
             <a:extLst>
               <a:ext uri="{FF2B5EF4-FFF2-40B4-BE49-F238E27FC236}">
-                <a16:creationId xmlns:a16="http://schemas.microsoft.com/office/drawing/2014/main" id="{584CD6A2-C342-4419-B6DC-975AA0B7B94E}"/>
+                <a16:creationId xmlns:a16="http://schemas.microsoft.com/office/drawing/2014/main" id="{E9CA9394-F7A3-4D0E-B802-4EBADD856421}"/>
               </a:ext>
             </a:extLst>
           </p:cNvPr>
@@ -7155,14 +7624,19 @@
             <p:ph type="title"/>
           </p:nvPr>
         </p:nvSpPr>
-        <p:spPr/>
+        <p:spPr>
+          <a:xfrm>
+            <a:off x="838200" y="365125"/>
+            <a:ext cx="3891455" cy="1325563"/>
+          </a:xfrm>
+        </p:spPr>
         <p:txBody>
           <a:bodyPr/>
           <a:lstStyle/>
           <a:p>
             <a:r>
               <a:rPr lang="en-IN" dirty="0"/>
-              <a:t>Script Generation </a:t>
+              <a:t>Neural Network Architecture</a:t>
             </a:r>
           </a:p>
         </p:txBody>
@@ -7172,7 +7646,7 @@
           <p:cNvPr id="3" name="Content Placeholder 2">
             <a:extLst>
               <a:ext uri="{FF2B5EF4-FFF2-40B4-BE49-F238E27FC236}">
-                <a16:creationId xmlns:a16="http://schemas.microsoft.com/office/drawing/2014/main" id="{ED1C0153-170A-46B9-BDC7-89EA21C485D5}"/>
+                <a16:creationId xmlns:a16="http://schemas.microsoft.com/office/drawing/2014/main" id="{66374872-F7F3-4D90-A746-81D5F82F782F}"/>
               </a:ext>
             </a:extLst>
           </p:cNvPr>
@@ -7183,19 +7657,57 @@
             <p:ph idx="1"/>
           </p:nvPr>
         </p:nvSpPr>
-        <p:spPr/>
+        <p:spPr>
+          <a:xfrm>
+            <a:off x="838200" y="2141537"/>
+            <a:ext cx="2115207" cy="4351338"/>
+          </a:xfrm>
+        </p:spPr>
         <p:txBody>
           <a:bodyPr/>
           <a:lstStyle/>
           <a:p>
-            <a:endParaRPr lang="en-IN"/>
-          </a:p>
-        </p:txBody>
-      </p:sp>
+            <a:r>
+              <a:rPr lang="en-IN" dirty="0"/>
+              <a:t>Forward function </a:t>
+            </a:r>
+          </a:p>
+        </p:txBody>
+      </p:sp>
+      <p:pic>
+        <p:nvPicPr>
+          <p:cNvPr id="5" name="Picture 4">
+            <a:extLst>
+              <a:ext uri="{FF2B5EF4-FFF2-40B4-BE49-F238E27FC236}">
+                <a16:creationId xmlns:a16="http://schemas.microsoft.com/office/drawing/2014/main" id="{D1AF2D39-13E3-435B-AD62-C5C344042BB9}"/>
+              </a:ext>
+            </a:extLst>
+          </p:cNvPr>
+          <p:cNvPicPr>
+            <a:picLocks noChangeAspect="1"/>
+          </p:cNvPicPr>
+          <p:nvPr/>
+        </p:nvPicPr>
+        <p:blipFill>
+          <a:blip r:embed="rId2"/>
+          <a:stretch>
+            <a:fillRect/>
+          </a:stretch>
+        </p:blipFill>
+        <p:spPr>
+          <a:xfrm>
+            <a:off x="4908332" y="1141681"/>
+            <a:ext cx="6921718" cy="5469845"/>
+          </a:xfrm>
+          <a:prstGeom prst="rect">
+            <a:avLst/>
+          </a:prstGeom>
+        </p:spPr>
+      </p:pic>
     </p:spTree>
     <p:extLst>
       <p:ext uri="{BB962C8B-B14F-4D97-AF65-F5344CB8AC3E}">
-        <p14:creationId xmlns:p14="http://schemas.microsoft.com/office/powerpoint/2010/main" val="4097401390"/>
+        <p14:creationId xmlns:p14="http://schemas.microsoft.com/office/powerpoint/2010/main" val="2116013335"/>
       </p:ext>
     </p:extLst>
   </p:cSld>
@@ -7227,7 +7739,7 @@
           <p:cNvPr id="2" name="Title 1">
             <a:extLst>
               <a:ext uri="{FF2B5EF4-FFF2-40B4-BE49-F238E27FC236}">
-                <a16:creationId xmlns:a16="http://schemas.microsoft.com/office/drawing/2014/main" id="{BADB776B-6812-42DF-A5DC-3926B2391B64}"/>
+                <a16:creationId xmlns:a16="http://schemas.microsoft.com/office/drawing/2014/main" id="{E9CA9394-F7A3-4D0E-B802-4EBADD856421}"/>
               </a:ext>
             </a:extLst>
           </p:cNvPr>
@@ -7238,14 +7750,19 @@
             <p:ph type="title"/>
           </p:nvPr>
         </p:nvSpPr>
-        <p:spPr/>
+        <p:spPr>
+          <a:xfrm>
+            <a:off x="838200" y="365125"/>
+            <a:ext cx="7580586" cy="1325563"/>
+          </a:xfrm>
+        </p:spPr>
         <p:txBody>
           <a:bodyPr/>
           <a:lstStyle/>
           <a:p>
             <a:r>
               <a:rPr lang="en-IN" dirty="0"/>
-              <a:t>Saving model as a checkpoint file</a:t>
+              <a:t>Neural Network Architecture</a:t>
             </a:r>
           </a:p>
         </p:txBody>
@@ -7255,7 +7772,7 @@
           <p:cNvPr id="3" name="Content Placeholder 2">
             <a:extLst>
               <a:ext uri="{FF2B5EF4-FFF2-40B4-BE49-F238E27FC236}">
-                <a16:creationId xmlns:a16="http://schemas.microsoft.com/office/drawing/2014/main" id="{22851A52-0B9D-4567-BD41-05DBF753F495}"/>
+                <a16:creationId xmlns:a16="http://schemas.microsoft.com/office/drawing/2014/main" id="{66374872-F7F3-4D90-A746-81D5F82F782F}"/>
               </a:ext>
             </a:extLst>
           </p:cNvPr>
@@ -7266,19 +7783,465 @@
             <p:ph idx="1"/>
           </p:nvPr>
         </p:nvSpPr>
-        <p:spPr/>
+        <p:spPr>
+          <a:xfrm>
+            <a:off x="838200" y="2141537"/>
+            <a:ext cx="2115207" cy="4351338"/>
+          </a:xfrm>
+        </p:spPr>
         <p:txBody>
           <a:bodyPr/>
           <a:lstStyle/>
           <a:p>
-            <a:endParaRPr lang="en-IN"/>
-          </a:p>
-        </p:txBody>
-      </p:sp>
+            <a:r>
+              <a:rPr lang="en-IN" dirty="0"/>
+              <a:t>Initializing the hidden state of LSTM</a:t>
+            </a:r>
+          </a:p>
+        </p:txBody>
+      </p:sp>
+      <p:pic>
+        <p:nvPicPr>
+          <p:cNvPr id="6" name="Picture 5">
+            <a:extLst>
+              <a:ext uri="{FF2B5EF4-FFF2-40B4-BE49-F238E27FC236}">
+                <a16:creationId xmlns:a16="http://schemas.microsoft.com/office/drawing/2014/main" id="{FC435F11-1FEA-489F-966A-8D3C2963705C}"/>
+              </a:ext>
+            </a:extLst>
+          </p:cNvPr>
+          <p:cNvPicPr>
+            <a:picLocks noChangeAspect="1"/>
+          </p:cNvPicPr>
+          <p:nvPr/>
+        </p:nvPicPr>
+        <p:blipFill>
+          <a:blip r:embed="rId2"/>
+          <a:stretch>
+            <a:fillRect/>
+          </a:stretch>
+        </p:blipFill>
+        <p:spPr>
+          <a:xfrm>
+            <a:off x="3717049" y="2613955"/>
+            <a:ext cx="8058150" cy="3648075"/>
+          </a:xfrm>
+          <a:prstGeom prst="rect">
+            <a:avLst/>
+          </a:prstGeom>
+        </p:spPr>
+      </p:pic>
     </p:spTree>
     <p:extLst>
       <p:ext uri="{BB962C8B-B14F-4D97-AF65-F5344CB8AC3E}">
-        <p14:creationId xmlns:p14="http://schemas.microsoft.com/office/powerpoint/2010/main" val="1603034709"/>
+        <p14:creationId xmlns:p14="http://schemas.microsoft.com/office/powerpoint/2010/main" val="2660255955"/>
+      </p:ext>
+    </p:extLst>
+  </p:cSld>
+  <p:clrMapOvr>
+    <a:masterClrMapping/>
+  </p:clrMapOvr>
+</p:sld>
+</file>
+
+<file path=ppt/slides/slide27.xml><?xml version="1.0" encoding="utf-8"?>
+<p:sld xmlns:a="http://schemas.openxmlformats.org/drawingml/2006/main" xmlns:r="http://schemas.openxmlformats.org/officeDocument/2006/relationships" xmlns:p="http://schemas.openxmlformats.org/presentationml/2006/main">
+  <p:cSld>
+    <p:spTree>
+      <p:nvGrpSpPr>
+        <p:cNvPr id="1" name=""/>
+        <p:cNvGrpSpPr/>
+        <p:nvPr/>
+      </p:nvGrpSpPr>
+      <p:grpSpPr>
+        <a:xfrm>
+          <a:off x="0" y="0"/>
+          <a:ext cx="0" cy="0"/>
+          <a:chOff x="0" y="0"/>
+          <a:chExt cx="0" cy="0"/>
+        </a:xfrm>
+      </p:grpSpPr>
+      <p:sp>
+        <p:nvSpPr>
+          <p:cNvPr id="2" name="Title 1">
+            <a:extLst>
+              <a:ext uri="{FF2B5EF4-FFF2-40B4-BE49-F238E27FC236}">
+                <a16:creationId xmlns:a16="http://schemas.microsoft.com/office/drawing/2014/main" id="{B734B636-6FCA-4D65-BFF0-C521F7C770F0}"/>
+              </a:ext>
+            </a:extLst>
+          </p:cNvPr>
+          <p:cNvSpPr>
+            <a:spLocks noGrp="1"/>
+          </p:cNvSpPr>
+          <p:nvPr>
+            <p:ph type="title"/>
+          </p:nvPr>
+        </p:nvSpPr>
+        <p:spPr/>
+        <p:txBody>
+          <a:bodyPr/>
+          <a:lstStyle/>
+          <a:p>
+            <a:r>
+              <a:rPr lang="en-IN" dirty="0"/>
+              <a:t>Backpropagation</a:t>
+            </a:r>
+          </a:p>
+        </p:txBody>
+      </p:sp>
+      <p:sp>
+        <p:nvSpPr>
+          <p:cNvPr id="3" name="Content Placeholder 2">
+            <a:extLst>
+              <a:ext uri="{FF2B5EF4-FFF2-40B4-BE49-F238E27FC236}">
+                <a16:creationId xmlns:a16="http://schemas.microsoft.com/office/drawing/2014/main" id="{7DA921A4-A19B-4196-A3AD-A34DB25C32FB}"/>
+              </a:ext>
+            </a:extLst>
+          </p:cNvPr>
+          <p:cNvSpPr>
+            <a:spLocks noGrp="1"/>
+          </p:cNvSpPr>
+          <p:nvPr>
+            <p:ph idx="1"/>
+          </p:nvPr>
+        </p:nvSpPr>
+        <p:spPr>
+          <a:xfrm>
+            <a:off x="838200" y="1825625"/>
+            <a:ext cx="3271345" cy="4351338"/>
+          </a:xfrm>
+        </p:spPr>
+        <p:txBody>
+          <a:bodyPr/>
+          <a:lstStyle/>
+          <a:p>
+            <a:r>
+              <a:rPr lang="en-IN" dirty="0"/>
+              <a:t>Use the above RNN class to apply forward and back propagation</a:t>
+            </a:r>
+          </a:p>
+          <a:p>
+            <a:r>
+              <a:rPr lang="en-IN" dirty="0"/>
+              <a:t>This function will be called iteratively, in the training loop</a:t>
+            </a:r>
+          </a:p>
+        </p:txBody>
+      </p:sp>
+      <p:pic>
+        <p:nvPicPr>
+          <p:cNvPr id="5" name="Picture 4">
+            <a:extLst>
+              <a:ext uri="{FF2B5EF4-FFF2-40B4-BE49-F238E27FC236}">
+                <a16:creationId xmlns:a16="http://schemas.microsoft.com/office/drawing/2014/main" id="{63F4B969-5305-4B78-BB34-861A7CA7CC4B}"/>
+              </a:ext>
+            </a:extLst>
+          </p:cNvPr>
+          <p:cNvPicPr>
+            <a:picLocks noChangeAspect="1"/>
+          </p:cNvPicPr>
+          <p:nvPr/>
+        </p:nvPicPr>
+        <p:blipFill>
+          <a:blip r:embed="rId2"/>
+          <a:stretch>
+            <a:fillRect/>
+          </a:stretch>
+        </p:blipFill>
+        <p:spPr>
+          <a:xfrm>
+            <a:off x="5160580" y="365125"/>
+            <a:ext cx="6394394" cy="6413064"/>
+          </a:xfrm>
+          <a:prstGeom prst="rect">
+            <a:avLst/>
+          </a:prstGeom>
+        </p:spPr>
+      </p:pic>
+    </p:spTree>
+    <p:extLst>
+      <p:ext uri="{BB962C8B-B14F-4D97-AF65-F5344CB8AC3E}">
+        <p14:creationId xmlns:p14="http://schemas.microsoft.com/office/powerpoint/2010/main" val="2481473372"/>
+      </p:ext>
+    </p:extLst>
+  </p:cSld>
+  <p:clrMapOvr>
+    <a:masterClrMapping/>
+  </p:clrMapOvr>
+</p:sld>
+</file>
+
+<file path=ppt/slides/slide28.xml><?xml version="1.0" encoding="utf-8"?>
+<p:sld xmlns:a="http://schemas.openxmlformats.org/drawingml/2006/main" xmlns:r="http://schemas.openxmlformats.org/officeDocument/2006/relationships" xmlns:p="http://schemas.openxmlformats.org/presentationml/2006/main">
+  <p:cSld>
+    <p:spTree>
+      <p:nvGrpSpPr>
+        <p:cNvPr id="1" name=""/>
+        <p:cNvGrpSpPr/>
+        <p:nvPr/>
+      </p:nvGrpSpPr>
+      <p:grpSpPr>
+        <a:xfrm>
+          <a:off x="0" y="0"/>
+          <a:ext cx="0" cy="0"/>
+          <a:chOff x="0" y="0"/>
+          <a:chExt cx="0" cy="0"/>
+        </a:xfrm>
+      </p:grpSpPr>
+      <p:sp>
+        <p:nvSpPr>
+          <p:cNvPr id="2" name="Title 1">
+            <a:extLst>
+              <a:ext uri="{FF2B5EF4-FFF2-40B4-BE49-F238E27FC236}">
+                <a16:creationId xmlns:a16="http://schemas.microsoft.com/office/drawing/2014/main" id="{2FA350B0-1797-4DF0-BF26-E35443C7BDE7}"/>
+              </a:ext>
+            </a:extLst>
+          </p:cNvPr>
+          <p:cNvSpPr>
+            <a:spLocks noGrp="1"/>
+          </p:cNvSpPr>
+          <p:nvPr>
+            <p:ph type="title"/>
+          </p:nvPr>
+        </p:nvSpPr>
+        <p:spPr>
+          <a:xfrm>
+            <a:off x="314653" y="442913"/>
+            <a:ext cx="3597166" cy="1325563"/>
+          </a:xfrm>
+        </p:spPr>
+        <p:txBody>
+          <a:bodyPr/>
+          <a:lstStyle/>
+          <a:p>
+            <a:r>
+              <a:rPr lang="en-IN" dirty="0"/>
+              <a:t>Training Loop</a:t>
+            </a:r>
+          </a:p>
+        </p:txBody>
+      </p:sp>
+      <p:sp>
+        <p:nvSpPr>
+          <p:cNvPr id="3" name="Content Placeholder 2">
+            <a:extLst>
+              <a:ext uri="{FF2B5EF4-FFF2-40B4-BE49-F238E27FC236}">
+                <a16:creationId xmlns:a16="http://schemas.microsoft.com/office/drawing/2014/main" id="{D7760A8E-D4E8-4A2D-9684-484BB6F272F0}"/>
+              </a:ext>
+            </a:extLst>
+          </p:cNvPr>
+          <p:cNvSpPr>
+            <a:spLocks noGrp="1"/>
+          </p:cNvSpPr>
+          <p:nvPr>
+            <p:ph idx="1"/>
+          </p:nvPr>
+        </p:nvSpPr>
+        <p:spPr>
+          <a:xfrm>
+            <a:off x="428296" y="1898321"/>
+            <a:ext cx="3019097" cy="4351338"/>
+          </a:xfrm>
+        </p:spPr>
+        <p:txBody>
+          <a:bodyPr>
+            <a:normAutofit lnSpcReduction="10000"/>
+          </a:bodyPr>
+          <a:lstStyle/>
+          <a:p>
+            <a:r>
+              <a:rPr lang="en-IN" dirty="0"/>
+              <a:t>This function train the network over all the batches for the number of epochs given.</a:t>
+            </a:r>
+          </a:p>
+          <a:p>
+            <a:r>
+              <a:rPr lang="en-IN" dirty="0"/>
+              <a:t>The model progress is printed every number of batches</a:t>
+            </a:r>
+          </a:p>
+        </p:txBody>
+      </p:sp>
+      <p:pic>
+        <p:nvPicPr>
+          <p:cNvPr id="5" name="Picture 4">
+            <a:extLst>
+              <a:ext uri="{FF2B5EF4-FFF2-40B4-BE49-F238E27FC236}">
+                <a16:creationId xmlns:a16="http://schemas.microsoft.com/office/drawing/2014/main" id="{D3BF185E-B119-4704-B72B-C9B45AFB0559}"/>
+              </a:ext>
+            </a:extLst>
+          </p:cNvPr>
+          <p:cNvPicPr>
+            <a:picLocks noChangeAspect="1"/>
+          </p:cNvPicPr>
+          <p:nvPr/>
+        </p:nvPicPr>
+        <p:blipFill>
+          <a:blip r:embed="rId2"/>
+          <a:stretch>
+            <a:fillRect/>
+          </a:stretch>
+        </p:blipFill>
+        <p:spPr>
+          <a:xfrm>
+            <a:off x="3911819" y="681037"/>
+            <a:ext cx="8039100" cy="5734050"/>
+          </a:xfrm>
+          <a:prstGeom prst="rect">
+            <a:avLst/>
+          </a:prstGeom>
+        </p:spPr>
+      </p:pic>
+    </p:spTree>
+    <p:extLst>
+      <p:ext uri="{BB962C8B-B14F-4D97-AF65-F5344CB8AC3E}">
+        <p14:creationId xmlns:p14="http://schemas.microsoft.com/office/powerpoint/2010/main" val="1812169676"/>
+      </p:ext>
+    </p:extLst>
+  </p:cSld>
+  <p:clrMapOvr>
+    <a:masterClrMapping/>
+  </p:clrMapOvr>
+</p:sld>
+</file>
+
+<file path=ppt/slides/slide29.xml><?xml version="1.0" encoding="utf-8"?>
+<p:sld xmlns:a="http://schemas.openxmlformats.org/drawingml/2006/main" xmlns:r="http://schemas.openxmlformats.org/officeDocument/2006/relationships" xmlns:p="http://schemas.openxmlformats.org/presentationml/2006/main">
+  <p:cSld>
+    <p:spTree>
+      <p:nvGrpSpPr>
+        <p:cNvPr id="1" name=""/>
+        <p:cNvGrpSpPr/>
+        <p:nvPr/>
+      </p:nvGrpSpPr>
+      <p:grpSpPr>
+        <a:xfrm>
+          <a:off x="0" y="0"/>
+          <a:ext cx="0" cy="0"/>
+          <a:chOff x="0" y="0"/>
+          <a:chExt cx="0" cy="0"/>
+        </a:xfrm>
+      </p:grpSpPr>
+      <p:sp>
+        <p:nvSpPr>
+          <p:cNvPr id="2" name="Title 1">
+            <a:extLst>
+              <a:ext uri="{FF2B5EF4-FFF2-40B4-BE49-F238E27FC236}">
+                <a16:creationId xmlns:a16="http://schemas.microsoft.com/office/drawing/2014/main" id="{A76E450D-4B27-4674-B263-DACA0A0B388C}"/>
+              </a:ext>
+            </a:extLst>
+          </p:cNvPr>
+          <p:cNvSpPr>
+            <a:spLocks noGrp="1"/>
+          </p:cNvSpPr>
+          <p:nvPr>
+            <p:ph type="title"/>
+          </p:nvPr>
+        </p:nvSpPr>
+        <p:spPr/>
+        <p:txBody>
+          <a:bodyPr/>
+          <a:lstStyle/>
+          <a:p>
+            <a:r>
+              <a:rPr lang="en-IN" dirty="0"/>
+              <a:t>Hyperparameters</a:t>
+            </a:r>
+          </a:p>
+        </p:txBody>
+      </p:sp>
+      <p:sp>
+        <p:nvSpPr>
+          <p:cNvPr id="3" name="Content Placeholder 2">
+            <a:extLst>
+              <a:ext uri="{FF2B5EF4-FFF2-40B4-BE49-F238E27FC236}">
+                <a16:creationId xmlns:a16="http://schemas.microsoft.com/office/drawing/2014/main" id="{A3215CCB-ED8E-49A8-A8D9-661F7169939F}"/>
+              </a:ext>
+            </a:extLst>
+          </p:cNvPr>
+          <p:cNvSpPr>
+            <a:spLocks noGrp="1"/>
+          </p:cNvSpPr>
+          <p:nvPr>
+            <p:ph idx="1"/>
+          </p:nvPr>
+        </p:nvSpPr>
+        <p:spPr/>
+        <p:txBody>
+          <a:bodyPr>
+            <a:normAutofit fontScale="92500" lnSpcReduction="20000"/>
+          </a:bodyPr>
+          <a:lstStyle/>
+          <a:p>
+            <a:r>
+              <a:rPr lang="en-IN" dirty="0"/>
+              <a:t>Sequence Length: to set the length of the sequence</a:t>
+            </a:r>
+          </a:p>
+          <a:p>
+            <a:r>
+              <a:rPr lang="en-IN" dirty="0"/>
+              <a:t>Batch Size : to set the size of batches </a:t>
+            </a:r>
+          </a:p>
+          <a:p>
+            <a:r>
+              <a:rPr lang="en-IN" dirty="0"/>
+              <a:t>Number of epochs : to set the number of epochs to train for</a:t>
+            </a:r>
+          </a:p>
+          <a:p>
+            <a:r>
+              <a:rPr lang="en-IN" dirty="0"/>
+              <a:t>Learning Rate: to set the learning rate of Adam Optimizer </a:t>
+            </a:r>
+          </a:p>
+          <a:p>
+            <a:r>
+              <a:rPr lang="en-IN" dirty="0"/>
+              <a:t>Vocab Size :  to set the number of unique tokens in vocabulary</a:t>
+            </a:r>
+          </a:p>
+          <a:p>
+            <a:r>
+              <a:rPr lang="en-IN" dirty="0"/>
+              <a:t>Output Size : to set the desired size of output</a:t>
+            </a:r>
+          </a:p>
+          <a:p>
+            <a:r>
+              <a:rPr lang="en-IN" dirty="0"/>
+              <a:t>Embedding Dim : to set the embedding dimension, smaller than </a:t>
+            </a:r>
+            <a:r>
+              <a:rPr lang="en-IN" dirty="0" err="1"/>
+              <a:t>vocab_size</a:t>
+            </a:r>
+            <a:endParaRPr lang="en-IN" dirty="0"/>
+          </a:p>
+          <a:p>
+            <a:r>
+              <a:rPr lang="en-IN" dirty="0"/>
+              <a:t>Hidden Dim : to set the hidden dimension of RNN</a:t>
+            </a:r>
+          </a:p>
+          <a:p>
+            <a:r>
+              <a:rPr lang="en-IN" dirty="0"/>
+              <a:t>N Layer: to set the number of layers in the RNN</a:t>
+            </a:r>
+          </a:p>
+          <a:p>
+            <a:r>
+              <a:rPr lang="en-IN" dirty="0"/>
+              <a:t>Show N Batches: to set the number of batches at which neural network should print progress </a:t>
+            </a:r>
+          </a:p>
+        </p:txBody>
+      </p:sp>
+    </p:spTree>
+    <p:extLst>
+      <p:ext uri="{BB962C8B-B14F-4D97-AF65-F5344CB8AC3E}">
+        <p14:creationId xmlns:p14="http://schemas.microsoft.com/office/powerpoint/2010/main" val="3307515375"/>
       </p:ext>
     </p:extLst>
   </p:cSld>
@@ -7637,6 +8600,509 @@
     <p:extLst>
       <p:ext uri="{BB962C8B-B14F-4D97-AF65-F5344CB8AC3E}">
         <p14:creationId xmlns:p14="http://schemas.microsoft.com/office/powerpoint/2010/main" val="2572915350"/>
+      </p:ext>
+    </p:extLst>
+  </p:cSld>
+  <p:clrMapOvr>
+    <a:masterClrMapping/>
+  </p:clrMapOvr>
+</p:sld>
+</file>
+
+<file path=ppt/slides/slide30.xml><?xml version="1.0" encoding="utf-8"?>
+<p:sld xmlns:a="http://schemas.openxmlformats.org/drawingml/2006/main" xmlns:r="http://schemas.openxmlformats.org/officeDocument/2006/relationships" xmlns:p="http://schemas.openxmlformats.org/presentationml/2006/main">
+  <p:cSld>
+    <p:spTree>
+      <p:nvGrpSpPr>
+        <p:cNvPr id="1" name=""/>
+        <p:cNvGrpSpPr/>
+        <p:nvPr/>
+      </p:nvGrpSpPr>
+      <p:grpSpPr>
+        <a:xfrm>
+          <a:off x="0" y="0"/>
+          <a:ext cx="0" cy="0"/>
+          <a:chOff x="0" y="0"/>
+          <a:chExt cx="0" cy="0"/>
+        </a:xfrm>
+      </p:grpSpPr>
+      <p:sp>
+        <p:nvSpPr>
+          <p:cNvPr id="2" name="Title 1">
+            <a:extLst>
+              <a:ext uri="{FF2B5EF4-FFF2-40B4-BE49-F238E27FC236}">
+                <a16:creationId xmlns:a16="http://schemas.microsoft.com/office/drawing/2014/main" id="{A76E450D-4B27-4674-B263-DACA0A0B388C}"/>
+              </a:ext>
+            </a:extLst>
+          </p:cNvPr>
+          <p:cNvSpPr>
+            <a:spLocks noGrp="1"/>
+          </p:cNvSpPr>
+          <p:nvPr>
+            <p:ph type="title"/>
+          </p:nvPr>
+        </p:nvSpPr>
+        <p:spPr>
+          <a:xfrm>
+            <a:off x="722586" y="2103437"/>
+            <a:ext cx="4175235" cy="1325563"/>
+          </a:xfrm>
+        </p:spPr>
+        <p:txBody>
+          <a:bodyPr/>
+          <a:lstStyle/>
+          <a:p>
+            <a:r>
+              <a:rPr lang="en-IN" dirty="0"/>
+              <a:t>Hyperparameters</a:t>
+            </a:r>
+          </a:p>
+        </p:txBody>
+      </p:sp>
+      <p:pic>
+        <p:nvPicPr>
+          <p:cNvPr id="5" name="Picture 4">
+            <a:extLst>
+              <a:ext uri="{FF2B5EF4-FFF2-40B4-BE49-F238E27FC236}">
+                <a16:creationId xmlns:a16="http://schemas.microsoft.com/office/drawing/2014/main" id="{3B510521-EA7D-4D94-9C16-B42F63F5BECA}"/>
+              </a:ext>
+            </a:extLst>
+          </p:cNvPr>
+          <p:cNvPicPr>
+            <a:picLocks noChangeAspect="1"/>
+          </p:cNvPicPr>
+          <p:nvPr/>
+        </p:nvPicPr>
+        <p:blipFill>
+          <a:blip r:embed="rId2"/>
+          <a:stretch>
+            <a:fillRect/>
+          </a:stretch>
+        </p:blipFill>
+        <p:spPr>
+          <a:xfrm>
+            <a:off x="5423337" y="433715"/>
+            <a:ext cx="6130159" cy="6204144"/>
+          </a:xfrm>
+          <a:prstGeom prst="rect">
+            <a:avLst/>
+          </a:prstGeom>
+        </p:spPr>
+      </p:pic>
+    </p:spTree>
+    <p:extLst>
+      <p:ext uri="{BB962C8B-B14F-4D97-AF65-F5344CB8AC3E}">
+        <p14:creationId xmlns:p14="http://schemas.microsoft.com/office/powerpoint/2010/main" val="2987602554"/>
+      </p:ext>
+    </p:extLst>
+  </p:cSld>
+  <p:clrMapOvr>
+    <a:masterClrMapping/>
+  </p:clrMapOvr>
+</p:sld>
+</file>
+
+<file path=ppt/slides/slide31.xml><?xml version="1.0" encoding="utf-8"?>
+<p:sld xmlns:a="http://schemas.openxmlformats.org/drawingml/2006/main" xmlns:r="http://schemas.openxmlformats.org/officeDocument/2006/relationships" xmlns:p="http://schemas.openxmlformats.org/presentationml/2006/main">
+  <p:cSld>
+    <p:spTree>
+      <p:nvGrpSpPr>
+        <p:cNvPr id="1" name=""/>
+        <p:cNvGrpSpPr/>
+        <p:nvPr/>
+      </p:nvGrpSpPr>
+      <p:grpSpPr>
+        <a:xfrm>
+          <a:off x="0" y="0"/>
+          <a:ext cx="0" cy="0"/>
+          <a:chOff x="0" y="0"/>
+          <a:chExt cx="0" cy="0"/>
+        </a:xfrm>
+      </p:grpSpPr>
+      <p:sp>
+        <p:nvSpPr>
+          <p:cNvPr id="2" name="Title 1">
+            <a:extLst>
+              <a:ext uri="{FF2B5EF4-FFF2-40B4-BE49-F238E27FC236}">
+                <a16:creationId xmlns:a16="http://schemas.microsoft.com/office/drawing/2014/main" id="{36C3A099-D6EF-40D7-B464-10B292BD4BE7}"/>
+              </a:ext>
+            </a:extLst>
+          </p:cNvPr>
+          <p:cNvSpPr>
+            <a:spLocks noGrp="1"/>
+          </p:cNvSpPr>
+          <p:nvPr>
+            <p:ph type="title"/>
+          </p:nvPr>
+        </p:nvSpPr>
+        <p:spPr/>
+        <p:txBody>
+          <a:bodyPr/>
+          <a:lstStyle/>
+          <a:p>
+            <a:r>
+              <a:rPr lang="en-IN" dirty="0"/>
+              <a:t>Training </a:t>
+            </a:r>
+          </a:p>
+        </p:txBody>
+      </p:sp>
+      <p:sp>
+        <p:nvSpPr>
+          <p:cNvPr id="3" name="Content Placeholder 2">
+            <a:extLst>
+              <a:ext uri="{FF2B5EF4-FFF2-40B4-BE49-F238E27FC236}">
+                <a16:creationId xmlns:a16="http://schemas.microsoft.com/office/drawing/2014/main" id="{E44CBD11-329C-4A75-86A9-422D170DCCD9}"/>
+              </a:ext>
+            </a:extLst>
+          </p:cNvPr>
+          <p:cNvSpPr>
+            <a:spLocks noGrp="1"/>
+          </p:cNvSpPr>
+          <p:nvPr>
+            <p:ph idx="1"/>
+          </p:nvPr>
+        </p:nvSpPr>
+        <p:spPr>
+          <a:xfrm>
+            <a:off x="838200" y="1825625"/>
+            <a:ext cx="3534103" cy="4351338"/>
+          </a:xfrm>
+        </p:spPr>
+        <p:txBody>
+          <a:bodyPr/>
+          <a:lstStyle/>
+          <a:p>
+            <a:r>
+              <a:rPr lang="en-IN" dirty="0"/>
+              <a:t>Using Adam Optimizer as optimizer function</a:t>
+            </a:r>
+          </a:p>
+          <a:p>
+            <a:r>
+              <a:rPr lang="en-IN" dirty="0"/>
+              <a:t>Using Cross entropy loss as a loss function</a:t>
+            </a:r>
+          </a:p>
+          <a:p>
+            <a:r>
+              <a:rPr lang="en-IN" dirty="0"/>
+              <a:t>Training the model</a:t>
+            </a:r>
+          </a:p>
+          <a:p>
+            <a:r>
+              <a:rPr lang="en-IN" dirty="0"/>
+              <a:t>Saving the model as a physical checkpoint file after training is complete.</a:t>
+            </a:r>
+          </a:p>
+        </p:txBody>
+      </p:sp>
+      <p:pic>
+        <p:nvPicPr>
+          <p:cNvPr id="5" name="Picture 4">
+            <a:extLst>
+              <a:ext uri="{FF2B5EF4-FFF2-40B4-BE49-F238E27FC236}">
+                <a16:creationId xmlns:a16="http://schemas.microsoft.com/office/drawing/2014/main" id="{9A7A131B-D440-4A32-9C7E-AB70DC2BF584}"/>
+              </a:ext>
+            </a:extLst>
+          </p:cNvPr>
+          <p:cNvPicPr>
+            <a:picLocks noChangeAspect="1"/>
+          </p:cNvPicPr>
+          <p:nvPr/>
+        </p:nvPicPr>
+        <p:blipFill>
+          <a:blip r:embed="rId2"/>
+          <a:stretch>
+            <a:fillRect/>
+          </a:stretch>
+        </p:blipFill>
+        <p:spPr>
+          <a:xfrm>
+            <a:off x="4838091" y="281044"/>
+            <a:ext cx="7053545" cy="2483178"/>
+          </a:xfrm>
+          <a:prstGeom prst="rect">
+            <a:avLst/>
+          </a:prstGeom>
+        </p:spPr>
+      </p:pic>
+      <p:pic>
+        <p:nvPicPr>
+          <p:cNvPr id="6" name="Picture 5">
+            <a:extLst>
+              <a:ext uri="{FF2B5EF4-FFF2-40B4-BE49-F238E27FC236}">
+                <a16:creationId xmlns:a16="http://schemas.microsoft.com/office/drawing/2014/main" id="{8BA58C06-DC51-4913-A7A6-F5BF67600D10}"/>
+              </a:ext>
+            </a:extLst>
+          </p:cNvPr>
+          <p:cNvPicPr>
+            <a:picLocks noChangeAspect="1"/>
+          </p:cNvPicPr>
+          <p:nvPr/>
+        </p:nvPicPr>
+        <p:blipFill>
+          <a:blip r:embed="rId3"/>
+          <a:stretch>
+            <a:fillRect/>
+          </a:stretch>
+        </p:blipFill>
+        <p:spPr>
+          <a:xfrm>
+            <a:off x="4719170" y="2969583"/>
+            <a:ext cx="7350648" cy="908734"/>
+          </a:xfrm>
+          <a:prstGeom prst="rect">
+            <a:avLst/>
+          </a:prstGeom>
+        </p:spPr>
+      </p:pic>
+    </p:spTree>
+    <p:extLst>
+      <p:ext uri="{BB962C8B-B14F-4D97-AF65-F5344CB8AC3E}">
+        <p14:creationId xmlns:p14="http://schemas.microsoft.com/office/powerpoint/2010/main" val="201995603"/>
+      </p:ext>
+    </p:extLst>
+  </p:cSld>
+  <p:clrMapOvr>
+    <a:masterClrMapping/>
+  </p:clrMapOvr>
+</p:sld>
+</file>
+
+<file path=ppt/slides/slide32.xml><?xml version="1.0" encoding="utf-8"?>
+<p:sld xmlns:a="http://schemas.openxmlformats.org/drawingml/2006/main" xmlns:r="http://schemas.openxmlformats.org/officeDocument/2006/relationships" xmlns:p="http://schemas.openxmlformats.org/presentationml/2006/main">
+  <p:cSld>
+    <p:spTree>
+      <p:nvGrpSpPr>
+        <p:cNvPr id="1" name=""/>
+        <p:cNvGrpSpPr/>
+        <p:nvPr/>
+      </p:nvGrpSpPr>
+      <p:grpSpPr>
+        <a:xfrm>
+          <a:off x="0" y="0"/>
+          <a:ext cx="0" cy="0"/>
+          <a:chOff x="0" y="0"/>
+          <a:chExt cx="0" cy="0"/>
+        </a:xfrm>
+      </p:grpSpPr>
+      <p:sp>
+        <p:nvSpPr>
+          <p:cNvPr id="2" name="Title 1">
+            <a:extLst>
+              <a:ext uri="{FF2B5EF4-FFF2-40B4-BE49-F238E27FC236}">
+                <a16:creationId xmlns:a16="http://schemas.microsoft.com/office/drawing/2014/main" id="{4066F6EB-5C8C-4274-94A4-0C0A74F208BB}"/>
+              </a:ext>
+            </a:extLst>
+          </p:cNvPr>
+          <p:cNvSpPr>
+            <a:spLocks noGrp="1"/>
+          </p:cNvSpPr>
+          <p:nvPr>
+            <p:ph type="title"/>
+          </p:nvPr>
+        </p:nvSpPr>
+        <p:spPr/>
+        <p:txBody>
+          <a:bodyPr/>
+          <a:lstStyle/>
+          <a:p>
+            <a:r>
+              <a:rPr lang="en-IN" dirty="0"/>
+              <a:t>Training Progress</a:t>
+            </a:r>
+          </a:p>
+        </p:txBody>
+      </p:sp>
+      <p:pic>
+        <p:nvPicPr>
+          <p:cNvPr id="5" name="Picture 4">
+            <a:extLst>
+              <a:ext uri="{FF2B5EF4-FFF2-40B4-BE49-F238E27FC236}">
+                <a16:creationId xmlns:a16="http://schemas.microsoft.com/office/drawing/2014/main" id="{28F152D1-1017-4CE9-85C6-A540FEA3589D}"/>
+              </a:ext>
+            </a:extLst>
+          </p:cNvPr>
+          <p:cNvPicPr>
+            <a:picLocks noChangeAspect="1"/>
+          </p:cNvPicPr>
+          <p:nvPr/>
+        </p:nvPicPr>
+        <p:blipFill>
+          <a:blip r:embed="rId2"/>
+          <a:stretch>
+            <a:fillRect/>
+          </a:stretch>
+        </p:blipFill>
+        <p:spPr>
+          <a:xfrm>
+            <a:off x="1019175" y="2314247"/>
+            <a:ext cx="10153650" cy="3848100"/>
+          </a:xfrm>
+          <a:prstGeom prst="rect">
+            <a:avLst/>
+          </a:prstGeom>
+        </p:spPr>
+      </p:pic>
+    </p:spTree>
+    <p:extLst>
+      <p:ext uri="{BB962C8B-B14F-4D97-AF65-F5344CB8AC3E}">
+        <p14:creationId xmlns:p14="http://schemas.microsoft.com/office/powerpoint/2010/main" val="3475619323"/>
+      </p:ext>
+    </p:extLst>
+  </p:cSld>
+  <p:clrMapOvr>
+    <a:masterClrMapping/>
+  </p:clrMapOvr>
+</p:sld>
+</file>
+
+<file path=ppt/slides/slide33.xml><?xml version="1.0" encoding="utf-8"?>
+<p:sld xmlns:a="http://schemas.openxmlformats.org/drawingml/2006/main" xmlns:r="http://schemas.openxmlformats.org/officeDocument/2006/relationships" xmlns:p="http://schemas.openxmlformats.org/presentationml/2006/main">
+  <p:cSld>
+    <p:spTree>
+      <p:nvGrpSpPr>
+        <p:cNvPr id="1" name=""/>
+        <p:cNvGrpSpPr/>
+        <p:nvPr/>
+      </p:nvGrpSpPr>
+      <p:grpSpPr>
+        <a:xfrm>
+          <a:off x="0" y="0"/>
+          <a:ext cx="0" cy="0"/>
+          <a:chOff x="0" y="0"/>
+          <a:chExt cx="0" cy="0"/>
+        </a:xfrm>
+      </p:grpSpPr>
+      <p:sp>
+        <p:nvSpPr>
+          <p:cNvPr id="2" name="Title 1">
+            <a:extLst>
+              <a:ext uri="{FF2B5EF4-FFF2-40B4-BE49-F238E27FC236}">
+                <a16:creationId xmlns:a16="http://schemas.microsoft.com/office/drawing/2014/main" id="{584CD6A2-C342-4419-B6DC-975AA0B7B94E}"/>
+              </a:ext>
+            </a:extLst>
+          </p:cNvPr>
+          <p:cNvSpPr>
+            <a:spLocks noGrp="1"/>
+          </p:cNvSpPr>
+          <p:nvPr>
+            <p:ph type="title"/>
+          </p:nvPr>
+        </p:nvSpPr>
+        <p:spPr/>
+        <p:txBody>
+          <a:bodyPr/>
+          <a:lstStyle/>
+          <a:p>
+            <a:r>
+              <a:rPr lang="en-IN" dirty="0"/>
+              <a:t>Script Generation </a:t>
+            </a:r>
+          </a:p>
+        </p:txBody>
+      </p:sp>
+      <p:pic>
+        <p:nvPicPr>
+          <p:cNvPr id="5" name="Content Placeholder 4">
+            <a:extLst>
+              <a:ext uri="{FF2B5EF4-FFF2-40B4-BE49-F238E27FC236}">
+                <a16:creationId xmlns:a16="http://schemas.microsoft.com/office/drawing/2014/main" id="{D0DBFEEE-3494-4D8B-88CA-538B462FAB46}"/>
+              </a:ext>
+            </a:extLst>
+          </p:cNvPr>
+          <p:cNvPicPr>
+            <a:picLocks noGrp="1" noChangeAspect="1"/>
+          </p:cNvPicPr>
+          <p:nvPr>
+            <p:ph idx="1"/>
+          </p:nvPr>
+        </p:nvPicPr>
+        <p:blipFill>
+          <a:blip r:embed="rId2"/>
+          <a:stretch>
+            <a:fillRect/>
+          </a:stretch>
+        </p:blipFill>
+        <p:spPr>
+          <a:xfrm>
+            <a:off x="838200" y="1510314"/>
+            <a:ext cx="10145110" cy="5315855"/>
+          </a:xfrm>
+        </p:spPr>
+      </p:pic>
+    </p:spTree>
+    <p:extLst>
+      <p:ext uri="{BB962C8B-B14F-4D97-AF65-F5344CB8AC3E}">
+        <p14:creationId xmlns:p14="http://schemas.microsoft.com/office/powerpoint/2010/main" val="4097401390"/>
+      </p:ext>
+    </p:extLst>
+  </p:cSld>
+  <p:clrMapOvr>
+    <a:masterClrMapping/>
+  </p:clrMapOvr>
+</p:sld>
+</file>
+
+<file path=ppt/slides/slide34.xml><?xml version="1.0" encoding="utf-8"?>
+<p:sld xmlns:a="http://schemas.openxmlformats.org/drawingml/2006/main" xmlns:r="http://schemas.openxmlformats.org/officeDocument/2006/relationships" xmlns:p="http://schemas.openxmlformats.org/presentationml/2006/main">
+  <p:cSld>
+    <p:spTree>
+      <p:nvGrpSpPr>
+        <p:cNvPr id="1" name=""/>
+        <p:cNvGrpSpPr/>
+        <p:nvPr/>
+      </p:nvGrpSpPr>
+      <p:grpSpPr>
+        <a:xfrm>
+          <a:off x="0" y="0"/>
+          <a:ext cx="0" cy="0"/>
+          <a:chOff x="0" y="0"/>
+          <a:chExt cx="0" cy="0"/>
+        </a:xfrm>
+      </p:grpSpPr>
+      <p:sp>
+        <p:nvSpPr>
+          <p:cNvPr id="3" name="Content Placeholder 2">
+            <a:extLst>
+              <a:ext uri="{FF2B5EF4-FFF2-40B4-BE49-F238E27FC236}">
+                <a16:creationId xmlns:a16="http://schemas.microsoft.com/office/drawing/2014/main" id="{D88926B4-5425-4E13-A0BA-4296DBCF674B}"/>
+              </a:ext>
+            </a:extLst>
+          </p:cNvPr>
+          <p:cNvSpPr>
+            <a:spLocks noGrp="1"/>
+          </p:cNvSpPr>
+          <p:nvPr>
+            <p:ph idx="1"/>
+          </p:nvPr>
+        </p:nvSpPr>
+        <p:spPr>
+          <a:xfrm>
+            <a:off x="4971393" y="3100552"/>
+            <a:ext cx="1849821" cy="641132"/>
+          </a:xfrm>
+        </p:spPr>
+        <p:txBody>
+          <a:bodyPr/>
+          <a:lstStyle/>
+          <a:p>
+            <a:pPr marL="0" indent="0">
+              <a:buNone/>
+            </a:pPr>
+            <a:r>
+              <a:rPr lang="en-IN" dirty="0"/>
+              <a:t>Thank You</a:t>
+            </a:r>
+          </a:p>
+        </p:txBody>
+      </p:sp>
+    </p:spTree>
+    <p:extLst>
+      <p:ext uri="{BB962C8B-B14F-4D97-AF65-F5344CB8AC3E}">
+        <p14:creationId xmlns:p14="http://schemas.microsoft.com/office/powerpoint/2010/main" val="2230254922"/>
       </p:ext>
     </p:extLst>
   </p:cSld>

</xml_diff>

<commit_message>
Saving the latest changes after showign it to Megahaskash
</commit_message>
<xml_diff>
--- a/Presentation.pptx
+++ b/Presentation.pptx
@@ -1099,7 +1099,7 @@
           <a:p>
             <a:fld id="{100BA7F1-FF14-4B33-8466-87C88C58AB59}" type="datetimeFigureOut">
               <a:rPr lang="en-IN" smtClean="0"/>
-              <a:t>22-03-2022</a:t>
+              <a:t>23-03-2022</a:t>
             </a:fld>
             <a:endParaRPr lang="en-IN"/>
           </a:p>
@@ -1674,7 +1674,7 @@
           <a:p>
             <a:fld id="{462C8DB0-A994-4095-BA2B-A9A82D26CA9E}" type="datetimeFigureOut">
               <a:rPr lang="en-IN" smtClean="0"/>
-              <a:t>22-03-2022</a:t>
+              <a:t>23-03-2022</a:t>
             </a:fld>
             <a:endParaRPr lang="en-IN"/>
           </a:p>
@@ -1844,7 +1844,7 @@
           <a:p>
             <a:fld id="{462C8DB0-A994-4095-BA2B-A9A82D26CA9E}" type="datetimeFigureOut">
               <a:rPr lang="en-IN" smtClean="0"/>
-              <a:t>22-03-2022</a:t>
+              <a:t>23-03-2022</a:t>
             </a:fld>
             <a:endParaRPr lang="en-IN"/>
           </a:p>
@@ -2024,7 +2024,7 @@
           <a:p>
             <a:fld id="{462C8DB0-A994-4095-BA2B-A9A82D26CA9E}" type="datetimeFigureOut">
               <a:rPr lang="en-IN" smtClean="0"/>
-              <a:t>22-03-2022</a:t>
+              <a:t>23-03-2022</a:t>
             </a:fld>
             <a:endParaRPr lang="en-IN"/>
           </a:p>
@@ -2194,7 +2194,7 @@
           <a:p>
             <a:fld id="{462C8DB0-A994-4095-BA2B-A9A82D26CA9E}" type="datetimeFigureOut">
               <a:rPr lang="en-IN" smtClean="0"/>
-              <a:t>22-03-2022</a:t>
+              <a:t>23-03-2022</a:t>
             </a:fld>
             <a:endParaRPr lang="en-IN"/>
           </a:p>
@@ -2440,7 +2440,7 @@
           <a:p>
             <a:fld id="{462C8DB0-A994-4095-BA2B-A9A82D26CA9E}" type="datetimeFigureOut">
               <a:rPr lang="en-IN" smtClean="0"/>
-              <a:t>22-03-2022</a:t>
+              <a:t>23-03-2022</a:t>
             </a:fld>
             <a:endParaRPr lang="en-IN"/>
           </a:p>
@@ -2672,7 +2672,7 @@
           <a:p>
             <a:fld id="{462C8DB0-A994-4095-BA2B-A9A82D26CA9E}" type="datetimeFigureOut">
               <a:rPr lang="en-IN" smtClean="0"/>
-              <a:t>22-03-2022</a:t>
+              <a:t>23-03-2022</a:t>
             </a:fld>
             <a:endParaRPr lang="en-IN"/>
           </a:p>
@@ -3039,7 +3039,7 @@
           <a:p>
             <a:fld id="{462C8DB0-A994-4095-BA2B-A9A82D26CA9E}" type="datetimeFigureOut">
               <a:rPr lang="en-IN" smtClean="0"/>
-              <a:t>22-03-2022</a:t>
+              <a:t>23-03-2022</a:t>
             </a:fld>
             <a:endParaRPr lang="en-IN"/>
           </a:p>
@@ -3157,7 +3157,7 @@
           <a:p>
             <a:fld id="{462C8DB0-A994-4095-BA2B-A9A82D26CA9E}" type="datetimeFigureOut">
               <a:rPr lang="en-IN" smtClean="0"/>
-              <a:t>22-03-2022</a:t>
+              <a:t>23-03-2022</a:t>
             </a:fld>
             <a:endParaRPr lang="en-IN"/>
           </a:p>
@@ -3252,7 +3252,7 @@
           <a:p>
             <a:fld id="{462C8DB0-A994-4095-BA2B-A9A82D26CA9E}" type="datetimeFigureOut">
               <a:rPr lang="en-IN" smtClean="0"/>
-              <a:t>22-03-2022</a:t>
+              <a:t>23-03-2022</a:t>
             </a:fld>
             <a:endParaRPr lang="en-IN"/>
           </a:p>
@@ -3529,7 +3529,7 @@
           <a:p>
             <a:fld id="{462C8DB0-A994-4095-BA2B-A9A82D26CA9E}" type="datetimeFigureOut">
               <a:rPr lang="en-IN" smtClean="0"/>
-              <a:t>22-03-2022</a:t>
+              <a:t>23-03-2022</a:t>
             </a:fld>
             <a:endParaRPr lang="en-IN"/>
           </a:p>
@@ -3786,7 +3786,7 @@
           <a:p>
             <a:fld id="{462C8DB0-A994-4095-BA2B-A9A82D26CA9E}" type="datetimeFigureOut">
               <a:rPr lang="en-IN" smtClean="0"/>
-              <a:t>22-03-2022</a:t>
+              <a:t>23-03-2022</a:t>
             </a:fld>
             <a:endParaRPr lang="en-IN"/>
           </a:p>
@@ -3999,7 +3999,7 @@
           <a:p>
             <a:fld id="{462C8DB0-A994-4095-BA2B-A9A82D26CA9E}" type="datetimeFigureOut">
               <a:rPr lang="en-IN" smtClean="0"/>
-              <a:t>22-03-2022</a:t>
+              <a:t>23-03-2022</a:t>
             </a:fld>
             <a:endParaRPr lang="en-IN"/>
           </a:p>
@@ -4559,7 +4559,7 @@
             </a:r>
             <a:r>
               <a:rPr lang="en-US" dirty="0"/>
-              <a:t> /401</a:t>
+              <a:t> /40166917</a:t>
             </a:r>
           </a:p>
           <a:p>
@@ -5236,10 +5236,7 @@
               <a:rPr lang="en-US" dirty="0" err="1"/>
               <a:t>Whh</a:t>
             </a:r>
-            <a:r>
-              <a:rPr lang="en-US" dirty="0"/>
-              <a:t> </a:t>
-            </a:r>
+            <a:endParaRPr lang="en-US" dirty="0"/>
           </a:p>
           <a:p>
             <a:r>
@@ -5944,8 +5941,8 @@
         </p:nvSpPr>
         <p:spPr>
           <a:xfrm>
-            <a:off x="838200" y="1825625"/>
-            <a:ext cx="6281691" cy="4351338"/>
+            <a:off x="838201" y="1825625"/>
+            <a:ext cx="5720862" cy="4351338"/>
           </a:xfrm>
         </p:spPr>
         <p:txBody>
@@ -6536,7 +6533,10 @@
               <a:rPr lang="en-IN" dirty="0" err="1"/>
               <a:t>Pytorch</a:t>
             </a:r>
-            <a:endParaRPr lang="en-IN" dirty="0"/>
+            <a:r>
+              <a:rPr lang="en-IN" dirty="0"/>
+              <a:t> – open source machine learning framework</a:t>
+            </a:r>
           </a:p>
           <a:p>
             <a:r>
@@ -6545,14 +6545,19 @@
             </a:r>
             <a:r>
               <a:rPr lang="en-IN" dirty="0"/>
-              <a:t> </a:t>
+              <a:t>  - library for mathematical function</a:t>
             </a:r>
           </a:p>
           <a:p>
             <a:r>
               <a:rPr lang="en-IN" dirty="0"/>
-              <a:t>pickle</a:t>
-            </a:r>
+              <a:t>Pickle -  library to convert Python object into </a:t>
+            </a:r>
+            <a:r>
+              <a:rPr lang="en-IN"/>
+              <a:t>byte stream etc.</a:t>
+            </a:r>
+            <a:endParaRPr lang="en-IN" dirty="0"/>
           </a:p>
         </p:txBody>
       </p:sp>
@@ -8168,49 +8173,77 @@
         <p:spPr/>
         <p:txBody>
           <a:bodyPr>
-            <a:normAutofit fontScale="92500" lnSpcReduction="20000"/>
+            <a:normAutofit fontScale="85000" lnSpcReduction="20000"/>
           </a:bodyPr>
           <a:lstStyle/>
           <a:p>
             <a:r>
+              <a:rPr lang="en-IN" b="1" dirty="0"/>
+              <a:t>Sequence Length</a:t>
+            </a:r>
+            <a:r>
               <a:rPr lang="en-IN" dirty="0"/>
-              <a:t>Sequence Length: to set the length of the sequence</a:t>
-            </a:r>
-          </a:p>
-          <a:p>
+              <a:t>: to set the length of the sequence</a:t>
+            </a:r>
+          </a:p>
+          <a:p>
+            <a:r>
+              <a:rPr lang="en-IN" b="1" dirty="0"/>
+              <a:t>Batch Size </a:t>
+            </a:r>
             <a:r>
               <a:rPr lang="en-IN" dirty="0"/>
-              <a:t>Batch Size : to set the size of batches </a:t>
-            </a:r>
-          </a:p>
-          <a:p>
+              <a:t>: to set the size of batches </a:t>
+            </a:r>
+          </a:p>
+          <a:p>
+            <a:r>
+              <a:rPr lang="en-IN" b="1" dirty="0"/>
+              <a:t>Number of epochs </a:t>
+            </a:r>
             <a:r>
               <a:rPr lang="en-IN" dirty="0"/>
-              <a:t>Number of epochs : to set the number of epochs to train for</a:t>
-            </a:r>
-          </a:p>
-          <a:p>
+              <a:t>: to set the number of epochs to train for</a:t>
+            </a:r>
+          </a:p>
+          <a:p>
+            <a:r>
+              <a:rPr lang="en-IN" b="1" dirty="0"/>
+              <a:t>Learning Rate</a:t>
+            </a:r>
             <a:r>
               <a:rPr lang="en-IN" dirty="0"/>
-              <a:t>Learning Rate: to set the learning rate of Adam Optimizer </a:t>
-            </a:r>
-          </a:p>
-          <a:p>
+              <a:t>: to set the learning rate of Adam Optimizer </a:t>
+            </a:r>
+          </a:p>
+          <a:p>
+            <a:r>
+              <a:rPr lang="en-IN" b="1" dirty="0"/>
+              <a:t>Vocab Size </a:t>
+            </a:r>
             <a:r>
               <a:rPr lang="en-IN" dirty="0"/>
-              <a:t>Vocab Size :  to set the number of unique tokens in vocabulary</a:t>
-            </a:r>
-          </a:p>
-          <a:p>
+              <a:t>:  to set the number of unique tokens in vocabulary</a:t>
+            </a:r>
+          </a:p>
+          <a:p>
+            <a:r>
+              <a:rPr lang="en-IN" b="1" dirty="0"/>
+              <a:t>Output Size </a:t>
+            </a:r>
             <a:r>
               <a:rPr lang="en-IN" dirty="0"/>
-              <a:t>Output Size : to set the desired size of output</a:t>
-            </a:r>
-          </a:p>
-          <a:p>
+              <a:t>: to set the desired size of output</a:t>
+            </a:r>
+          </a:p>
+          <a:p>
+            <a:r>
+              <a:rPr lang="en-IN" b="1" dirty="0"/>
+              <a:t>Embedding Dim </a:t>
+            </a:r>
             <a:r>
               <a:rPr lang="en-IN" dirty="0"/>
-              <a:t>Embedding Dim : to set the embedding dimension, smaller than </a:t>
+              <a:t>: to set the embedding dimension, smaller than </a:t>
             </a:r>
             <a:r>
               <a:rPr lang="en-IN" dirty="0" err="1"/>
@@ -8220,20 +8253,32 @@
           </a:p>
           <a:p>
             <a:r>
+              <a:rPr lang="en-IN" b="1" dirty="0"/>
+              <a:t>Hidden Dim </a:t>
+            </a:r>
+            <a:r>
               <a:rPr lang="en-IN" dirty="0"/>
-              <a:t>Hidden Dim : to set the hidden dimension of RNN</a:t>
-            </a:r>
-          </a:p>
-          <a:p>
+              <a:t>: to set the hidden dimension of RNN</a:t>
+            </a:r>
+          </a:p>
+          <a:p>
+            <a:r>
+              <a:rPr lang="en-IN" b="1" dirty="0"/>
+              <a:t>N Layer</a:t>
+            </a:r>
             <a:r>
               <a:rPr lang="en-IN" dirty="0"/>
-              <a:t>N Layer: to set the number of layers in the RNN</a:t>
-            </a:r>
-          </a:p>
-          <a:p>
+              <a:t>: to set the number of layers in the RNN</a:t>
+            </a:r>
+          </a:p>
+          <a:p>
+            <a:r>
+              <a:rPr lang="en-IN" b="1" dirty="0"/>
+              <a:t>Show N Batches</a:t>
+            </a:r>
             <a:r>
               <a:rPr lang="en-IN" dirty="0"/>
-              <a:t>Show N Batches: to set the number of batches at which neural network should print progress </a:t>
+              <a:t>: to set the number of batches at which neural network should print progress </a:t>
             </a:r>
           </a:p>
         </p:txBody>
@@ -8775,13 +8820,29 @@
           <a:p>
             <a:r>
               <a:rPr lang="en-IN" dirty="0"/>
-              <a:t>Using Adam Optimizer as optimizer function</a:t>
-            </a:r>
-          </a:p>
-          <a:p>
+              <a:t>Using </a:t>
+            </a:r>
+            <a:r>
+              <a:rPr lang="en-IN" b="1" dirty="0"/>
+              <a:t>Adam Optimizer </a:t>
+            </a:r>
             <a:r>
               <a:rPr lang="en-IN" dirty="0"/>
-              <a:t>Using Cross entropy loss as a loss function</a:t>
+              <a:t>as optimizer function</a:t>
+            </a:r>
+          </a:p>
+          <a:p>
+            <a:r>
+              <a:rPr lang="en-IN" dirty="0"/>
+              <a:t>Using </a:t>
+            </a:r>
+            <a:r>
+              <a:rPr lang="en-IN" b="1" dirty="0"/>
+              <a:t>Cross entropy loss</a:t>
+            </a:r>
+            <a:r>
+              <a:rPr lang="en-IN" dirty="0"/>
+              <a:t> as a loss function</a:t>
             </a:r>
           </a:p>
           <a:p>
@@ -9804,7 +9865,15 @@
           <a:p>
             <a:r>
               <a:rPr lang="en-IN" dirty="0"/>
-              <a:t>Recurrence relations need to applied at each time step t, such that model learns the concepts of memory by updating the hidden state.</a:t>
+              <a:t>Recurrence relations need to applied at each time step t, such that model learns the concepts of </a:t>
+            </a:r>
+            <a:r>
+              <a:rPr lang="en-IN" b="1" dirty="0"/>
+              <a:t>memory</a:t>
+            </a:r>
+            <a:r>
+              <a:rPr lang="en-IN" dirty="0"/>
+              <a:t> by updating the hidden state.</a:t>
             </a:r>
           </a:p>
         </p:txBody>
@@ -9861,7 +9930,7 @@
         </p:blipFill>
         <p:spPr>
           <a:xfrm>
-            <a:off x="9081857" y="4289024"/>
+            <a:off x="9081856" y="4289024"/>
             <a:ext cx="2511734" cy="1765570"/>
           </a:xfrm>
           <a:prstGeom prst="rect">
@@ -10107,7 +10176,7 @@
           <a:p>
             <a:r>
               <a:rPr lang="en-US" dirty="0"/>
-              <a:t>We can solve this problem we routing the hidden layer output from the previous step back into the hidden layer.</a:t>
+              <a:t>We can solve this problem by routing the hidden layer output from the previous step back into the hidden layer.</a:t>
             </a:r>
           </a:p>
           <a:p>
@@ -10429,7 +10498,15 @@
           <a:p>
             <a:r>
               <a:rPr lang="en-US" dirty="0"/>
-              <a:t>Here, we’re one hot encoding the input characters. </a:t>
+              <a:t>Here, we’re </a:t>
+            </a:r>
+            <a:r>
+              <a:rPr lang="en-US" b="1" dirty="0"/>
+              <a:t>one hot encoding </a:t>
+            </a:r>
+            <a:r>
+              <a:rPr lang="en-US" dirty="0"/>
+              <a:t>the input characters. </a:t>
             </a:r>
           </a:p>
           <a:p>

</xml_diff>